<commit_message>
slide :     - PseudoCode de optimized.py avec complexité temporelle.
</commit_message>
<xml_diff>
--- a/p07_slide.pptx
+++ b/p07_slide.pptx
@@ -5,10 +5,10 @@
     <p:sldMasterId id="2147483660" r:id="rId1"/>
   </p:sldMasterIdLst>
   <p:notesMasterIdLst>
-    <p:notesMasterId r:id="rId13"/>
+    <p:notesMasterId r:id="rId15"/>
   </p:notesMasterIdLst>
   <p:handoutMasterIdLst>
-    <p:handoutMasterId r:id="rId14"/>
+    <p:handoutMasterId r:id="rId16"/>
   </p:handoutMasterIdLst>
   <p:sldIdLst>
     <p:sldId id="261" r:id="rId2"/>
@@ -18,10 +18,12 @@
     <p:sldId id="319" r:id="rId6"/>
     <p:sldId id="311" r:id="rId7"/>
     <p:sldId id="313" r:id="rId8"/>
-    <p:sldId id="314" r:id="rId9"/>
-    <p:sldId id="315" r:id="rId10"/>
-    <p:sldId id="316" r:id="rId11"/>
-    <p:sldId id="273" r:id="rId12"/>
+    <p:sldId id="320" r:id="rId9"/>
+    <p:sldId id="321" r:id="rId10"/>
+    <p:sldId id="314" r:id="rId11"/>
+    <p:sldId id="315" r:id="rId12"/>
+    <p:sldId id="316" r:id="rId13"/>
+    <p:sldId id="273" r:id="rId14"/>
   </p:sldIdLst>
   <p:sldSz cx="12192000" cy="6858000"/>
   <p:notesSz cx="6858000" cy="9144000"/>
@@ -144,6 +146,8 @@
         <p14:section name="optimized - Pseudocode/diagramme" id="{E3EF66F9-02C8-45F0-A757-D705B1A1925E}">
           <p14:sldIdLst>
             <p14:sldId id="313"/>
+            <p14:sldId id="320"/>
+            <p14:sldId id="321"/>
           </p14:sldIdLst>
         </p14:section>
         <p14:section name="optimized - Cas limites" id="{C7212572-82B6-47DD-815A-BEDB161CE5E4}">
@@ -272,7 +276,7 @@
           <a:p>
             <a:fld id="{006FEFC0-2236-48A2-B120-C759EDA2264F}" type="datetimeFigureOut">
               <a:rPr lang="fr-FR" smtClean="0"/>
-              <a:t>08/01/2022</a:t>
+              <a:t>10/01/2022</a:t>
             </a:fld>
             <a:endParaRPr lang="fr-FR"/>
           </a:p>
@@ -449,7 +453,7 @@
           <a:p>
             <a:fld id="{39A2C6B1-E7AA-4745-9EA3-948DDA335211}" type="datetimeFigureOut">
               <a:rPr lang="fr-FR" smtClean="0"/>
-              <a:t>08/01/2022</a:t>
+              <a:t>10/01/2022</a:t>
             </a:fld>
             <a:endParaRPr lang="fr-FR"/>
           </a:p>
@@ -1135,7 +1139,7 @@
             <a:fld id="{EEB52BBF-3D2E-4DB7-B1B2-3EEDAF05D916}" type="datetime1">
               <a:rPr lang="fr-FR" smtClean="0"/>
               <a:pPr/>
-              <a:t>08/01/2022</a:t>
+              <a:t>10/01/2022</a:t>
             </a:fld>
             <a:endParaRPr lang="fr-FR" dirty="0"/>
           </a:p>
@@ -1303,7 +1307,7 @@
           <a:p>
             <a:fld id="{D1B56501-E7FC-4AA4-829C-7EB06C5B501B}" type="datetime1">
               <a:rPr lang="fr-FR" smtClean="0"/>
-              <a:t>08/01/2022</a:t>
+              <a:t>10/01/2022</a:t>
             </a:fld>
             <a:endParaRPr lang="fr-FR"/>
           </a:p>
@@ -1541,7 +1545,7 @@
           <a:p>
             <a:fld id="{E1EA16D8-943B-480F-B7AB-8A20EEC88A30}" type="datetime1">
               <a:rPr lang="fr-FR" smtClean="0"/>
-              <a:t>08/01/2022</a:t>
+              <a:t>10/01/2022</a:t>
             </a:fld>
             <a:endParaRPr lang="fr-FR"/>
           </a:p>
@@ -1755,7 +1759,7 @@
           <a:p>
             <a:fld id="{B9F3C5A3-9381-4B97-82E4-385F6F49F69F}" type="datetime1">
               <a:rPr lang="fr-FR" smtClean="0"/>
-              <a:t>08/01/2022</a:t>
+              <a:t>10/01/2022</a:t>
             </a:fld>
             <a:endParaRPr lang="fr-FR"/>
           </a:p>
@@ -1884,7 +1888,7 @@
           <a:p>
             <a:fld id="{4716E524-F7FE-4CF1-BC8B-47DD9AC23070}" type="datetime1">
               <a:rPr lang="fr-FR" smtClean="0"/>
-              <a:t>08/01/2022</a:t>
+              <a:t>10/01/2022</a:t>
             </a:fld>
             <a:endParaRPr lang="fr-FR"/>
           </a:p>
@@ -2418,7 +2422,7 @@
           <a:p>
             <a:fld id="{336D8786-97C7-4BAF-A4C9-C839CD61D49F}" type="datetime1">
               <a:rPr lang="fr-FR" smtClean="0"/>
-              <a:t>08/01/2022</a:t>
+              <a:t>10/01/2022</a:t>
             </a:fld>
             <a:endParaRPr lang="fr-FR"/>
           </a:p>
@@ -2721,7 +2725,7 @@
           <a:p>
             <a:fld id="{074B9914-FBA4-40D6-94C7-D139128B50C8}" type="datetime1">
               <a:rPr lang="fr-FR" smtClean="0"/>
-              <a:t>08/01/2022</a:t>
+              <a:t>10/01/2022</a:t>
             </a:fld>
             <a:endParaRPr lang="fr-FR"/>
           </a:p>
@@ -3172,7 +3176,7 @@
           <a:p>
             <a:fld id="{51704AF8-D9A6-4385-8AB7-F174826852B4}" type="datetime1">
               <a:rPr lang="fr-FR" smtClean="0"/>
-              <a:t>08/01/2022</a:t>
+              <a:t>10/01/2022</a:t>
             </a:fld>
             <a:endParaRPr lang="fr-FR"/>
           </a:p>
@@ -3309,7 +3313,7 @@
             <a:lvl1pPr>
               <a:defRPr>
                 <a:solidFill>
-                  <a:srgbClr val="64B164"/>
+                  <a:schemeClr val="accent1"/>
                 </a:solidFill>
               </a:defRPr>
             </a:lvl1pPr>
@@ -3429,7 +3433,7 @@
           <a:p>
             <a:fld id="{2DB68652-01BB-4E56-9340-87662979ACA3}" type="datetime1">
               <a:rPr lang="fr-FR" smtClean="0"/>
-              <a:t>08/01/2022</a:t>
+              <a:t>10/01/2022</a:t>
             </a:fld>
             <a:endParaRPr lang="fr-FR"/>
           </a:p>
@@ -3773,7 +3777,7 @@
           <a:p>
             <a:fld id="{EC149F96-B5CE-4558-BCAE-5D6484994026}" type="datetime1">
               <a:rPr lang="fr-FR" smtClean="0"/>
-              <a:t>08/01/2022</a:t>
+              <a:t>10/01/2022</a:t>
             </a:fld>
             <a:endParaRPr lang="fr-FR"/>
           </a:p>
@@ -4094,7 +4098,7 @@
           <a:p>
             <a:fld id="{5B90BA0F-8B4E-4DE9-A747-69F5CB516130}" type="datetime1">
               <a:rPr lang="fr-FR" smtClean="0"/>
-              <a:t>08/01/2022</a:t>
+              <a:t>10/01/2022</a:t>
             </a:fld>
             <a:endParaRPr lang="fr-FR"/>
           </a:p>
@@ -4301,7 +4305,7 @@
             <a:fld id="{C1D57578-8FE2-4469-A516-156BBECEE892}" type="datetime1">
               <a:rPr lang="fr-FR" smtClean="0"/>
               <a:pPr/>
-              <a:t>08/01/2022</a:t>
+              <a:t>10/01/2022</a:t>
             </a:fld>
             <a:endParaRPr lang="fr-FR"/>
           </a:p>
@@ -5439,6 +5443,255 @@
           <p:cNvPr id="2" name="Titre 1">
             <a:extLst>
               <a:ext uri="{FF2B5EF4-FFF2-40B4-BE49-F238E27FC236}">
+                <a16:creationId xmlns:a16="http://schemas.microsoft.com/office/drawing/2014/main" id="{18A2161E-D157-4DD3-8676-561D46832918}"/>
+              </a:ext>
+            </a:extLst>
+          </p:cNvPr>
+          <p:cNvSpPr>
+            <a:spLocks noGrp="1"/>
+          </p:cNvSpPr>
+          <p:nvPr>
+            <p:ph type="title"/>
+          </p:nvPr>
+        </p:nvSpPr>
+        <p:spPr/>
+        <p:txBody>
+          <a:bodyPr/>
+          <a:lstStyle/>
+          <a:p>
+            <a:r>
+              <a:rPr lang="fr-FR" dirty="0"/>
+              <a:t>optimized.py =&gt; Cas limites</a:t>
+            </a:r>
+          </a:p>
+        </p:txBody>
+      </p:sp>
+      <p:sp>
+        <p:nvSpPr>
+          <p:cNvPr id="3" name="Espace réservé du numéro de diapositive 2">
+            <a:extLst>
+              <a:ext uri="{FF2B5EF4-FFF2-40B4-BE49-F238E27FC236}">
+                <a16:creationId xmlns:a16="http://schemas.microsoft.com/office/drawing/2014/main" id="{280DC6FB-56E6-483B-ABE2-6FA64B789CDA}"/>
+              </a:ext>
+            </a:extLst>
+          </p:cNvPr>
+          <p:cNvSpPr>
+            <a:spLocks noGrp="1"/>
+          </p:cNvSpPr>
+          <p:nvPr>
+            <p:ph type="sldNum" sz="quarter" idx="12"/>
+          </p:nvPr>
+        </p:nvSpPr>
+        <p:spPr/>
+        <p:txBody>
+          <a:bodyPr/>
+          <a:lstStyle/>
+          <a:p>
+            <a:fld id="{2CEE6A89-DFCB-4FC8-A1BB-9845AC41F306}" type="slidenum">
+              <a:rPr lang="fr-FR" smtClean="0"/>
+              <a:pPr/>
+              <a:t>10</a:t>
+            </a:fld>
+            <a:endParaRPr lang="fr-FR" dirty="0"/>
+          </a:p>
+        </p:txBody>
+      </p:sp>
+      <p:sp>
+        <p:nvSpPr>
+          <p:cNvPr id="5" name="ZoneTexte 4">
+            <a:extLst>
+              <a:ext uri="{FF2B5EF4-FFF2-40B4-BE49-F238E27FC236}">
+                <a16:creationId xmlns:a16="http://schemas.microsoft.com/office/drawing/2014/main" id="{0D6A796C-7F25-4C44-85B9-0A38AD05CB63}"/>
+              </a:ext>
+            </a:extLst>
+          </p:cNvPr>
+          <p:cNvSpPr txBox="1"/>
+          <p:nvPr/>
+        </p:nvSpPr>
+        <p:spPr>
+          <a:xfrm>
+            <a:off x="1714500" y="2959100"/>
+            <a:ext cx="6070444" cy="923330"/>
+          </a:xfrm>
+          <a:prstGeom prst="rect">
+            <a:avLst/>
+          </a:prstGeom>
+          <a:noFill/>
+        </p:spPr>
+        <p:txBody>
+          <a:bodyPr wrap="none" rtlCol="0">
+            <a:spAutoFit/>
+          </a:bodyPr>
+          <a:lstStyle/>
+          <a:p>
+            <a:pPr marL="285750" indent="-285750">
+              <a:buFontTx/>
+              <a:buChar char="-"/>
+            </a:pPr>
+            <a:r>
+              <a:rPr lang="fr-FR" dirty="0">
+                <a:solidFill>
+                  <a:srgbClr val="64B164"/>
+                </a:solidFill>
+              </a:rPr>
+              <a:t>Les données du fichier ne sont pas sous la forme attendues.</a:t>
+            </a:r>
+          </a:p>
+          <a:p>
+            <a:pPr marL="285750" indent="-285750">
+              <a:buFontTx/>
+              <a:buChar char="-"/>
+            </a:pPr>
+            <a:r>
+              <a:rPr lang="fr-FR" dirty="0">
+                <a:solidFill>
+                  <a:srgbClr val="64B164"/>
+                </a:solidFill>
+              </a:rPr>
+              <a:t>Le fichier ne contient pas de données.</a:t>
+            </a:r>
+          </a:p>
+          <a:p>
+            <a:pPr marL="285750" indent="-285750">
+              <a:buFontTx/>
+              <a:buChar char="-"/>
+            </a:pPr>
+            <a:endParaRPr lang="fr-FR" dirty="0">
+              <a:solidFill>
+                <a:srgbClr val="64B164"/>
+              </a:solidFill>
+            </a:endParaRPr>
+          </a:p>
+        </p:txBody>
+      </p:sp>
+    </p:spTree>
+    <p:extLst>
+      <p:ext uri="{BB962C8B-B14F-4D97-AF65-F5344CB8AC3E}">
+        <p14:creationId xmlns:p14="http://schemas.microsoft.com/office/powerpoint/2010/main" val="3814144576"/>
+      </p:ext>
+    </p:extLst>
+  </p:cSld>
+  <p:clrMapOvr>
+    <a:masterClrMapping/>
+  </p:clrMapOvr>
+</p:sld>
+</file>
+
+<file path=ppt/slides/slide11.xml><?xml version="1.0" encoding="utf-8"?>
+<p:sld xmlns:a="http://schemas.openxmlformats.org/drawingml/2006/main" xmlns:r="http://schemas.openxmlformats.org/officeDocument/2006/relationships" xmlns:p="http://schemas.openxmlformats.org/presentationml/2006/main">
+  <p:cSld>
+    <p:spTree>
+      <p:nvGrpSpPr>
+        <p:cNvPr id="1" name=""/>
+        <p:cNvGrpSpPr/>
+        <p:nvPr/>
+      </p:nvGrpSpPr>
+      <p:grpSpPr>
+        <a:xfrm>
+          <a:off x="0" y="0"/>
+          <a:ext cx="0" cy="0"/>
+          <a:chOff x="0" y="0"/>
+          <a:chExt cx="0" cy="0"/>
+        </a:xfrm>
+      </p:grpSpPr>
+      <p:sp>
+        <p:nvSpPr>
+          <p:cNvPr id="2" name="Titre 1">
+            <a:extLst>
+              <a:ext uri="{FF2B5EF4-FFF2-40B4-BE49-F238E27FC236}">
+                <a16:creationId xmlns:a16="http://schemas.microsoft.com/office/drawing/2014/main" id="{D0902EAC-08A5-4F86-BA0C-296DC5B4C3F0}"/>
+              </a:ext>
+            </a:extLst>
+          </p:cNvPr>
+          <p:cNvSpPr>
+            <a:spLocks noGrp="1"/>
+          </p:cNvSpPr>
+          <p:nvPr>
+            <p:ph type="title"/>
+          </p:nvPr>
+        </p:nvSpPr>
+        <p:spPr/>
+        <p:txBody>
+          <a:bodyPr/>
+          <a:lstStyle/>
+          <a:p>
+            <a:r>
+              <a:rPr lang="fr-FR" dirty="0"/>
+              <a:t>Comparaison performances brute/</a:t>
+            </a:r>
+            <a:r>
+              <a:rPr lang="fr-FR" dirty="0" err="1"/>
+              <a:t>opti</a:t>
+            </a:r>
+            <a:endParaRPr lang="fr-FR" dirty="0"/>
+          </a:p>
+        </p:txBody>
+      </p:sp>
+      <p:sp>
+        <p:nvSpPr>
+          <p:cNvPr id="3" name="Espace réservé du numéro de diapositive 2">
+            <a:extLst>
+              <a:ext uri="{FF2B5EF4-FFF2-40B4-BE49-F238E27FC236}">
+                <a16:creationId xmlns:a16="http://schemas.microsoft.com/office/drawing/2014/main" id="{C16F43A3-9526-46B7-AFCD-BAB05B23A532}"/>
+              </a:ext>
+            </a:extLst>
+          </p:cNvPr>
+          <p:cNvSpPr>
+            <a:spLocks noGrp="1"/>
+          </p:cNvSpPr>
+          <p:nvPr>
+            <p:ph type="sldNum" sz="quarter" idx="12"/>
+          </p:nvPr>
+        </p:nvSpPr>
+        <p:spPr/>
+        <p:txBody>
+          <a:bodyPr/>
+          <a:lstStyle/>
+          <a:p>
+            <a:fld id="{2CEE6A89-DFCB-4FC8-A1BB-9845AC41F306}" type="slidenum">
+              <a:rPr lang="fr-FR" smtClean="0"/>
+              <a:pPr/>
+              <a:t>11</a:t>
+            </a:fld>
+            <a:endParaRPr lang="fr-FR" dirty="0"/>
+          </a:p>
+        </p:txBody>
+      </p:sp>
+    </p:spTree>
+    <p:extLst>
+      <p:ext uri="{BB962C8B-B14F-4D97-AF65-F5344CB8AC3E}">
+        <p14:creationId xmlns:p14="http://schemas.microsoft.com/office/powerpoint/2010/main" val="1963989922"/>
+      </p:ext>
+    </p:extLst>
+  </p:cSld>
+  <p:clrMapOvr>
+    <a:masterClrMapping/>
+  </p:clrMapOvr>
+</p:sld>
+</file>
+
+<file path=ppt/slides/slide12.xml><?xml version="1.0" encoding="utf-8"?>
+<p:sld xmlns:a="http://schemas.openxmlformats.org/drawingml/2006/main" xmlns:r="http://schemas.openxmlformats.org/officeDocument/2006/relationships" xmlns:p="http://schemas.openxmlformats.org/presentationml/2006/main">
+  <p:cSld>
+    <p:spTree>
+      <p:nvGrpSpPr>
+        <p:cNvPr id="1" name=""/>
+        <p:cNvGrpSpPr/>
+        <p:nvPr/>
+      </p:nvGrpSpPr>
+      <p:grpSpPr>
+        <a:xfrm>
+          <a:off x="0" y="0"/>
+          <a:ext cx="0" cy="0"/>
+          <a:chOff x="0" y="0"/>
+          <a:chExt cx="0" cy="0"/>
+        </a:xfrm>
+      </p:grpSpPr>
+      <p:sp>
+        <p:nvSpPr>
+          <p:cNvPr id="2" name="Titre 1">
+            <a:extLst>
+              <a:ext uri="{FF2B5EF4-FFF2-40B4-BE49-F238E27FC236}">
                 <a16:creationId xmlns:a16="http://schemas.microsoft.com/office/drawing/2014/main" id="{CDDD166C-6BB7-44CD-B06B-CC20A965ADB2}"/>
               </a:ext>
             </a:extLst>
@@ -5486,7 +5739,7 @@
             <a:fld id="{2CEE6A89-DFCB-4FC8-A1BB-9845AC41F306}" type="slidenum">
               <a:rPr lang="fr-FR" smtClean="0"/>
               <a:pPr/>
-              <a:t>10</a:t>
+              <a:t>12</a:t>
             </a:fld>
             <a:endParaRPr lang="fr-FR" dirty="0"/>
           </a:p>
@@ -5505,7 +5758,7 @@
 </p:sld>
 </file>
 
-<file path=ppt/slides/slide11.xml><?xml version="1.0" encoding="utf-8"?>
+<file path=ppt/slides/slide13.xml><?xml version="1.0" encoding="utf-8"?>
 <p:sld xmlns:a="http://schemas.openxmlformats.org/drawingml/2006/main" xmlns:r="http://schemas.openxmlformats.org/officeDocument/2006/relationships" xmlns:p="http://schemas.openxmlformats.org/presentationml/2006/main">
   <p:cSld>
     <p:spTree>
@@ -5581,7 +5834,7 @@
             <a:fld id="{2CEE6A89-DFCB-4FC8-A1BB-9845AC41F306}" type="slidenum">
               <a:rPr lang="fr-FR" smtClean="0"/>
               <a:pPr/>
-              <a:t>11</a:t>
+              <a:t>13</a:t>
             </a:fld>
             <a:endParaRPr lang="fr-FR" dirty="0"/>
           </a:p>
@@ -5826,10 +6079,10 @@
       </p:grpSpPr>
       <p:pic>
         <p:nvPicPr>
-          <p:cNvPr id="9" name="Image 8">
+          <p:cNvPr id="14" name="Image 13">
             <a:extLst>
               <a:ext uri="{FF2B5EF4-FFF2-40B4-BE49-F238E27FC236}">
-                <a16:creationId xmlns:a16="http://schemas.microsoft.com/office/drawing/2014/main" id="{8151D1B3-3E26-45C7-B2D8-6CBEE3017E74}"/>
+                <a16:creationId xmlns:a16="http://schemas.microsoft.com/office/drawing/2014/main" id="{D263BA42-548F-4A85-8517-5BFB257BBCC3}"/>
               </a:ext>
             </a:extLst>
           </p:cNvPr>
@@ -5852,7 +6105,7 @@
         <p:spPr>
           <a:xfrm>
             <a:off x="360000" y="1440000"/>
-            <a:ext cx="6972932" cy="5040000"/>
+            <a:ext cx="6363000" cy="5040000"/>
           </a:xfrm>
           <a:prstGeom prst="rect">
             <a:avLst/>
@@ -5936,7 +6189,7 @@
         </p:nvSpPr>
         <p:spPr>
           <a:xfrm>
-            <a:off x="6422516" y="2185823"/>
+            <a:off x="6480000" y="2185823"/>
             <a:ext cx="362583" cy="897759"/>
           </a:xfrm>
           <a:prstGeom prst="rightBrace">
@@ -5988,7 +6241,7 @@
         </p:nvSpPr>
         <p:spPr>
           <a:xfrm>
-            <a:off x="6416161" y="3389798"/>
+            <a:off x="6480000" y="3389798"/>
             <a:ext cx="362583" cy="1011207"/>
           </a:xfrm>
           <a:prstGeom prst="rightBrace">
@@ -6040,7 +6293,7 @@
         </p:nvSpPr>
         <p:spPr>
           <a:xfrm>
-            <a:off x="6416161" y="4759169"/>
+            <a:off x="6480000" y="4759169"/>
             <a:ext cx="362583" cy="1597183"/>
           </a:xfrm>
           <a:prstGeom prst="rightBrace">
@@ -6135,7 +6388,7 @@
             </p:nvSpPr>
             <p:spPr>
               <a:xfrm>
-                <a:off x="8406789" y="121212"/>
+                <a:off x="8280000" y="180000"/>
                 <a:ext cx="3823354" cy="1200329"/>
               </a:xfrm>
               <a:prstGeom prst="rect">
@@ -6270,7 +6523,7 @@
             </p:nvSpPr>
             <p:spPr>
               <a:xfrm>
-                <a:off x="8406789" y="121212"/>
+                <a:off x="8280000" y="180000"/>
                 <a:ext cx="3823354" cy="1200329"/>
               </a:xfrm>
               <a:prstGeom prst="rect">
@@ -6279,7 +6532,7 @@
               <a:blipFill>
                 <a:blip r:embed="rId3"/>
                 <a:stretch>
-                  <a:fillRect l="-1113" t="-2513" r="-795" b="-6533"/>
+                  <a:fillRect l="-1113" t="-2525" r="-795" b="-7071"/>
                 </a:stretch>
               </a:blipFill>
               <a:ln>
@@ -6303,8 +6556,8 @@
           </p:sp>
         </mc:Fallback>
       </mc:AlternateContent>
-      <mc:AlternateContent xmlns:mc="http://schemas.openxmlformats.org/markup-compatibility/2006">
-        <mc:Choice xmlns:a14="http://schemas.microsoft.com/office/drawing/2010/main" Requires="a14">
+      <mc:AlternateContent xmlns:mc="http://schemas.openxmlformats.org/markup-compatibility/2006" xmlns:a14="http://schemas.microsoft.com/office/drawing/2010/main">
+        <mc:Choice Requires="a14">
           <p:sp>
             <p:nvSpPr>
               <p:cNvPr id="5" name="Rectangle 4">
@@ -6342,7 +6595,7 @@
                       <m:sSub>
                         <m:sSubPr>
                           <m:ctrlPr>
-                            <a:rPr lang="fr-FR" smtClean="0">
+                            <a:rPr lang="fr-FR" i="1" smtClean="0">
                               <a:solidFill>
                                 <a:srgbClr val="66D9EF"/>
                               </a:solidFill>
@@ -6584,7 +6837,7 @@
             </p:txBody>
           </p:sp>
         </mc:Choice>
-        <mc:Fallback>
+        <mc:Fallback xmlns="">
           <p:sp>
             <p:nvSpPr>
               <p:cNvPr id="5" name="Rectangle 4">
@@ -6629,8 +6882,8 @@
           </p:sp>
         </mc:Fallback>
       </mc:AlternateContent>
-      <mc:AlternateContent xmlns:mc="http://schemas.openxmlformats.org/markup-compatibility/2006">
-        <mc:Choice xmlns:a14="http://schemas.microsoft.com/office/drawing/2010/main" Requires="a14">
+      <mc:AlternateContent xmlns:mc="http://schemas.openxmlformats.org/markup-compatibility/2006" xmlns:a14="http://schemas.microsoft.com/office/drawing/2010/main">
+        <mc:Choice Requires="a14">
           <p:sp>
             <p:nvSpPr>
               <p:cNvPr id="6" name="Rectangle 5">
@@ -6668,7 +6921,7 @@
                       <m:sSub>
                         <m:sSubPr>
                           <m:ctrlPr>
-                            <a:rPr lang="fr-FR" smtClean="0">
+                            <a:rPr lang="fr-FR" i="1" smtClean="0">
                               <a:solidFill>
                                 <a:srgbClr val="66D9EF"/>
                               </a:solidFill>
@@ -7021,7 +7274,7 @@
             </p:txBody>
           </p:sp>
         </mc:Choice>
-        <mc:Fallback>
+        <mc:Fallback xmlns="">
           <p:sp>
             <p:nvSpPr>
               <p:cNvPr id="6" name="Rectangle 5">
@@ -7066,8 +7319,8 @@
           </p:sp>
         </mc:Fallback>
       </mc:AlternateContent>
-      <mc:AlternateContent xmlns:mc="http://schemas.openxmlformats.org/markup-compatibility/2006">
-        <mc:Choice xmlns:a14="http://schemas.microsoft.com/office/drawing/2010/main" Requires="a14">
+      <mc:AlternateContent xmlns:mc="http://schemas.openxmlformats.org/markup-compatibility/2006" xmlns:a14="http://schemas.microsoft.com/office/drawing/2010/main">
+        <mc:Choice Requires="a14">
           <p:sp>
             <p:nvSpPr>
               <p:cNvPr id="7" name="Rectangle 6">
@@ -7105,7 +7358,7 @@
                       <m:sSub>
                         <m:sSubPr>
                           <m:ctrlPr>
-                            <a:rPr lang="fr-FR" smtClean="0">
+                            <a:rPr lang="fr-FR" i="1" smtClean="0">
                               <a:solidFill>
                                 <a:srgbClr val="66D9EF"/>
                               </a:solidFill>
@@ -7397,7 +7650,7 @@
             </p:txBody>
           </p:sp>
         </mc:Choice>
-        <mc:Fallback>
+        <mc:Fallback xmlns="">
           <p:sp>
             <p:nvSpPr>
               <p:cNvPr id="7" name="Rectangle 6">
@@ -7494,14 +7747,13 @@
               </a:ext>
             </a:extLst>
           </a:blip>
-          <a:stretch>
-            <a:fillRect/>
-          </a:stretch>
+          <a:srcRect/>
+          <a:stretch/>
         </p:blipFill>
         <p:spPr>
           <a:xfrm>
-            <a:off x="360000" y="1439999"/>
-            <a:ext cx="6988906" cy="3538383"/>
+            <a:off x="360000" y="1440000"/>
+            <a:ext cx="6363001" cy="5040000"/>
           </a:xfrm>
           <a:prstGeom prst="rect">
             <a:avLst/>
@@ -7585,7 +7837,7 @@
         </p:nvSpPr>
         <p:spPr>
           <a:xfrm>
-            <a:off x="6422400" y="1515357"/>
+            <a:off x="6480000" y="1515357"/>
             <a:ext cx="362583" cy="1516971"/>
           </a:xfrm>
           <a:prstGeom prst="rightBrace">
@@ -7637,7 +7889,7 @@
         </p:nvSpPr>
         <p:spPr>
           <a:xfrm>
-            <a:off x="6422400" y="3429000"/>
+            <a:off x="6480000" y="3429000"/>
             <a:ext cx="362583" cy="1297004"/>
           </a:xfrm>
           <a:prstGeom prst="rightBrace">
@@ -7675,8 +7927,8 @@
           </a:p>
         </p:txBody>
       </p:sp>
-      <mc:AlternateContent xmlns:mc="http://schemas.openxmlformats.org/markup-compatibility/2006">
-        <mc:Choice xmlns:a14="http://schemas.microsoft.com/office/drawing/2010/main" Requires="a14">
+      <mc:AlternateContent xmlns:mc="http://schemas.openxmlformats.org/markup-compatibility/2006" xmlns:a14="http://schemas.microsoft.com/office/drawing/2010/main">
+        <mc:Choice Requires="a14">
           <p:sp>
             <p:nvSpPr>
               <p:cNvPr id="7" name="Rectangle 6">
@@ -7714,7 +7966,7 @@
                       <m:sSub>
                         <m:sSubPr>
                           <m:ctrlPr>
-                            <a:rPr lang="fr-FR" smtClean="0">
+                            <a:rPr lang="fr-FR" i="1" smtClean="0">
                               <a:solidFill>
                                 <a:srgbClr val="66D9EF"/>
                               </a:solidFill>
@@ -7956,7 +8208,7 @@
             </p:txBody>
           </p:sp>
         </mc:Choice>
-        <mc:Fallback>
+        <mc:Fallback xmlns="">
           <p:sp>
             <p:nvSpPr>
               <p:cNvPr id="7" name="Rectangle 6">
@@ -8001,8 +8253,8 @@
           </p:sp>
         </mc:Fallback>
       </mc:AlternateContent>
-      <mc:AlternateContent xmlns:mc="http://schemas.openxmlformats.org/markup-compatibility/2006">
-        <mc:Choice xmlns:a14="http://schemas.microsoft.com/office/drawing/2010/main" Requires="a14">
+      <mc:AlternateContent xmlns:mc="http://schemas.openxmlformats.org/markup-compatibility/2006" xmlns:a14="http://schemas.microsoft.com/office/drawing/2010/main">
+        <mc:Choice Requires="a14">
           <p:sp>
             <p:nvSpPr>
               <p:cNvPr id="8" name="Rectangle 7">
@@ -8040,7 +8292,7 @@
                       <m:sSub>
                         <m:sSubPr>
                           <m:ctrlPr>
-                            <a:rPr lang="fr-FR" smtClean="0">
+                            <a:rPr lang="fr-FR" i="1" smtClean="0">
                               <a:solidFill>
                                 <a:srgbClr val="66D9EF"/>
                               </a:solidFill>
@@ -8289,7 +8541,7 @@
             </p:txBody>
           </p:sp>
         </mc:Choice>
-        <mc:Fallback>
+        <mc:Fallback xmlns="">
           <p:sp>
             <p:nvSpPr>
               <p:cNvPr id="8" name="Rectangle 7">
@@ -8318,6 +8570,190 @@
                   <a:fillRect/>
                 </a:stretch>
               </a:blipFill>
+            </p:spPr>
+            <p:txBody>
+              <a:bodyPr/>
+              <a:lstStyle/>
+              <a:p>
+                <a:r>
+                  <a:rPr lang="fr-FR">
+                    <a:noFill/>
+                  </a:rPr>
+                  <a:t> </a:t>
+                </a:r>
+              </a:p>
+            </p:txBody>
+          </p:sp>
+        </mc:Fallback>
+      </mc:AlternateContent>
+      <mc:AlternateContent xmlns:mc="http://schemas.openxmlformats.org/markup-compatibility/2006">
+        <mc:Choice xmlns:a14="http://schemas.microsoft.com/office/drawing/2010/main" Requires="a14">
+          <p:sp>
+            <p:nvSpPr>
+              <p:cNvPr id="12" name="ZoneTexte 11">
+                <a:extLst>
+                  <a:ext uri="{FF2B5EF4-FFF2-40B4-BE49-F238E27FC236}">
+                    <a16:creationId xmlns:a16="http://schemas.microsoft.com/office/drawing/2014/main" id="{1EE9A904-8A45-4A9B-9112-9B9ED33B8AA7}"/>
+                  </a:ext>
+                </a:extLst>
+              </p:cNvPr>
+              <p:cNvSpPr txBox="1"/>
+              <p:nvPr/>
+            </p:nvSpPr>
+            <p:spPr>
+              <a:xfrm>
+                <a:off x="8280000" y="180000"/>
+                <a:ext cx="3823354" cy="1200329"/>
+              </a:xfrm>
+              <a:prstGeom prst="rect">
+                <a:avLst/>
+              </a:prstGeom>
+              <a:noFill/>
+              <a:ln>
+                <a:solidFill>
+                  <a:schemeClr val="tx1"/>
+                </a:solidFill>
+              </a:ln>
+            </p:spPr>
+            <p:txBody>
+              <a:bodyPr wrap="none" rtlCol="0">
+                <a:spAutoFit/>
+              </a:bodyPr>
+              <a:lstStyle/>
+              <a:p>
+                <a:r>
+                  <a:rPr lang="fr-FR" dirty="0">
+                    <a:solidFill>
+                      <a:srgbClr val="64B164"/>
+                    </a:solidFill>
+                  </a:rPr>
+                  <a:t>n = nombre d’actions du fichier</a:t>
+                </a:r>
+              </a:p>
+              <a:p>
+                <a:r>
+                  <a:rPr lang="fr-FR" dirty="0">
+                    <a:solidFill>
+                      <a:srgbClr val="64B164"/>
+                    </a:solidFill>
+                  </a:rPr>
+                  <a:t>C</a:t>
+                </a:r>
+                <a:r>
+                  <a:rPr lang="fr-FR" baseline="-25000" dirty="0">
+                    <a:solidFill>
+                      <a:srgbClr val="64B164"/>
+                    </a:solidFill>
+                  </a:rPr>
+                  <a:t>i</a:t>
+                </a:r>
+                <a:r>
+                  <a:rPr lang="fr-FR" dirty="0">
+                    <a:solidFill>
+                      <a:srgbClr val="64B164"/>
+                    </a:solidFill>
+                  </a:rPr>
+                  <a:t> = Constante de la fonction i</a:t>
+                </a:r>
+              </a:p>
+              <a:p>
+                <a:r>
+                  <a:rPr lang="fr-FR" dirty="0">
+                    <a:solidFill>
+                      <a:srgbClr val="64B164"/>
+                    </a:solidFill>
+                  </a:rPr>
+                  <a:t>n</a:t>
+                </a:r>
+                <a:r>
+                  <a:rPr lang="fr-FR" baseline="-25000" dirty="0">
+                    <a:solidFill>
+                      <a:srgbClr val="64B164"/>
+                    </a:solidFill>
+                  </a:rPr>
+                  <a:t>a</a:t>
+                </a:r>
+                <a:r>
+                  <a:rPr lang="fr-FR" dirty="0">
+                    <a:solidFill>
+                      <a:srgbClr val="64B164"/>
+                    </a:solidFill>
+                  </a:rPr>
+                  <a:t> = nombre actions de la combinaison</a:t>
+                </a:r>
+              </a:p>
+              <a:p>
+                <a14:m>
+                  <m:oMath xmlns:m="http://schemas.openxmlformats.org/officeDocument/2006/math">
+                    <m:r>
+                      <a:rPr lang="fr-FR" i="1">
+                        <a:solidFill>
+                          <a:srgbClr val="64B164"/>
+                        </a:solidFill>
+                        <a:latin typeface="Cambria Math" panose="02040503050406030204" pitchFamily="18" charset="0"/>
+                      </a:rPr>
+                      <m:t>𝜖</m:t>
+                    </m:r>
+                    <m:r>
+                      <m:rPr>
+                        <m:sty m:val="p"/>
+                      </m:rPr>
+                      <a:rPr lang="fr-FR" b="0" i="0" baseline="-25000" smtClean="0">
+                        <a:solidFill>
+                          <a:srgbClr val="64B164"/>
+                        </a:solidFill>
+                        <a:latin typeface="Cambria Math" panose="02040503050406030204" pitchFamily="18" charset="0"/>
+                      </a:rPr>
+                      <m:t>i</m:t>
+                    </m:r>
+                  </m:oMath>
+                </a14:m>
+                <a:r>
+                  <a:rPr lang="fr-FR" dirty="0">
+                    <a:solidFill>
+                      <a:srgbClr val="64B164"/>
+                    </a:solidFill>
+                  </a:rPr>
+                  <a:t> = négligeables</a:t>
+                </a:r>
+              </a:p>
+            </p:txBody>
+          </p:sp>
+        </mc:Choice>
+        <mc:Fallback>
+          <p:sp>
+            <p:nvSpPr>
+              <p:cNvPr id="12" name="ZoneTexte 11">
+                <a:extLst>
+                  <a:ext uri="{FF2B5EF4-FFF2-40B4-BE49-F238E27FC236}">
+                    <a16:creationId xmlns:a16="http://schemas.microsoft.com/office/drawing/2014/main" id="{1EE9A904-8A45-4A9B-9112-9B9ED33B8AA7}"/>
+                  </a:ext>
+                </a:extLst>
+              </p:cNvPr>
+              <p:cNvSpPr txBox="1">
+                <a:spLocks noRot="1" noChangeAspect="1" noMove="1" noResize="1" noEditPoints="1" noAdjustHandles="1" noChangeArrowheads="1" noChangeShapeType="1" noTextEdit="1"/>
+              </p:cNvSpPr>
+              <p:nvPr/>
+            </p:nvSpPr>
+            <p:spPr>
+              <a:xfrm>
+                <a:off x="8280000" y="180000"/>
+                <a:ext cx="3823354" cy="1200329"/>
+              </a:xfrm>
+              <a:prstGeom prst="rect">
+                <a:avLst/>
+              </a:prstGeom>
+              <a:blipFill>
+                <a:blip r:embed="rId5"/>
+                <a:stretch>
+                  <a:fillRect l="-1113" t="-2525" r="-795" b="-7071"/>
+                </a:stretch>
+              </a:blipFill>
+              <a:ln>
+                <a:solidFill>
+                  <a:schemeClr val="tx1"/>
+                </a:solidFill>
+              </a:ln>
             </p:spPr>
             <p:txBody>
               <a:bodyPr/>
@@ -8386,14 +8822,13 @@
               </a:ext>
             </a:extLst>
           </a:blip>
-          <a:stretch>
-            <a:fillRect/>
-          </a:stretch>
+          <a:srcRect/>
+          <a:stretch/>
         </p:blipFill>
         <p:spPr>
           <a:xfrm>
             <a:off x="360000" y="1440000"/>
-            <a:ext cx="7539169" cy="1792168"/>
+            <a:ext cx="6363000" cy="5040000"/>
           </a:xfrm>
           <a:prstGeom prst="rect">
             <a:avLst/>
@@ -8477,7 +8912,7 @@
         </p:nvSpPr>
         <p:spPr>
           <a:xfrm>
-            <a:off x="6422400" y="1707086"/>
+            <a:off x="6480000" y="1707086"/>
             <a:ext cx="362583" cy="628998"/>
           </a:xfrm>
           <a:prstGeom prst="rightBrace">
@@ -8529,8 +8964,8 @@
         </p:nvSpPr>
         <p:spPr>
           <a:xfrm>
-            <a:off x="2286804" y="3268327"/>
-            <a:ext cx="3616375" cy="369332"/>
+            <a:off x="2160000" y="3420000"/>
+            <a:ext cx="3892540" cy="369332"/>
           </a:xfrm>
           <a:prstGeom prst="rect">
             <a:avLst/>
@@ -8549,29 +8984,13 @@
                   <a:srgbClr val="64B164"/>
                 </a:solidFill>
               </a:rPr>
-              <a:t>Soit, pour l’ensemble du </a:t>
-            </a:r>
-            <a:r>
-              <a:rPr lang="fr-FR" dirty="0" err="1">
-                <a:solidFill>
-                  <a:srgbClr val="64B164"/>
-                </a:solidFill>
-              </a:rPr>
-              <a:t>bruteforce</a:t>
-            </a:r>
-            <a:r>
-              <a:rPr lang="fr-FR" dirty="0">
-                <a:solidFill>
-                  <a:srgbClr val="64B164"/>
-                </a:solidFill>
-              </a:rPr>
-              <a:t> :</a:t>
+              <a:t>Soit, pour l’ensemble de bruteforce.py :</a:t>
             </a:r>
           </a:p>
         </p:txBody>
       </p:sp>
-      <mc:AlternateContent xmlns:mc="http://schemas.openxmlformats.org/markup-compatibility/2006">
-        <mc:Choice xmlns:a14="http://schemas.microsoft.com/office/drawing/2010/main" Requires="a14">
+      <mc:AlternateContent xmlns:mc="http://schemas.openxmlformats.org/markup-compatibility/2006" xmlns:a14="http://schemas.microsoft.com/office/drawing/2010/main">
+        <mc:Choice Requires="a14">
           <p:sp>
             <p:nvSpPr>
               <p:cNvPr id="13" name="Rectangle 12">
@@ -8609,7 +9028,7 @@
                       <m:sSub>
                         <m:sSubPr>
                           <m:ctrlPr>
-                            <a:rPr lang="fr-FR" smtClean="0">
+                            <a:rPr lang="fr-FR" i="1" smtClean="0">
                               <a:solidFill>
                                 <a:srgbClr val="66D9EF"/>
                               </a:solidFill>
@@ -8815,7 +9234,7 @@
             </p:txBody>
           </p:sp>
         </mc:Choice>
-        <mc:Fallback>
+        <mc:Fallback xmlns="">
           <p:sp>
             <p:nvSpPr>
               <p:cNvPr id="13" name="Rectangle 12">
@@ -8876,7 +9295,7 @@
             </p:nvSpPr>
             <p:spPr>
               <a:xfrm>
-                <a:off x="1943100" y="3816329"/>
+                <a:off x="1943100" y="3960000"/>
                 <a:ext cx="8305800" cy="388696"/>
               </a:xfrm>
               <a:prstGeom prst="rect">
@@ -9481,7 +9900,7 @@
             </p:nvSpPr>
             <p:spPr>
               <a:xfrm>
-                <a:off x="1943100" y="3816329"/>
+                <a:off x="1943100" y="3960000"/>
                 <a:ext cx="8305800" cy="388696"/>
               </a:xfrm>
               <a:prstGeom prst="rect">
@@ -9525,7 +9944,7 @@
             </p:nvSpPr>
             <p:spPr>
               <a:xfrm>
-                <a:off x="5486827" y="4660446"/>
+                <a:off x="5486827" y="4680000"/>
                 <a:ext cx="1218346" cy="388696"/>
               </a:xfrm>
               <a:prstGeom prst="rect">
@@ -9675,7 +10094,7 @@
             </p:nvSpPr>
             <p:spPr>
               <a:xfrm>
-                <a:off x="5486827" y="4660446"/>
+                <a:off x="5486827" y="4680000"/>
                 <a:ext cx="1218346" cy="388696"/>
               </a:xfrm>
               <a:prstGeom prst="rect">
@@ -9690,6 +10109,190 @@
               <a:ln>
                 <a:solidFill>
                   <a:srgbClr val="66D9EF"/>
+                </a:solidFill>
+              </a:ln>
+            </p:spPr>
+            <p:txBody>
+              <a:bodyPr/>
+              <a:lstStyle/>
+              <a:p>
+                <a:r>
+                  <a:rPr lang="fr-FR">
+                    <a:noFill/>
+                  </a:rPr>
+                  <a:t> </a:t>
+                </a:r>
+              </a:p>
+            </p:txBody>
+          </p:sp>
+        </mc:Fallback>
+      </mc:AlternateContent>
+      <mc:AlternateContent xmlns:mc="http://schemas.openxmlformats.org/markup-compatibility/2006">
+        <mc:Choice xmlns:a14="http://schemas.microsoft.com/office/drawing/2010/main" Requires="a14">
+          <p:sp>
+            <p:nvSpPr>
+              <p:cNvPr id="12" name="ZoneTexte 11">
+                <a:extLst>
+                  <a:ext uri="{FF2B5EF4-FFF2-40B4-BE49-F238E27FC236}">
+                    <a16:creationId xmlns:a16="http://schemas.microsoft.com/office/drawing/2014/main" id="{0354648E-A361-4C82-86E0-C07158188A80}"/>
+                  </a:ext>
+                </a:extLst>
+              </p:cNvPr>
+              <p:cNvSpPr txBox="1"/>
+              <p:nvPr/>
+            </p:nvSpPr>
+            <p:spPr>
+              <a:xfrm>
+                <a:off x="8280000" y="180000"/>
+                <a:ext cx="3823354" cy="1200329"/>
+              </a:xfrm>
+              <a:prstGeom prst="rect">
+                <a:avLst/>
+              </a:prstGeom>
+              <a:noFill/>
+              <a:ln>
+                <a:solidFill>
+                  <a:schemeClr val="tx1"/>
+                </a:solidFill>
+              </a:ln>
+            </p:spPr>
+            <p:txBody>
+              <a:bodyPr wrap="none" rtlCol="0">
+                <a:spAutoFit/>
+              </a:bodyPr>
+              <a:lstStyle/>
+              <a:p>
+                <a:r>
+                  <a:rPr lang="fr-FR" dirty="0">
+                    <a:solidFill>
+                      <a:srgbClr val="64B164"/>
+                    </a:solidFill>
+                  </a:rPr>
+                  <a:t>n = nombre d’actions du fichier</a:t>
+                </a:r>
+              </a:p>
+              <a:p>
+                <a:r>
+                  <a:rPr lang="fr-FR" dirty="0">
+                    <a:solidFill>
+                      <a:srgbClr val="64B164"/>
+                    </a:solidFill>
+                  </a:rPr>
+                  <a:t>C</a:t>
+                </a:r>
+                <a:r>
+                  <a:rPr lang="fr-FR" baseline="-25000" dirty="0">
+                    <a:solidFill>
+                      <a:srgbClr val="64B164"/>
+                    </a:solidFill>
+                  </a:rPr>
+                  <a:t>i</a:t>
+                </a:r>
+                <a:r>
+                  <a:rPr lang="fr-FR" dirty="0">
+                    <a:solidFill>
+                      <a:srgbClr val="64B164"/>
+                    </a:solidFill>
+                  </a:rPr>
+                  <a:t> = Constante de la fonction i</a:t>
+                </a:r>
+              </a:p>
+              <a:p>
+                <a:r>
+                  <a:rPr lang="fr-FR" dirty="0">
+                    <a:solidFill>
+                      <a:srgbClr val="64B164"/>
+                    </a:solidFill>
+                  </a:rPr>
+                  <a:t>n</a:t>
+                </a:r>
+                <a:r>
+                  <a:rPr lang="fr-FR" baseline="-25000" dirty="0">
+                    <a:solidFill>
+                      <a:srgbClr val="64B164"/>
+                    </a:solidFill>
+                  </a:rPr>
+                  <a:t>a</a:t>
+                </a:r>
+                <a:r>
+                  <a:rPr lang="fr-FR" dirty="0">
+                    <a:solidFill>
+                      <a:srgbClr val="64B164"/>
+                    </a:solidFill>
+                  </a:rPr>
+                  <a:t> = nombre actions de la combinaison</a:t>
+                </a:r>
+              </a:p>
+              <a:p>
+                <a14:m>
+                  <m:oMath xmlns:m="http://schemas.openxmlformats.org/officeDocument/2006/math">
+                    <m:r>
+                      <a:rPr lang="fr-FR" i="1">
+                        <a:solidFill>
+                          <a:srgbClr val="64B164"/>
+                        </a:solidFill>
+                        <a:latin typeface="Cambria Math" panose="02040503050406030204" pitchFamily="18" charset="0"/>
+                      </a:rPr>
+                      <m:t>𝜖</m:t>
+                    </m:r>
+                    <m:r>
+                      <m:rPr>
+                        <m:sty m:val="p"/>
+                      </m:rPr>
+                      <a:rPr lang="fr-FR" b="0" i="0" baseline="-25000" smtClean="0">
+                        <a:solidFill>
+                          <a:srgbClr val="64B164"/>
+                        </a:solidFill>
+                        <a:latin typeface="Cambria Math" panose="02040503050406030204" pitchFamily="18" charset="0"/>
+                      </a:rPr>
+                      <m:t>i</m:t>
+                    </m:r>
+                  </m:oMath>
+                </a14:m>
+                <a:r>
+                  <a:rPr lang="fr-FR" dirty="0">
+                    <a:solidFill>
+                      <a:srgbClr val="64B164"/>
+                    </a:solidFill>
+                  </a:rPr>
+                  <a:t> = négligeables</a:t>
+                </a:r>
+              </a:p>
+            </p:txBody>
+          </p:sp>
+        </mc:Choice>
+        <mc:Fallback>
+          <p:sp>
+            <p:nvSpPr>
+              <p:cNvPr id="12" name="ZoneTexte 11">
+                <a:extLst>
+                  <a:ext uri="{FF2B5EF4-FFF2-40B4-BE49-F238E27FC236}">
+                    <a16:creationId xmlns:a16="http://schemas.microsoft.com/office/drawing/2014/main" id="{0354648E-A361-4C82-86E0-C07158188A80}"/>
+                  </a:ext>
+                </a:extLst>
+              </p:cNvPr>
+              <p:cNvSpPr txBox="1">
+                <a:spLocks noRot="1" noChangeAspect="1" noMove="1" noResize="1" noEditPoints="1" noAdjustHandles="1" noChangeArrowheads="1" noChangeShapeType="1" noTextEdit="1"/>
+              </p:cNvSpPr>
+              <p:nvPr/>
+            </p:nvSpPr>
+            <p:spPr>
+              <a:xfrm>
+                <a:off x="8280000" y="180000"/>
+                <a:ext cx="3823354" cy="1200329"/>
+              </a:xfrm>
+              <a:prstGeom prst="rect">
+                <a:avLst/>
+              </a:prstGeom>
+              <a:blipFill>
+                <a:blip r:embed="rId6"/>
+                <a:stretch>
+                  <a:fillRect l="-1113" t="-2525" r="-795" b="-7071"/>
+                </a:stretch>
+              </a:blipFill>
+              <a:ln>
+                <a:solidFill>
+                  <a:schemeClr val="tx1"/>
                 </a:solidFill>
               </a:ln>
             </p:spPr>
@@ -9848,7 +10451,7 @@
             <p:spPr>
               <a:xfrm>
                 <a:off x="8277765" y="3623461"/>
-                <a:ext cx="3214085" cy="369332"/>
+                <a:ext cx="3097066" cy="369332"/>
               </a:xfrm>
               <a:prstGeom prst="rect">
                 <a:avLst/>
@@ -9862,20 +10465,33 @@
               <a:lstStyle/>
               <a:p>
                 <a:r>
-                  <a:rPr lang="fr-FR" dirty="0"/>
+                  <a:rPr lang="fr-FR" dirty="0">
+                    <a:solidFill>
+                      <a:srgbClr val="64B164"/>
+                    </a:solidFill>
+                  </a:rPr>
                   <a:t>Complexité temporelle </a:t>
                 </a:r>
                 <a14:m>
                   <m:oMath xmlns:m="http://schemas.openxmlformats.org/officeDocument/2006/math">
                     <m:r>
-                      <a:rPr lang="fr-FR" i="1"/>
+                      <a:rPr lang="fr-FR" i="1">
+                        <a:solidFill>
+                          <a:srgbClr val="64B164"/>
+                        </a:solidFill>
+                        <a:latin typeface="Cambria Math" panose="02040503050406030204" pitchFamily="18" charset="0"/>
+                      </a:rPr>
                       <m:t>~</m:t>
                     </m:r>
                   </m:oMath>
                 </a14:m>
                 <a:r>
-                  <a:rPr lang="fr-FR" dirty="0"/>
-                  <a:t> 10,37s</a:t>
+                  <a:rPr lang="fr-FR" dirty="0">
+                    <a:solidFill>
+                      <a:srgbClr val="64B164"/>
+                    </a:solidFill>
+                  </a:rPr>
+                  <a:t> 7,64s</a:t>
                 </a:r>
               </a:p>
             </p:txBody>
@@ -9899,7 +10515,7 @@
             <p:spPr>
               <a:xfrm>
                 <a:off x="8277765" y="3623461"/>
-                <a:ext cx="3214085" cy="369332"/>
+                <a:ext cx="3097066" cy="369332"/>
               </a:xfrm>
               <a:prstGeom prst="rect">
                 <a:avLst/>
@@ -9907,7 +10523,7 @@
               <a:blipFill>
                 <a:blip r:embed="rId3"/>
                 <a:stretch>
-                  <a:fillRect l="-1708" t="-8197" r="-759" b="-24590"/>
+                  <a:fillRect l="-1772" t="-8197" r="-787" b="-24590"/>
                 </a:stretch>
               </a:blipFill>
             </p:spPr>
@@ -9956,6 +10572,41 @@
           <a:chExt cx="0" cy="0"/>
         </a:xfrm>
       </p:grpSpPr>
+      <p:pic>
+        <p:nvPicPr>
+          <p:cNvPr id="5" name="Image 4">
+            <a:extLst>
+              <a:ext uri="{FF2B5EF4-FFF2-40B4-BE49-F238E27FC236}">
+                <a16:creationId xmlns:a16="http://schemas.microsoft.com/office/drawing/2014/main" id="{253DCC93-79D0-418D-A552-D8360A16F221}"/>
+              </a:ext>
+            </a:extLst>
+          </p:cNvPr>
+          <p:cNvPicPr>
+            <a:picLocks noChangeAspect="1"/>
+          </p:cNvPicPr>
+          <p:nvPr/>
+        </p:nvPicPr>
+        <p:blipFill>
+          <a:blip r:embed="rId2">
+            <a:extLst>
+              <a:ext uri="{28A0092B-C50C-407E-A947-70E740481C1C}">
+                <a14:useLocalDpi xmlns:a14="http://schemas.microsoft.com/office/drawing/2010/main" val="0"/>
+              </a:ext>
+            </a:extLst>
+          </a:blip>
+          <a:srcRect/>
+          <a:stretch/>
+        </p:blipFill>
+        <p:spPr>
+          <a:xfrm>
+            <a:off x="360000" y="1440000"/>
+            <a:ext cx="8484000" cy="5040000"/>
+          </a:xfrm>
+          <a:prstGeom prst="rect">
+            <a:avLst/>
+          </a:prstGeom>
+        </p:spPr>
+      </p:pic>
       <p:sp>
         <p:nvSpPr>
           <p:cNvPr id="2" name="Titre 1">
@@ -9979,7 +10630,7 @@
           <a:p>
             <a:r>
               <a:rPr lang="fr-FR" dirty="0"/>
-              <a:t>optimized.py =&gt; Pseudocode/diagrammes</a:t>
+              <a:t>optimized.py =&gt; Pseudocode</a:t>
             </a:r>
           </a:p>
         </p:txBody>
@@ -10014,6 +10665,956 @@
           </a:p>
         </p:txBody>
       </p:sp>
+      <p:sp>
+        <p:nvSpPr>
+          <p:cNvPr id="6" name="Accolade fermante 5">
+            <a:extLst>
+              <a:ext uri="{FF2B5EF4-FFF2-40B4-BE49-F238E27FC236}">
+                <a16:creationId xmlns:a16="http://schemas.microsoft.com/office/drawing/2014/main" id="{BDF7350B-B9E5-4AEE-A58A-3C6FF7161BA5}"/>
+              </a:ext>
+            </a:extLst>
+          </p:cNvPr>
+          <p:cNvSpPr/>
+          <p:nvPr/>
+        </p:nvSpPr>
+        <p:spPr>
+          <a:xfrm>
+            <a:off x="6480000" y="2451063"/>
+            <a:ext cx="362583" cy="1325563"/>
+          </a:xfrm>
+          <a:prstGeom prst="rightBrace">
+            <a:avLst>
+              <a:gd name="adj1" fmla="val 6862"/>
+              <a:gd name="adj2" fmla="val 51471"/>
+            </a:avLst>
+          </a:prstGeom>
+          <a:ln w="15875">
+            <a:solidFill>
+              <a:srgbClr val="64B164"/>
+            </a:solidFill>
+          </a:ln>
+        </p:spPr>
+        <p:style>
+          <a:lnRef idx="1">
+            <a:schemeClr val="accent1"/>
+          </a:lnRef>
+          <a:fillRef idx="0">
+            <a:schemeClr val="accent1"/>
+          </a:fillRef>
+          <a:effectRef idx="0">
+            <a:schemeClr val="accent1"/>
+          </a:effectRef>
+          <a:fontRef idx="minor">
+            <a:schemeClr val="tx1"/>
+          </a:fontRef>
+        </p:style>
+        <p:txBody>
+          <a:bodyPr rtlCol="0" anchor="ctr"/>
+          <a:lstStyle/>
+          <a:p>
+            <a:pPr algn="ctr"/>
+            <a:endParaRPr lang="fr-FR"/>
+          </a:p>
+        </p:txBody>
+      </p:sp>
+      <p:sp>
+        <p:nvSpPr>
+          <p:cNvPr id="7" name="Accolade fermante 6">
+            <a:extLst>
+              <a:ext uri="{FF2B5EF4-FFF2-40B4-BE49-F238E27FC236}">
+                <a16:creationId xmlns:a16="http://schemas.microsoft.com/office/drawing/2014/main" id="{935385AE-07F7-4124-B596-59E0CD1310D5}"/>
+              </a:ext>
+            </a:extLst>
+          </p:cNvPr>
+          <p:cNvSpPr/>
+          <p:nvPr/>
+        </p:nvSpPr>
+        <p:spPr>
+          <a:xfrm>
+            <a:off x="6480000" y="4255545"/>
+            <a:ext cx="362583" cy="499335"/>
+          </a:xfrm>
+          <a:prstGeom prst="rightBrace">
+            <a:avLst>
+              <a:gd name="adj1" fmla="val 6862"/>
+              <a:gd name="adj2" fmla="val 51471"/>
+            </a:avLst>
+          </a:prstGeom>
+          <a:ln w="15875">
+            <a:solidFill>
+              <a:srgbClr val="64B164"/>
+            </a:solidFill>
+          </a:ln>
+        </p:spPr>
+        <p:style>
+          <a:lnRef idx="1">
+            <a:schemeClr val="accent1"/>
+          </a:lnRef>
+          <a:fillRef idx="0">
+            <a:schemeClr val="accent1"/>
+          </a:fillRef>
+          <a:effectRef idx="0">
+            <a:schemeClr val="accent1"/>
+          </a:effectRef>
+          <a:fontRef idx="minor">
+            <a:schemeClr val="tx1"/>
+          </a:fontRef>
+        </p:style>
+        <p:txBody>
+          <a:bodyPr rtlCol="0" anchor="ctr"/>
+          <a:lstStyle/>
+          <a:p>
+            <a:pPr algn="ctr"/>
+            <a:endParaRPr lang="fr-FR"/>
+          </a:p>
+        </p:txBody>
+      </p:sp>
+      <mc:AlternateContent xmlns:mc="http://schemas.openxmlformats.org/markup-compatibility/2006">
+        <mc:Choice xmlns:a14="http://schemas.microsoft.com/office/drawing/2010/main" Requires="a14">
+          <p:sp>
+            <p:nvSpPr>
+              <p:cNvPr id="9" name="Rectangle 8">
+                <a:extLst>
+                  <a:ext uri="{FF2B5EF4-FFF2-40B4-BE49-F238E27FC236}">
+                    <a16:creationId xmlns:a16="http://schemas.microsoft.com/office/drawing/2014/main" id="{A636D2CD-4D40-4DD8-BE1A-F0C7EA3D13EF}"/>
+                  </a:ext>
+                </a:extLst>
+              </p:cNvPr>
+              <p:cNvSpPr/>
+              <p:nvPr/>
+            </p:nvSpPr>
+            <p:spPr>
+              <a:xfrm>
+                <a:off x="7020000" y="2929178"/>
+                <a:ext cx="2945230" cy="369332"/>
+              </a:xfrm>
+              <a:prstGeom prst="rect">
+                <a:avLst/>
+              </a:prstGeom>
+            </p:spPr>
+            <p:txBody>
+              <a:bodyPr wrap="none">
+                <a:spAutoFit/>
+              </a:bodyPr>
+              <a:lstStyle/>
+              <a:p>
+                <a:pPr/>
+                <a14:m>
+                  <m:oMathPara xmlns:m="http://schemas.openxmlformats.org/officeDocument/2006/math">
+                    <m:oMathParaPr>
+                      <m:jc m:val="left"/>
+                    </m:oMathParaPr>
+                    <m:oMath xmlns:m="http://schemas.openxmlformats.org/officeDocument/2006/math">
+                      <m:sSub>
+                        <m:sSubPr>
+                          <m:ctrlPr>
+                            <a:rPr lang="fr-FR" smtClean="0">
+                              <a:solidFill>
+                                <a:srgbClr val="66D9EF"/>
+                              </a:solidFill>
+                              <a:latin typeface="Cambria Math" panose="02040503050406030204" pitchFamily="18" charset="0"/>
+                            </a:rPr>
+                          </m:ctrlPr>
+                        </m:sSubPr>
+                        <m:e>
+                          <m:r>
+                            <m:rPr>
+                              <m:sty m:val="p"/>
+                            </m:rPr>
+                            <a:rPr lang="fr-FR">
+                              <a:solidFill>
+                                <a:srgbClr val="66D9EF"/>
+                              </a:solidFill>
+                              <a:latin typeface="Cambria Math" panose="02040503050406030204" pitchFamily="18" charset="0"/>
+                            </a:rPr>
+                            <m:t>Ο</m:t>
+                          </m:r>
+                        </m:e>
+                        <m:sub>
+                          <m:r>
+                            <a:rPr lang="fr-FR" i="0">
+                              <a:solidFill>
+                                <a:srgbClr val="66D9EF"/>
+                              </a:solidFill>
+                              <a:latin typeface="Cambria Math" panose="02040503050406030204" pitchFamily="18" charset="0"/>
+                            </a:rPr>
+                            <m:t>1</m:t>
+                          </m:r>
+                        </m:sub>
+                      </m:sSub>
+                      <m:d>
+                        <m:dPr>
+                          <m:ctrlPr>
+                            <a:rPr lang="fr-FR" i="1">
+                              <a:solidFill>
+                                <a:srgbClr val="66D9EF"/>
+                              </a:solidFill>
+                              <a:latin typeface="Cambria Math" panose="02040503050406030204" pitchFamily="18" charset="0"/>
+                            </a:rPr>
+                          </m:ctrlPr>
+                        </m:dPr>
+                        <m:e>
+                          <m:r>
+                            <a:rPr lang="fr-FR" i="1">
+                              <a:solidFill>
+                                <a:srgbClr val="66D9EF"/>
+                              </a:solidFill>
+                              <a:latin typeface="Cambria Math" panose="02040503050406030204" pitchFamily="18" charset="0"/>
+                            </a:rPr>
+                            <m:t>𝑛</m:t>
+                          </m:r>
+                          <m:r>
+                            <a:rPr lang="fr-FR" i="0">
+                              <a:solidFill>
+                                <a:srgbClr val="66D9EF"/>
+                              </a:solidFill>
+                              <a:latin typeface="Cambria Math" panose="02040503050406030204" pitchFamily="18" charset="0"/>
+                            </a:rPr>
+                            <m:t>+</m:t>
+                          </m:r>
+                          <m:sSub>
+                            <m:sSubPr>
+                              <m:ctrlPr>
+                                <a:rPr lang="fr-FR" i="1">
+                                  <a:solidFill>
+                                    <a:srgbClr val="66D9EF"/>
+                                  </a:solidFill>
+                                  <a:latin typeface="Cambria Math" panose="02040503050406030204" pitchFamily="18" charset="0"/>
+                                </a:rPr>
+                              </m:ctrlPr>
+                            </m:sSubPr>
+                            <m:e>
+                              <m:r>
+                                <a:rPr lang="fr-FR" i="1">
+                                  <a:solidFill>
+                                    <a:srgbClr val="66D9EF"/>
+                                  </a:solidFill>
+                                  <a:latin typeface="Cambria Math" panose="02040503050406030204" pitchFamily="18" charset="0"/>
+                                </a:rPr>
+                                <m:t>𝐶</m:t>
+                              </m:r>
+                            </m:e>
+                            <m:sub>
+                              <m:r>
+                                <a:rPr lang="fr-FR" i="0">
+                                  <a:solidFill>
+                                    <a:srgbClr val="66D9EF"/>
+                                  </a:solidFill>
+                                  <a:latin typeface="Cambria Math" panose="02040503050406030204" pitchFamily="18" charset="0"/>
+                                </a:rPr>
+                                <m:t>1</m:t>
+                              </m:r>
+                            </m:sub>
+                          </m:sSub>
+                        </m:e>
+                      </m:d>
+                      <m:r>
+                        <a:rPr lang="fr-FR" i="0">
+                          <a:solidFill>
+                            <a:srgbClr val="66D9EF"/>
+                          </a:solidFill>
+                          <a:latin typeface="Cambria Math" panose="02040503050406030204" pitchFamily="18" charset="0"/>
+                        </a:rPr>
+                        <m:t>  =   </m:t>
+                      </m:r>
+                      <m:sSub>
+                        <m:sSubPr>
+                          <m:ctrlPr>
+                            <a:rPr lang="fr-FR" i="1">
+                              <a:solidFill>
+                                <a:srgbClr val="66D9EF"/>
+                              </a:solidFill>
+                              <a:latin typeface="Cambria Math" panose="02040503050406030204" pitchFamily="18" charset="0"/>
+                            </a:rPr>
+                          </m:ctrlPr>
+                        </m:sSubPr>
+                        <m:e>
+                          <m:r>
+                            <m:rPr>
+                              <m:sty m:val="p"/>
+                            </m:rPr>
+                            <a:rPr lang="fr-FR" i="0">
+                              <a:solidFill>
+                                <a:srgbClr val="66D9EF"/>
+                              </a:solidFill>
+                              <a:latin typeface="Cambria Math" panose="02040503050406030204" pitchFamily="18" charset="0"/>
+                            </a:rPr>
+                            <m:t>Ο</m:t>
+                          </m:r>
+                        </m:e>
+                        <m:sub>
+                          <m:r>
+                            <a:rPr lang="fr-FR" i="0">
+                              <a:solidFill>
+                                <a:srgbClr val="66D9EF"/>
+                              </a:solidFill>
+                              <a:latin typeface="Cambria Math" panose="02040503050406030204" pitchFamily="18" charset="0"/>
+                            </a:rPr>
+                            <m:t>1</m:t>
+                          </m:r>
+                        </m:sub>
+                      </m:sSub>
+                      <m:d>
+                        <m:dPr>
+                          <m:ctrlPr>
+                            <a:rPr lang="fr-FR" i="1">
+                              <a:solidFill>
+                                <a:srgbClr val="66D9EF"/>
+                              </a:solidFill>
+                              <a:latin typeface="Cambria Math" panose="02040503050406030204" pitchFamily="18" charset="0"/>
+                            </a:rPr>
+                          </m:ctrlPr>
+                        </m:dPr>
+                        <m:e>
+                          <m:r>
+                            <a:rPr lang="fr-FR" i="1">
+                              <a:solidFill>
+                                <a:srgbClr val="66D9EF"/>
+                              </a:solidFill>
+                              <a:latin typeface="Cambria Math" panose="02040503050406030204" pitchFamily="18" charset="0"/>
+                            </a:rPr>
+                            <m:t>𝑛</m:t>
+                          </m:r>
+                        </m:e>
+                      </m:d>
+                      <m:r>
+                        <a:rPr lang="fr-FR" i="0">
+                          <a:solidFill>
+                            <a:srgbClr val="66D9EF"/>
+                          </a:solidFill>
+                          <a:latin typeface="Cambria Math" panose="02040503050406030204" pitchFamily="18" charset="0"/>
+                        </a:rPr>
+                        <m:t>+</m:t>
+                      </m:r>
+                      <m:sSub>
+                        <m:sSubPr>
+                          <m:ctrlPr>
+                            <a:rPr lang="fr-FR" i="1">
+                              <a:solidFill>
+                                <a:srgbClr val="66D9EF"/>
+                              </a:solidFill>
+                              <a:latin typeface="Cambria Math" panose="02040503050406030204" pitchFamily="18" charset="0"/>
+                            </a:rPr>
+                          </m:ctrlPr>
+                        </m:sSubPr>
+                        <m:e>
+                          <m:r>
+                            <a:rPr lang="fr-FR" i="1">
+                              <a:solidFill>
+                                <a:srgbClr val="66D9EF"/>
+                              </a:solidFill>
+                              <a:latin typeface="Cambria Math" panose="02040503050406030204" pitchFamily="18" charset="0"/>
+                            </a:rPr>
+                            <m:t>𝜖</m:t>
+                          </m:r>
+                        </m:e>
+                        <m:sub>
+                          <m:r>
+                            <a:rPr lang="fr-FR" i="0">
+                              <a:solidFill>
+                                <a:srgbClr val="66D9EF"/>
+                              </a:solidFill>
+                              <a:latin typeface="Cambria Math" panose="02040503050406030204" pitchFamily="18" charset="0"/>
+                            </a:rPr>
+                            <m:t>1</m:t>
+                          </m:r>
+                        </m:sub>
+                      </m:sSub>
+                    </m:oMath>
+                  </m:oMathPara>
+                </a14:m>
+                <a:endParaRPr lang="fr-FR" dirty="0">
+                  <a:solidFill>
+                    <a:srgbClr val="66D9EF"/>
+                  </a:solidFill>
+                </a:endParaRPr>
+              </a:p>
+            </p:txBody>
+          </p:sp>
+        </mc:Choice>
+        <mc:Fallback>
+          <p:sp>
+            <p:nvSpPr>
+              <p:cNvPr id="9" name="Rectangle 8">
+                <a:extLst>
+                  <a:ext uri="{FF2B5EF4-FFF2-40B4-BE49-F238E27FC236}">
+                    <a16:creationId xmlns:a16="http://schemas.microsoft.com/office/drawing/2014/main" id="{A636D2CD-4D40-4DD8-BE1A-F0C7EA3D13EF}"/>
+                  </a:ext>
+                </a:extLst>
+              </p:cNvPr>
+              <p:cNvSpPr>
+                <a:spLocks noRot="1" noChangeAspect="1" noMove="1" noResize="1" noEditPoints="1" noAdjustHandles="1" noChangeArrowheads="1" noChangeShapeType="1" noTextEdit="1"/>
+              </p:cNvSpPr>
+              <p:nvPr/>
+            </p:nvSpPr>
+            <p:spPr>
+              <a:xfrm>
+                <a:off x="7020000" y="2929178"/>
+                <a:ext cx="2945230" cy="369332"/>
+              </a:xfrm>
+              <a:prstGeom prst="rect">
+                <a:avLst/>
+              </a:prstGeom>
+              <a:blipFill>
+                <a:blip r:embed="rId3"/>
+                <a:stretch>
+                  <a:fillRect/>
+                </a:stretch>
+              </a:blipFill>
+            </p:spPr>
+            <p:txBody>
+              <a:bodyPr/>
+              <a:lstStyle/>
+              <a:p>
+                <a:r>
+                  <a:rPr lang="fr-FR">
+                    <a:noFill/>
+                  </a:rPr>
+                  <a:t> </a:t>
+                </a:r>
+              </a:p>
+            </p:txBody>
+          </p:sp>
+        </mc:Fallback>
+      </mc:AlternateContent>
+      <mc:AlternateContent xmlns:mc="http://schemas.openxmlformats.org/markup-compatibility/2006">
+        <mc:Choice xmlns:a14="http://schemas.microsoft.com/office/drawing/2010/main" Requires="a14">
+          <p:sp>
+            <p:nvSpPr>
+              <p:cNvPr id="10" name="Rectangle 9">
+                <a:extLst>
+                  <a:ext uri="{FF2B5EF4-FFF2-40B4-BE49-F238E27FC236}">
+                    <a16:creationId xmlns:a16="http://schemas.microsoft.com/office/drawing/2014/main" id="{B7F994D7-778A-441B-A759-16F074E9EF39}"/>
+                  </a:ext>
+                </a:extLst>
+              </p:cNvPr>
+              <p:cNvSpPr/>
+              <p:nvPr/>
+            </p:nvSpPr>
+            <p:spPr>
+              <a:xfrm>
+                <a:off x="7020000" y="4302720"/>
+                <a:ext cx="4312784" cy="404983"/>
+              </a:xfrm>
+              <a:prstGeom prst="rect">
+                <a:avLst/>
+              </a:prstGeom>
+            </p:spPr>
+            <p:txBody>
+              <a:bodyPr wrap="none">
+                <a:spAutoFit/>
+              </a:bodyPr>
+              <a:lstStyle/>
+              <a:p>
+                <a:pPr/>
+                <a14:m>
+                  <m:oMathPara xmlns:m="http://schemas.openxmlformats.org/officeDocument/2006/math">
+                    <m:oMathParaPr>
+                      <m:jc m:val="left"/>
+                    </m:oMathParaPr>
+                    <m:oMath xmlns:m="http://schemas.openxmlformats.org/officeDocument/2006/math">
+                      <m:sSub>
+                        <m:sSubPr>
+                          <m:ctrlPr>
+                            <a:rPr lang="fr-FR" smtClean="0">
+                              <a:solidFill>
+                                <a:srgbClr val="66D9EF"/>
+                              </a:solidFill>
+                              <a:latin typeface="Cambria Math" panose="02040503050406030204" pitchFamily="18" charset="0"/>
+                            </a:rPr>
+                          </m:ctrlPr>
+                        </m:sSubPr>
+                        <m:e>
+                          <m:r>
+                            <m:rPr>
+                              <m:sty m:val="p"/>
+                            </m:rPr>
+                            <a:rPr lang="fr-FR">
+                              <a:solidFill>
+                                <a:srgbClr val="66D9EF"/>
+                              </a:solidFill>
+                              <a:latin typeface="Cambria Math" panose="02040503050406030204" pitchFamily="18" charset="0"/>
+                            </a:rPr>
+                            <m:t>Ο</m:t>
+                          </m:r>
+                        </m:e>
+                        <m:sub>
+                          <m:r>
+                            <a:rPr lang="fr-FR" i="0">
+                              <a:solidFill>
+                                <a:srgbClr val="66D9EF"/>
+                              </a:solidFill>
+                              <a:latin typeface="Cambria Math" panose="02040503050406030204" pitchFamily="18" charset="0"/>
+                            </a:rPr>
+                            <m:t>2</m:t>
+                          </m:r>
+                        </m:sub>
+                      </m:sSub>
+                      <m:d>
+                        <m:dPr>
+                          <m:ctrlPr>
+                            <a:rPr lang="fr-FR" i="1">
+                              <a:solidFill>
+                                <a:srgbClr val="66D9EF"/>
+                              </a:solidFill>
+                              <a:latin typeface="Cambria Math" panose="02040503050406030204" pitchFamily="18" charset="0"/>
+                            </a:rPr>
+                          </m:ctrlPr>
+                        </m:dPr>
+                        <m:e>
+                          <m:r>
+                            <a:rPr lang="fr-FR" i="1">
+                              <a:solidFill>
+                                <a:srgbClr val="66D9EF"/>
+                              </a:solidFill>
+                              <a:latin typeface="Cambria Math" panose="02040503050406030204" pitchFamily="18" charset="0"/>
+                            </a:rPr>
+                            <m:t>𝑛𝑙𝑜𝑔</m:t>
+                          </m:r>
+                          <m:d>
+                            <m:dPr>
+                              <m:ctrlPr>
+                                <a:rPr lang="fr-FR" i="1">
+                                  <a:solidFill>
+                                    <a:srgbClr val="66D9EF"/>
+                                  </a:solidFill>
+                                  <a:latin typeface="Cambria Math" panose="02040503050406030204" pitchFamily="18" charset="0"/>
+                                </a:rPr>
+                              </m:ctrlPr>
+                            </m:dPr>
+                            <m:e>
+                              <m:r>
+                                <a:rPr lang="fr-FR" i="1">
+                                  <a:solidFill>
+                                    <a:srgbClr val="66D9EF"/>
+                                  </a:solidFill>
+                                  <a:latin typeface="Cambria Math" panose="02040503050406030204" pitchFamily="18" charset="0"/>
+                                </a:rPr>
+                                <m:t>𝑛</m:t>
+                              </m:r>
+                            </m:e>
+                          </m:d>
+                          <m:r>
+                            <a:rPr lang="fr-FR" i="0">
+                              <a:solidFill>
+                                <a:srgbClr val="66D9EF"/>
+                              </a:solidFill>
+                              <a:latin typeface="Cambria Math" panose="02040503050406030204" pitchFamily="18" charset="0"/>
+                            </a:rPr>
+                            <m:t>+</m:t>
+                          </m:r>
+                          <m:sSub>
+                            <m:sSubPr>
+                              <m:ctrlPr>
+                                <a:rPr lang="fr-FR" i="1">
+                                  <a:solidFill>
+                                    <a:srgbClr val="66D9EF"/>
+                                  </a:solidFill>
+                                  <a:latin typeface="Cambria Math" panose="02040503050406030204" pitchFamily="18" charset="0"/>
+                                </a:rPr>
+                              </m:ctrlPr>
+                            </m:sSubPr>
+                            <m:e>
+                              <m:r>
+                                <a:rPr lang="fr-FR" i="1">
+                                  <a:solidFill>
+                                    <a:srgbClr val="66D9EF"/>
+                                  </a:solidFill>
+                                  <a:latin typeface="Cambria Math" panose="02040503050406030204" pitchFamily="18" charset="0"/>
+                                </a:rPr>
+                                <m:t>𝐶</m:t>
+                              </m:r>
+                            </m:e>
+                            <m:sub>
+                              <m:r>
+                                <a:rPr lang="fr-FR" i="0">
+                                  <a:solidFill>
+                                    <a:srgbClr val="66D9EF"/>
+                                  </a:solidFill>
+                                  <a:latin typeface="Cambria Math" panose="02040503050406030204" pitchFamily="18" charset="0"/>
+                                </a:rPr>
+                                <m:t>2</m:t>
+                              </m:r>
+                            </m:sub>
+                          </m:sSub>
+                        </m:e>
+                      </m:d>
+                      <m:r>
+                        <a:rPr lang="fr-FR" i="0">
+                          <a:solidFill>
+                            <a:srgbClr val="66D9EF"/>
+                          </a:solidFill>
+                          <a:latin typeface="Cambria Math" panose="02040503050406030204" pitchFamily="18" charset="0"/>
+                        </a:rPr>
+                        <m:t>  =   </m:t>
+                      </m:r>
+                      <m:sSub>
+                        <m:sSubPr>
+                          <m:ctrlPr>
+                            <a:rPr lang="fr-FR" i="1">
+                              <a:solidFill>
+                                <a:srgbClr val="66D9EF"/>
+                              </a:solidFill>
+                              <a:latin typeface="Cambria Math" panose="02040503050406030204" pitchFamily="18" charset="0"/>
+                            </a:rPr>
+                          </m:ctrlPr>
+                        </m:sSubPr>
+                        <m:e>
+                          <m:r>
+                            <m:rPr>
+                              <m:sty m:val="p"/>
+                            </m:rPr>
+                            <a:rPr lang="fr-FR" i="0">
+                              <a:solidFill>
+                                <a:srgbClr val="66D9EF"/>
+                              </a:solidFill>
+                              <a:latin typeface="Cambria Math" panose="02040503050406030204" pitchFamily="18" charset="0"/>
+                            </a:rPr>
+                            <m:t>Ο</m:t>
+                          </m:r>
+                        </m:e>
+                        <m:sub>
+                          <m:r>
+                            <a:rPr lang="fr-FR" i="0">
+                              <a:solidFill>
+                                <a:srgbClr val="66D9EF"/>
+                              </a:solidFill>
+                              <a:latin typeface="Cambria Math" panose="02040503050406030204" pitchFamily="18" charset="0"/>
+                            </a:rPr>
+                            <m:t>2</m:t>
+                          </m:r>
+                        </m:sub>
+                      </m:sSub>
+                      <m:d>
+                        <m:dPr>
+                          <m:ctrlPr>
+                            <a:rPr lang="fr-FR" i="1">
+                              <a:solidFill>
+                                <a:srgbClr val="66D9EF"/>
+                              </a:solidFill>
+                              <a:latin typeface="Cambria Math" panose="02040503050406030204" pitchFamily="18" charset="0"/>
+                            </a:rPr>
+                          </m:ctrlPr>
+                        </m:dPr>
+                        <m:e>
+                          <m:r>
+                            <a:rPr lang="fr-FR" i="1">
+                              <a:solidFill>
+                                <a:srgbClr val="66D9EF"/>
+                              </a:solidFill>
+                              <a:latin typeface="Cambria Math" panose="02040503050406030204" pitchFamily="18" charset="0"/>
+                            </a:rPr>
+                            <m:t>𝑛𝑙𝑜𝑔</m:t>
+                          </m:r>
+                          <m:d>
+                            <m:dPr>
+                              <m:ctrlPr>
+                                <a:rPr lang="fr-FR" i="1">
+                                  <a:solidFill>
+                                    <a:srgbClr val="66D9EF"/>
+                                  </a:solidFill>
+                                  <a:latin typeface="Cambria Math" panose="02040503050406030204" pitchFamily="18" charset="0"/>
+                                </a:rPr>
+                              </m:ctrlPr>
+                            </m:dPr>
+                            <m:e>
+                              <m:r>
+                                <a:rPr lang="fr-FR" i="1">
+                                  <a:solidFill>
+                                    <a:srgbClr val="66D9EF"/>
+                                  </a:solidFill>
+                                  <a:latin typeface="Cambria Math" panose="02040503050406030204" pitchFamily="18" charset="0"/>
+                                </a:rPr>
+                                <m:t>𝑛</m:t>
+                              </m:r>
+                            </m:e>
+                          </m:d>
+                        </m:e>
+                      </m:d>
+                      <m:r>
+                        <a:rPr lang="fr-FR" i="0">
+                          <a:solidFill>
+                            <a:srgbClr val="66D9EF"/>
+                          </a:solidFill>
+                          <a:latin typeface="Cambria Math" panose="02040503050406030204" pitchFamily="18" charset="0"/>
+                        </a:rPr>
+                        <m:t>+</m:t>
+                      </m:r>
+                      <m:sSub>
+                        <m:sSubPr>
+                          <m:ctrlPr>
+                            <a:rPr lang="fr-FR" i="1">
+                              <a:solidFill>
+                                <a:srgbClr val="66D9EF"/>
+                              </a:solidFill>
+                              <a:latin typeface="Cambria Math" panose="02040503050406030204" pitchFamily="18" charset="0"/>
+                            </a:rPr>
+                          </m:ctrlPr>
+                        </m:sSubPr>
+                        <m:e>
+                          <m:r>
+                            <a:rPr lang="fr-FR" i="1">
+                              <a:solidFill>
+                                <a:srgbClr val="66D9EF"/>
+                              </a:solidFill>
+                              <a:latin typeface="Cambria Math" panose="02040503050406030204" pitchFamily="18" charset="0"/>
+                            </a:rPr>
+                            <m:t>𝜖</m:t>
+                          </m:r>
+                        </m:e>
+                        <m:sub>
+                          <m:r>
+                            <a:rPr lang="fr-FR" i="0">
+                              <a:solidFill>
+                                <a:srgbClr val="66D9EF"/>
+                              </a:solidFill>
+                              <a:latin typeface="Cambria Math" panose="02040503050406030204" pitchFamily="18" charset="0"/>
+                            </a:rPr>
+                            <m:t>2</m:t>
+                          </m:r>
+                        </m:sub>
+                      </m:sSub>
+                    </m:oMath>
+                  </m:oMathPara>
+                </a14:m>
+                <a:endParaRPr lang="fr-FR" dirty="0">
+                  <a:solidFill>
+                    <a:srgbClr val="66D9EF"/>
+                  </a:solidFill>
+                </a:endParaRPr>
+              </a:p>
+            </p:txBody>
+          </p:sp>
+        </mc:Choice>
+        <mc:Fallback>
+          <p:sp>
+            <p:nvSpPr>
+              <p:cNvPr id="10" name="Rectangle 9">
+                <a:extLst>
+                  <a:ext uri="{FF2B5EF4-FFF2-40B4-BE49-F238E27FC236}">
+                    <a16:creationId xmlns:a16="http://schemas.microsoft.com/office/drawing/2014/main" id="{B7F994D7-778A-441B-A759-16F074E9EF39}"/>
+                  </a:ext>
+                </a:extLst>
+              </p:cNvPr>
+              <p:cNvSpPr>
+                <a:spLocks noRot="1" noChangeAspect="1" noMove="1" noResize="1" noEditPoints="1" noAdjustHandles="1" noChangeArrowheads="1" noChangeShapeType="1" noTextEdit="1"/>
+              </p:cNvSpPr>
+              <p:nvPr/>
+            </p:nvSpPr>
+            <p:spPr>
+              <a:xfrm>
+                <a:off x="7020000" y="4302720"/>
+                <a:ext cx="4312784" cy="404983"/>
+              </a:xfrm>
+              <a:prstGeom prst="rect">
+                <a:avLst/>
+              </a:prstGeom>
+              <a:blipFill>
+                <a:blip r:embed="rId4"/>
+                <a:stretch>
+                  <a:fillRect b="-9091"/>
+                </a:stretch>
+              </a:blipFill>
+            </p:spPr>
+            <p:txBody>
+              <a:bodyPr/>
+              <a:lstStyle/>
+              <a:p>
+                <a:r>
+                  <a:rPr lang="fr-FR">
+                    <a:noFill/>
+                  </a:rPr>
+                  <a:t> </a:t>
+                </a:r>
+              </a:p>
+            </p:txBody>
+          </p:sp>
+        </mc:Fallback>
+      </mc:AlternateContent>
+      <mc:AlternateContent xmlns:mc="http://schemas.openxmlformats.org/markup-compatibility/2006">
+        <mc:Choice xmlns:a14="http://schemas.microsoft.com/office/drawing/2010/main" Requires="a14">
+          <p:sp>
+            <p:nvSpPr>
+              <p:cNvPr id="11" name="ZoneTexte 10">
+                <a:extLst>
+                  <a:ext uri="{FF2B5EF4-FFF2-40B4-BE49-F238E27FC236}">
+                    <a16:creationId xmlns:a16="http://schemas.microsoft.com/office/drawing/2014/main" id="{E7A20DEB-A760-460A-BE8B-9BCADDE27882}"/>
+                  </a:ext>
+                </a:extLst>
+              </p:cNvPr>
+              <p:cNvSpPr txBox="1"/>
+              <p:nvPr/>
+            </p:nvSpPr>
+            <p:spPr>
+              <a:xfrm>
+                <a:off x="8280000" y="180000"/>
+                <a:ext cx="3823354" cy="1200329"/>
+              </a:xfrm>
+              <a:prstGeom prst="rect">
+                <a:avLst/>
+              </a:prstGeom>
+              <a:noFill/>
+              <a:ln>
+                <a:solidFill>
+                  <a:schemeClr val="tx1"/>
+                </a:solidFill>
+              </a:ln>
+            </p:spPr>
+            <p:txBody>
+              <a:bodyPr wrap="none" rtlCol="0">
+                <a:spAutoFit/>
+              </a:bodyPr>
+              <a:lstStyle/>
+              <a:p>
+                <a:r>
+                  <a:rPr lang="fr-FR" dirty="0">
+                    <a:solidFill>
+                      <a:srgbClr val="64B164"/>
+                    </a:solidFill>
+                  </a:rPr>
+                  <a:t>n = nombre d’actions du fichier</a:t>
+                </a:r>
+              </a:p>
+              <a:p>
+                <a:r>
+                  <a:rPr lang="fr-FR" dirty="0">
+                    <a:solidFill>
+                      <a:srgbClr val="64B164"/>
+                    </a:solidFill>
+                  </a:rPr>
+                  <a:t>C</a:t>
+                </a:r>
+                <a:r>
+                  <a:rPr lang="fr-FR" baseline="-25000" dirty="0">
+                    <a:solidFill>
+                      <a:srgbClr val="64B164"/>
+                    </a:solidFill>
+                  </a:rPr>
+                  <a:t>i</a:t>
+                </a:r>
+                <a:r>
+                  <a:rPr lang="fr-FR" dirty="0">
+                    <a:solidFill>
+                      <a:srgbClr val="64B164"/>
+                    </a:solidFill>
+                  </a:rPr>
+                  <a:t> = Constante de la fonction i</a:t>
+                </a:r>
+              </a:p>
+              <a:p>
+                <a:r>
+                  <a:rPr lang="fr-FR" dirty="0">
+                    <a:solidFill>
+                      <a:srgbClr val="64B164"/>
+                    </a:solidFill>
+                  </a:rPr>
+                  <a:t>n</a:t>
+                </a:r>
+                <a:r>
+                  <a:rPr lang="fr-FR" baseline="-25000" dirty="0">
+                    <a:solidFill>
+                      <a:srgbClr val="64B164"/>
+                    </a:solidFill>
+                  </a:rPr>
+                  <a:t>a</a:t>
+                </a:r>
+                <a:r>
+                  <a:rPr lang="fr-FR" dirty="0">
+                    <a:solidFill>
+                      <a:srgbClr val="64B164"/>
+                    </a:solidFill>
+                  </a:rPr>
+                  <a:t> = nombre actions de la combinaison</a:t>
+                </a:r>
+              </a:p>
+              <a:p>
+                <a14:m>
+                  <m:oMath xmlns:m="http://schemas.openxmlformats.org/officeDocument/2006/math">
+                    <m:r>
+                      <a:rPr lang="fr-FR" i="1">
+                        <a:solidFill>
+                          <a:srgbClr val="64B164"/>
+                        </a:solidFill>
+                        <a:latin typeface="Cambria Math" panose="02040503050406030204" pitchFamily="18" charset="0"/>
+                      </a:rPr>
+                      <m:t>𝜖</m:t>
+                    </m:r>
+                    <m:r>
+                      <m:rPr>
+                        <m:sty m:val="p"/>
+                      </m:rPr>
+                      <a:rPr lang="fr-FR" b="0" i="0" baseline="-25000" smtClean="0">
+                        <a:solidFill>
+                          <a:srgbClr val="64B164"/>
+                        </a:solidFill>
+                        <a:latin typeface="Cambria Math" panose="02040503050406030204" pitchFamily="18" charset="0"/>
+                      </a:rPr>
+                      <m:t>i</m:t>
+                    </m:r>
+                  </m:oMath>
+                </a14:m>
+                <a:r>
+                  <a:rPr lang="fr-FR" dirty="0">
+                    <a:solidFill>
+                      <a:srgbClr val="64B164"/>
+                    </a:solidFill>
+                  </a:rPr>
+                  <a:t> = négligeables</a:t>
+                </a:r>
+              </a:p>
+            </p:txBody>
+          </p:sp>
+        </mc:Choice>
+        <mc:Fallback>
+          <p:sp>
+            <p:nvSpPr>
+              <p:cNvPr id="11" name="ZoneTexte 10">
+                <a:extLst>
+                  <a:ext uri="{FF2B5EF4-FFF2-40B4-BE49-F238E27FC236}">
+                    <a16:creationId xmlns:a16="http://schemas.microsoft.com/office/drawing/2014/main" id="{E7A20DEB-A760-460A-BE8B-9BCADDE27882}"/>
+                  </a:ext>
+                </a:extLst>
+              </p:cNvPr>
+              <p:cNvSpPr txBox="1">
+                <a:spLocks noRot="1" noChangeAspect="1" noMove="1" noResize="1" noEditPoints="1" noAdjustHandles="1" noChangeArrowheads="1" noChangeShapeType="1" noTextEdit="1"/>
+              </p:cNvSpPr>
+              <p:nvPr/>
+            </p:nvSpPr>
+            <p:spPr>
+              <a:xfrm>
+                <a:off x="8280000" y="180000"/>
+                <a:ext cx="3823354" cy="1200329"/>
+              </a:xfrm>
+              <a:prstGeom prst="rect">
+                <a:avLst/>
+              </a:prstGeom>
+              <a:blipFill>
+                <a:blip r:embed="rId5"/>
+                <a:stretch>
+                  <a:fillRect l="-1113" t="-2525" r="-795" b="-7071"/>
+                </a:stretch>
+              </a:blipFill>
+              <a:ln>
+                <a:solidFill>
+                  <a:schemeClr val="tx1"/>
+                </a:solidFill>
+              </a:ln>
+            </p:spPr>
+            <p:txBody>
+              <a:bodyPr/>
+              <a:lstStyle/>
+              <a:p>
+                <a:r>
+                  <a:rPr lang="fr-FR">
+                    <a:noFill/>
+                  </a:rPr>
+                  <a:t> </a:t>
+                </a:r>
+              </a:p>
+            </p:txBody>
+          </p:sp>
+        </mc:Fallback>
+      </mc:AlternateContent>
     </p:spTree>
     <p:extLst>
       <p:ext uri="{BB962C8B-B14F-4D97-AF65-F5344CB8AC3E}">
@@ -10044,12 +11645,47 @@
           <a:chExt cx="0" cy="0"/>
         </a:xfrm>
       </p:grpSpPr>
+      <p:pic>
+        <p:nvPicPr>
+          <p:cNvPr id="6" name="Image 5">
+            <a:extLst>
+              <a:ext uri="{FF2B5EF4-FFF2-40B4-BE49-F238E27FC236}">
+                <a16:creationId xmlns:a16="http://schemas.microsoft.com/office/drawing/2014/main" id="{D0790833-9973-48F8-9FE6-B0A7270BB4D7}"/>
+              </a:ext>
+            </a:extLst>
+          </p:cNvPr>
+          <p:cNvPicPr>
+            <a:picLocks noChangeAspect="1"/>
+          </p:cNvPicPr>
+          <p:nvPr/>
+        </p:nvPicPr>
+        <p:blipFill>
+          <a:blip r:embed="rId2">
+            <a:extLst>
+              <a:ext uri="{28A0092B-C50C-407E-A947-70E740481C1C}">
+                <a14:useLocalDpi xmlns:a14="http://schemas.microsoft.com/office/drawing/2010/main" val="0"/>
+              </a:ext>
+            </a:extLst>
+          </a:blip>
+          <a:srcRect/>
+          <a:stretch/>
+        </p:blipFill>
+        <p:spPr>
+          <a:xfrm>
+            <a:off x="360000" y="1440000"/>
+            <a:ext cx="8484000" cy="5040000"/>
+          </a:xfrm>
+          <a:prstGeom prst="rect">
+            <a:avLst/>
+          </a:prstGeom>
+        </p:spPr>
+      </p:pic>
       <p:sp>
         <p:nvSpPr>
           <p:cNvPr id="2" name="Titre 1">
             <a:extLst>
               <a:ext uri="{FF2B5EF4-FFF2-40B4-BE49-F238E27FC236}">
-                <a16:creationId xmlns:a16="http://schemas.microsoft.com/office/drawing/2014/main" id="{18A2161E-D157-4DD3-8676-561D46832918}"/>
+                <a16:creationId xmlns:a16="http://schemas.microsoft.com/office/drawing/2014/main" id="{6E12BD60-FFB7-4FFC-8A8F-58ABA2B92C65}"/>
               </a:ext>
             </a:extLst>
           </p:cNvPr>
@@ -10067,7 +11703,7 @@
           <a:p>
             <a:r>
               <a:rPr lang="fr-FR" dirty="0"/>
-              <a:t>optimized.py =&gt; Cas limites</a:t>
+              <a:t>optimized.py =&gt; Pseudocode</a:t>
             </a:r>
           </a:p>
         </p:txBody>
@@ -10077,7 +11713,7 @@
           <p:cNvPr id="3" name="Espace réservé du numéro de diapositive 2">
             <a:extLst>
               <a:ext uri="{FF2B5EF4-FFF2-40B4-BE49-F238E27FC236}">
-                <a16:creationId xmlns:a16="http://schemas.microsoft.com/office/drawing/2014/main" id="{280DC6FB-56E6-483B-ABE2-6FA64B789CDA}"/>
+                <a16:creationId xmlns:a16="http://schemas.microsoft.com/office/drawing/2014/main" id="{5F9381FE-7645-4B0D-93DB-6C2975E58491}"/>
               </a:ext>
             </a:extLst>
           </p:cNvPr>
@@ -10102,10 +11738,964 @@
           </a:p>
         </p:txBody>
       </p:sp>
+      <p:sp>
+        <p:nvSpPr>
+          <p:cNvPr id="7" name="Accolade fermante 6">
+            <a:extLst>
+              <a:ext uri="{FF2B5EF4-FFF2-40B4-BE49-F238E27FC236}">
+                <a16:creationId xmlns:a16="http://schemas.microsoft.com/office/drawing/2014/main" id="{03A9BB18-BBBF-4C78-958B-B375A370D9EA}"/>
+              </a:ext>
+            </a:extLst>
+          </p:cNvPr>
+          <p:cNvSpPr/>
+          <p:nvPr/>
+        </p:nvSpPr>
+        <p:spPr>
+          <a:xfrm>
+            <a:off x="6480000" y="1809556"/>
+            <a:ext cx="362583" cy="1912013"/>
+          </a:xfrm>
+          <a:prstGeom prst="rightBrace">
+            <a:avLst>
+              <a:gd name="adj1" fmla="val 6862"/>
+              <a:gd name="adj2" fmla="val 51471"/>
+            </a:avLst>
+          </a:prstGeom>
+          <a:ln w="15875">
+            <a:solidFill>
+              <a:srgbClr val="64B164"/>
+            </a:solidFill>
+          </a:ln>
+        </p:spPr>
+        <p:style>
+          <a:lnRef idx="1">
+            <a:schemeClr val="accent1"/>
+          </a:lnRef>
+          <a:fillRef idx="0">
+            <a:schemeClr val="accent1"/>
+          </a:fillRef>
+          <a:effectRef idx="0">
+            <a:schemeClr val="accent1"/>
+          </a:effectRef>
+          <a:fontRef idx="minor">
+            <a:schemeClr val="tx1"/>
+          </a:fontRef>
+        </p:style>
+        <p:txBody>
+          <a:bodyPr rtlCol="0" anchor="ctr"/>
+          <a:lstStyle/>
+          <a:p>
+            <a:pPr algn="ctr"/>
+            <a:endParaRPr lang="fr-FR"/>
+          </a:p>
+        </p:txBody>
+      </p:sp>
+      <p:sp>
+        <p:nvSpPr>
+          <p:cNvPr id="8" name="Accolade fermante 7">
+            <a:extLst>
+              <a:ext uri="{FF2B5EF4-FFF2-40B4-BE49-F238E27FC236}">
+                <a16:creationId xmlns:a16="http://schemas.microsoft.com/office/drawing/2014/main" id="{317EB4D3-8B15-40CA-9DA9-F1C04BBDA4D4}"/>
+              </a:ext>
+            </a:extLst>
+          </p:cNvPr>
+          <p:cNvSpPr/>
+          <p:nvPr/>
+        </p:nvSpPr>
+        <p:spPr>
+          <a:xfrm>
+            <a:off x="6480000" y="4127640"/>
+            <a:ext cx="362583" cy="1936276"/>
+          </a:xfrm>
+          <a:prstGeom prst="rightBrace">
+            <a:avLst>
+              <a:gd name="adj1" fmla="val 6862"/>
+              <a:gd name="adj2" fmla="val 51471"/>
+            </a:avLst>
+          </a:prstGeom>
+          <a:ln w="15875">
+            <a:solidFill>
+              <a:srgbClr val="64B164"/>
+            </a:solidFill>
+          </a:ln>
+        </p:spPr>
+        <p:style>
+          <a:lnRef idx="1">
+            <a:schemeClr val="accent1"/>
+          </a:lnRef>
+          <a:fillRef idx="0">
+            <a:schemeClr val="accent1"/>
+          </a:fillRef>
+          <a:effectRef idx="0">
+            <a:schemeClr val="accent1"/>
+          </a:effectRef>
+          <a:fontRef idx="minor">
+            <a:schemeClr val="tx1"/>
+          </a:fontRef>
+        </p:style>
+        <p:txBody>
+          <a:bodyPr rtlCol="0" anchor="ctr"/>
+          <a:lstStyle/>
+          <a:p>
+            <a:pPr algn="ctr"/>
+            <a:endParaRPr lang="fr-FR"/>
+          </a:p>
+        </p:txBody>
+      </p:sp>
+      <mc:AlternateContent xmlns:mc="http://schemas.openxmlformats.org/markup-compatibility/2006">
+        <mc:Choice xmlns:a14="http://schemas.microsoft.com/office/drawing/2010/main" Requires="a14">
+          <p:sp>
+            <p:nvSpPr>
+              <p:cNvPr id="9" name="Rectangle 8">
+                <a:extLst>
+                  <a:ext uri="{FF2B5EF4-FFF2-40B4-BE49-F238E27FC236}">
+                    <a16:creationId xmlns:a16="http://schemas.microsoft.com/office/drawing/2014/main" id="{92244115-CF44-44A7-9E81-37589ABB9314}"/>
+                  </a:ext>
+                </a:extLst>
+              </p:cNvPr>
+              <p:cNvSpPr/>
+              <p:nvPr/>
+            </p:nvSpPr>
+            <p:spPr>
+              <a:xfrm>
+                <a:off x="7020000" y="2580896"/>
+                <a:ext cx="2966518" cy="369332"/>
+              </a:xfrm>
+              <a:prstGeom prst="rect">
+                <a:avLst/>
+              </a:prstGeom>
+            </p:spPr>
+            <p:txBody>
+              <a:bodyPr wrap="none">
+                <a:spAutoFit/>
+              </a:bodyPr>
+              <a:lstStyle/>
+              <a:p>
+                <a:pPr/>
+                <a14:m>
+                  <m:oMathPara xmlns:m="http://schemas.openxmlformats.org/officeDocument/2006/math">
+                    <m:oMathParaPr>
+                      <m:jc m:val="left"/>
+                    </m:oMathParaPr>
+                    <m:oMath xmlns:m="http://schemas.openxmlformats.org/officeDocument/2006/math">
+                      <m:sSub>
+                        <m:sSubPr>
+                          <m:ctrlPr>
+                            <a:rPr lang="fr-FR" smtClean="0">
+                              <a:solidFill>
+                                <a:srgbClr val="66D9EF"/>
+                              </a:solidFill>
+                              <a:latin typeface="Cambria Math" panose="02040503050406030204" pitchFamily="18" charset="0"/>
+                            </a:rPr>
+                          </m:ctrlPr>
+                        </m:sSubPr>
+                        <m:e>
+                          <m:r>
+                            <m:rPr>
+                              <m:sty m:val="p"/>
+                            </m:rPr>
+                            <a:rPr lang="fr-FR">
+                              <a:solidFill>
+                                <a:srgbClr val="66D9EF"/>
+                              </a:solidFill>
+                              <a:latin typeface="Cambria Math" panose="02040503050406030204" pitchFamily="18" charset="0"/>
+                            </a:rPr>
+                            <m:t>Ο</m:t>
+                          </m:r>
+                        </m:e>
+                        <m:sub>
+                          <m:r>
+                            <a:rPr lang="fr-FR" i="0">
+                              <a:solidFill>
+                                <a:srgbClr val="66D9EF"/>
+                              </a:solidFill>
+                              <a:latin typeface="Cambria Math" panose="02040503050406030204" pitchFamily="18" charset="0"/>
+                            </a:rPr>
+                            <m:t>3</m:t>
+                          </m:r>
+                        </m:sub>
+                      </m:sSub>
+                      <m:d>
+                        <m:dPr>
+                          <m:ctrlPr>
+                            <a:rPr lang="fr-FR" i="1">
+                              <a:solidFill>
+                                <a:srgbClr val="66D9EF"/>
+                              </a:solidFill>
+                              <a:latin typeface="Cambria Math" panose="02040503050406030204" pitchFamily="18" charset="0"/>
+                            </a:rPr>
+                          </m:ctrlPr>
+                        </m:dPr>
+                        <m:e>
+                          <m:r>
+                            <a:rPr lang="fr-FR" i="1">
+                              <a:solidFill>
+                                <a:srgbClr val="66D9EF"/>
+                              </a:solidFill>
+                              <a:latin typeface="Cambria Math" panose="02040503050406030204" pitchFamily="18" charset="0"/>
+                            </a:rPr>
+                            <m:t>𝑛</m:t>
+                          </m:r>
+                          <m:r>
+                            <a:rPr lang="fr-FR" i="0">
+                              <a:solidFill>
+                                <a:srgbClr val="66D9EF"/>
+                              </a:solidFill>
+                              <a:latin typeface="Cambria Math" panose="02040503050406030204" pitchFamily="18" charset="0"/>
+                            </a:rPr>
+                            <m:t>+</m:t>
+                          </m:r>
+                          <m:sSub>
+                            <m:sSubPr>
+                              <m:ctrlPr>
+                                <a:rPr lang="fr-FR" i="1">
+                                  <a:solidFill>
+                                    <a:srgbClr val="66D9EF"/>
+                                  </a:solidFill>
+                                  <a:latin typeface="Cambria Math" panose="02040503050406030204" pitchFamily="18" charset="0"/>
+                                </a:rPr>
+                              </m:ctrlPr>
+                            </m:sSubPr>
+                            <m:e>
+                              <m:r>
+                                <a:rPr lang="fr-FR" i="1">
+                                  <a:solidFill>
+                                    <a:srgbClr val="66D9EF"/>
+                                  </a:solidFill>
+                                  <a:latin typeface="Cambria Math" panose="02040503050406030204" pitchFamily="18" charset="0"/>
+                                </a:rPr>
+                                <m:t>𝐶</m:t>
+                              </m:r>
+                            </m:e>
+                            <m:sub>
+                              <m:r>
+                                <a:rPr lang="fr-FR" i="0">
+                                  <a:solidFill>
+                                    <a:srgbClr val="66D9EF"/>
+                                  </a:solidFill>
+                                  <a:latin typeface="Cambria Math" panose="02040503050406030204" pitchFamily="18" charset="0"/>
+                                </a:rPr>
+                                <m:t>3</m:t>
+                              </m:r>
+                            </m:sub>
+                          </m:sSub>
+                        </m:e>
+                      </m:d>
+                      <m:r>
+                        <a:rPr lang="fr-FR" i="0">
+                          <a:solidFill>
+                            <a:srgbClr val="66D9EF"/>
+                          </a:solidFill>
+                          <a:latin typeface="Cambria Math" panose="02040503050406030204" pitchFamily="18" charset="0"/>
+                        </a:rPr>
+                        <m:t>  =   </m:t>
+                      </m:r>
+                      <m:sSub>
+                        <m:sSubPr>
+                          <m:ctrlPr>
+                            <a:rPr lang="fr-FR" i="1">
+                              <a:solidFill>
+                                <a:srgbClr val="66D9EF"/>
+                              </a:solidFill>
+                              <a:latin typeface="Cambria Math" panose="02040503050406030204" pitchFamily="18" charset="0"/>
+                            </a:rPr>
+                          </m:ctrlPr>
+                        </m:sSubPr>
+                        <m:e>
+                          <m:r>
+                            <m:rPr>
+                              <m:sty m:val="p"/>
+                            </m:rPr>
+                            <a:rPr lang="fr-FR" i="0">
+                              <a:solidFill>
+                                <a:srgbClr val="66D9EF"/>
+                              </a:solidFill>
+                              <a:latin typeface="Cambria Math" panose="02040503050406030204" pitchFamily="18" charset="0"/>
+                            </a:rPr>
+                            <m:t>Ο</m:t>
+                          </m:r>
+                        </m:e>
+                        <m:sub>
+                          <m:r>
+                            <a:rPr lang="fr-FR" i="0">
+                              <a:solidFill>
+                                <a:srgbClr val="66D9EF"/>
+                              </a:solidFill>
+                              <a:latin typeface="Cambria Math" panose="02040503050406030204" pitchFamily="18" charset="0"/>
+                            </a:rPr>
+                            <m:t>3</m:t>
+                          </m:r>
+                        </m:sub>
+                      </m:sSub>
+                      <m:d>
+                        <m:dPr>
+                          <m:ctrlPr>
+                            <a:rPr lang="fr-FR" i="1">
+                              <a:solidFill>
+                                <a:srgbClr val="66D9EF"/>
+                              </a:solidFill>
+                              <a:latin typeface="Cambria Math" panose="02040503050406030204" pitchFamily="18" charset="0"/>
+                            </a:rPr>
+                          </m:ctrlPr>
+                        </m:dPr>
+                        <m:e>
+                          <m:r>
+                            <a:rPr lang="fr-FR" i="1">
+                              <a:solidFill>
+                                <a:srgbClr val="66D9EF"/>
+                              </a:solidFill>
+                              <a:latin typeface="Cambria Math" panose="02040503050406030204" pitchFamily="18" charset="0"/>
+                            </a:rPr>
+                            <m:t>𝑛</m:t>
+                          </m:r>
+                        </m:e>
+                      </m:d>
+                      <m:r>
+                        <a:rPr lang="fr-FR" i="0">
+                          <a:solidFill>
+                            <a:srgbClr val="66D9EF"/>
+                          </a:solidFill>
+                          <a:latin typeface="Cambria Math" panose="02040503050406030204" pitchFamily="18" charset="0"/>
+                        </a:rPr>
+                        <m:t>+</m:t>
+                      </m:r>
+                      <m:sSub>
+                        <m:sSubPr>
+                          <m:ctrlPr>
+                            <a:rPr lang="fr-FR" i="1">
+                              <a:solidFill>
+                                <a:srgbClr val="66D9EF"/>
+                              </a:solidFill>
+                              <a:latin typeface="Cambria Math" panose="02040503050406030204" pitchFamily="18" charset="0"/>
+                            </a:rPr>
+                          </m:ctrlPr>
+                        </m:sSubPr>
+                        <m:e>
+                          <m:r>
+                            <a:rPr lang="fr-FR" i="1">
+                              <a:solidFill>
+                                <a:srgbClr val="66D9EF"/>
+                              </a:solidFill>
+                              <a:latin typeface="Cambria Math" panose="02040503050406030204" pitchFamily="18" charset="0"/>
+                            </a:rPr>
+                            <m:t>𝜖</m:t>
+                          </m:r>
+                        </m:e>
+                        <m:sub>
+                          <m:r>
+                            <a:rPr lang="fr-FR" i="0">
+                              <a:solidFill>
+                                <a:srgbClr val="66D9EF"/>
+                              </a:solidFill>
+                              <a:latin typeface="Cambria Math" panose="02040503050406030204" pitchFamily="18" charset="0"/>
+                            </a:rPr>
+                            <m:t>3</m:t>
+                          </m:r>
+                        </m:sub>
+                      </m:sSub>
+                    </m:oMath>
+                  </m:oMathPara>
+                </a14:m>
+                <a:endParaRPr lang="fr-FR" dirty="0">
+                  <a:solidFill>
+                    <a:srgbClr val="66D9EF"/>
+                  </a:solidFill>
+                </a:endParaRPr>
+              </a:p>
+            </p:txBody>
+          </p:sp>
+        </mc:Choice>
+        <mc:Fallback>
+          <p:sp>
+            <p:nvSpPr>
+              <p:cNvPr id="9" name="Rectangle 8">
+                <a:extLst>
+                  <a:ext uri="{FF2B5EF4-FFF2-40B4-BE49-F238E27FC236}">
+                    <a16:creationId xmlns:a16="http://schemas.microsoft.com/office/drawing/2014/main" id="{92244115-CF44-44A7-9E81-37589ABB9314}"/>
+                  </a:ext>
+                </a:extLst>
+              </p:cNvPr>
+              <p:cNvSpPr>
+                <a:spLocks noRot="1" noChangeAspect="1" noMove="1" noResize="1" noEditPoints="1" noAdjustHandles="1" noChangeArrowheads="1" noChangeShapeType="1" noTextEdit="1"/>
+              </p:cNvSpPr>
+              <p:nvPr/>
+            </p:nvSpPr>
+            <p:spPr>
+              <a:xfrm>
+                <a:off x="7020000" y="2580896"/>
+                <a:ext cx="2966518" cy="369332"/>
+              </a:xfrm>
+              <a:prstGeom prst="rect">
+                <a:avLst/>
+              </a:prstGeom>
+              <a:blipFill>
+                <a:blip r:embed="rId3"/>
+                <a:stretch>
+                  <a:fillRect/>
+                </a:stretch>
+              </a:blipFill>
+            </p:spPr>
+            <p:txBody>
+              <a:bodyPr/>
+              <a:lstStyle/>
+              <a:p>
+                <a:r>
+                  <a:rPr lang="fr-FR">
+                    <a:noFill/>
+                  </a:rPr>
+                  <a:t> </a:t>
+                </a:r>
+              </a:p>
+            </p:txBody>
+          </p:sp>
+        </mc:Fallback>
+      </mc:AlternateContent>
+      <mc:AlternateContent xmlns:mc="http://schemas.openxmlformats.org/markup-compatibility/2006">
+        <mc:Choice xmlns:a14="http://schemas.microsoft.com/office/drawing/2010/main" Requires="a14">
+          <p:sp>
+            <p:nvSpPr>
+              <p:cNvPr id="10" name="Rectangle 9">
+                <a:extLst>
+                  <a:ext uri="{FF2B5EF4-FFF2-40B4-BE49-F238E27FC236}">
+                    <a16:creationId xmlns:a16="http://schemas.microsoft.com/office/drawing/2014/main" id="{ACC01F6F-AA81-4B0C-8B8B-91B03C9851A3}"/>
+                  </a:ext>
+                </a:extLst>
+              </p:cNvPr>
+              <p:cNvSpPr/>
+              <p:nvPr/>
+            </p:nvSpPr>
+            <p:spPr>
+              <a:xfrm>
+                <a:off x="7020000" y="4911112"/>
+                <a:ext cx="3197477" cy="369332"/>
+              </a:xfrm>
+              <a:prstGeom prst="rect">
+                <a:avLst/>
+              </a:prstGeom>
+            </p:spPr>
+            <p:txBody>
+              <a:bodyPr wrap="none">
+                <a:spAutoFit/>
+              </a:bodyPr>
+              <a:lstStyle/>
+              <a:p>
+                <a:pPr/>
+                <a14:m>
+                  <m:oMathPara xmlns:m="http://schemas.openxmlformats.org/officeDocument/2006/math">
+                    <m:oMathParaPr>
+                      <m:jc m:val="left"/>
+                    </m:oMathParaPr>
+                    <m:oMath xmlns:m="http://schemas.openxmlformats.org/officeDocument/2006/math">
+                      <m:sSub>
+                        <m:sSubPr>
+                          <m:ctrlPr>
+                            <a:rPr lang="fr-FR" smtClean="0">
+                              <a:solidFill>
+                                <a:srgbClr val="66D9EF"/>
+                              </a:solidFill>
+                              <a:latin typeface="Cambria Math" panose="02040503050406030204" pitchFamily="18" charset="0"/>
+                            </a:rPr>
+                          </m:ctrlPr>
+                        </m:sSubPr>
+                        <m:e>
+                          <m:r>
+                            <m:rPr>
+                              <m:sty m:val="p"/>
+                            </m:rPr>
+                            <a:rPr lang="fr-FR">
+                              <a:solidFill>
+                                <a:srgbClr val="66D9EF"/>
+                              </a:solidFill>
+                              <a:latin typeface="Cambria Math" panose="02040503050406030204" pitchFamily="18" charset="0"/>
+                            </a:rPr>
+                            <m:t>Ο</m:t>
+                          </m:r>
+                        </m:e>
+                        <m:sub>
+                          <m:r>
+                            <a:rPr lang="fr-FR" i="0">
+                              <a:solidFill>
+                                <a:srgbClr val="66D9EF"/>
+                              </a:solidFill>
+                              <a:latin typeface="Cambria Math" panose="02040503050406030204" pitchFamily="18" charset="0"/>
+                            </a:rPr>
+                            <m:t>4</m:t>
+                          </m:r>
+                        </m:sub>
+                      </m:sSub>
+                      <m:d>
+                        <m:dPr>
+                          <m:ctrlPr>
+                            <a:rPr lang="fr-FR" i="1">
+                              <a:solidFill>
+                                <a:srgbClr val="66D9EF"/>
+                              </a:solidFill>
+                              <a:latin typeface="Cambria Math" panose="02040503050406030204" pitchFamily="18" charset="0"/>
+                            </a:rPr>
+                          </m:ctrlPr>
+                        </m:dPr>
+                        <m:e>
+                          <m:sSub>
+                            <m:sSubPr>
+                              <m:ctrlPr>
+                                <a:rPr lang="fr-FR" i="1">
+                                  <a:solidFill>
+                                    <a:srgbClr val="66D9EF"/>
+                                  </a:solidFill>
+                                  <a:latin typeface="Cambria Math" panose="02040503050406030204" pitchFamily="18" charset="0"/>
+                                </a:rPr>
+                              </m:ctrlPr>
+                            </m:sSubPr>
+                            <m:e>
+                              <m:r>
+                                <a:rPr lang="fr-FR" i="1">
+                                  <a:solidFill>
+                                    <a:srgbClr val="66D9EF"/>
+                                  </a:solidFill>
+                                  <a:latin typeface="Cambria Math" panose="02040503050406030204" pitchFamily="18" charset="0"/>
+                                </a:rPr>
+                                <m:t>𝑛</m:t>
+                              </m:r>
+                            </m:e>
+                            <m:sub>
+                              <m:r>
+                                <a:rPr lang="fr-FR" i="1">
+                                  <a:solidFill>
+                                    <a:srgbClr val="66D9EF"/>
+                                  </a:solidFill>
+                                  <a:latin typeface="Cambria Math" panose="02040503050406030204" pitchFamily="18" charset="0"/>
+                                </a:rPr>
+                                <m:t>𝑎</m:t>
+                              </m:r>
+                            </m:sub>
+                          </m:sSub>
+                          <m:r>
+                            <a:rPr lang="fr-FR" i="0">
+                              <a:solidFill>
+                                <a:srgbClr val="66D9EF"/>
+                              </a:solidFill>
+                              <a:latin typeface="Cambria Math" panose="02040503050406030204" pitchFamily="18" charset="0"/>
+                            </a:rPr>
+                            <m:t>+</m:t>
+                          </m:r>
+                          <m:sSub>
+                            <m:sSubPr>
+                              <m:ctrlPr>
+                                <a:rPr lang="fr-FR" i="1">
+                                  <a:solidFill>
+                                    <a:srgbClr val="66D9EF"/>
+                                  </a:solidFill>
+                                  <a:latin typeface="Cambria Math" panose="02040503050406030204" pitchFamily="18" charset="0"/>
+                                </a:rPr>
+                              </m:ctrlPr>
+                            </m:sSubPr>
+                            <m:e>
+                              <m:r>
+                                <a:rPr lang="fr-FR" i="1">
+                                  <a:solidFill>
+                                    <a:srgbClr val="66D9EF"/>
+                                  </a:solidFill>
+                                  <a:latin typeface="Cambria Math" panose="02040503050406030204" pitchFamily="18" charset="0"/>
+                                </a:rPr>
+                                <m:t>𝐶</m:t>
+                              </m:r>
+                            </m:e>
+                            <m:sub>
+                              <m:r>
+                                <a:rPr lang="fr-FR" i="0">
+                                  <a:solidFill>
+                                    <a:srgbClr val="66D9EF"/>
+                                  </a:solidFill>
+                                  <a:latin typeface="Cambria Math" panose="02040503050406030204" pitchFamily="18" charset="0"/>
+                                </a:rPr>
+                                <m:t>4</m:t>
+                              </m:r>
+                            </m:sub>
+                          </m:sSub>
+                        </m:e>
+                      </m:d>
+                      <m:r>
+                        <a:rPr lang="fr-FR" i="0">
+                          <a:solidFill>
+                            <a:srgbClr val="66D9EF"/>
+                          </a:solidFill>
+                          <a:latin typeface="Cambria Math" panose="02040503050406030204" pitchFamily="18" charset="0"/>
+                        </a:rPr>
+                        <m:t>  =   </m:t>
+                      </m:r>
+                      <m:sSub>
+                        <m:sSubPr>
+                          <m:ctrlPr>
+                            <a:rPr lang="fr-FR" i="1">
+                              <a:solidFill>
+                                <a:srgbClr val="66D9EF"/>
+                              </a:solidFill>
+                              <a:latin typeface="Cambria Math" panose="02040503050406030204" pitchFamily="18" charset="0"/>
+                            </a:rPr>
+                          </m:ctrlPr>
+                        </m:sSubPr>
+                        <m:e>
+                          <m:r>
+                            <m:rPr>
+                              <m:sty m:val="p"/>
+                            </m:rPr>
+                            <a:rPr lang="fr-FR" i="0">
+                              <a:solidFill>
+                                <a:srgbClr val="66D9EF"/>
+                              </a:solidFill>
+                              <a:latin typeface="Cambria Math" panose="02040503050406030204" pitchFamily="18" charset="0"/>
+                            </a:rPr>
+                            <m:t>Ο</m:t>
+                          </m:r>
+                        </m:e>
+                        <m:sub>
+                          <m:r>
+                            <a:rPr lang="fr-FR" i="0">
+                              <a:solidFill>
+                                <a:srgbClr val="66D9EF"/>
+                              </a:solidFill>
+                              <a:latin typeface="Cambria Math" panose="02040503050406030204" pitchFamily="18" charset="0"/>
+                            </a:rPr>
+                            <m:t>4</m:t>
+                          </m:r>
+                        </m:sub>
+                      </m:sSub>
+                      <m:d>
+                        <m:dPr>
+                          <m:ctrlPr>
+                            <a:rPr lang="fr-FR" i="1">
+                              <a:solidFill>
+                                <a:srgbClr val="66D9EF"/>
+                              </a:solidFill>
+                              <a:latin typeface="Cambria Math" panose="02040503050406030204" pitchFamily="18" charset="0"/>
+                            </a:rPr>
+                          </m:ctrlPr>
+                        </m:dPr>
+                        <m:e>
+                          <m:sSub>
+                            <m:sSubPr>
+                              <m:ctrlPr>
+                                <a:rPr lang="fr-FR" i="1">
+                                  <a:solidFill>
+                                    <a:srgbClr val="66D9EF"/>
+                                  </a:solidFill>
+                                  <a:latin typeface="Cambria Math" panose="02040503050406030204" pitchFamily="18" charset="0"/>
+                                </a:rPr>
+                              </m:ctrlPr>
+                            </m:sSubPr>
+                            <m:e>
+                              <m:r>
+                                <a:rPr lang="fr-FR" i="1">
+                                  <a:solidFill>
+                                    <a:srgbClr val="66D9EF"/>
+                                  </a:solidFill>
+                                  <a:latin typeface="Cambria Math" panose="02040503050406030204" pitchFamily="18" charset="0"/>
+                                </a:rPr>
+                                <m:t>𝑛</m:t>
+                              </m:r>
+                            </m:e>
+                            <m:sub>
+                              <m:r>
+                                <a:rPr lang="fr-FR" i="1">
+                                  <a:solidFill>
+                                    <a:srgbClr val="66D9EF"/>
+                                  </a:solidFill>
+                                  <a:latin typeface="Cambria Math" panose="02040503050406030204" pitchFamily="18" charset="0"/>
+                                </a:rPr>
+                                <m:t>𝑎</m:t>
+                              </m:r>
+                            </m:sub>
+                          </m:sSub>
+                        </m:e>
+                      </m:d>
+                      <m:r>
+                        <a:rPr lang="fr-FR" i="0">
+                          <a:solidFill>
+                            <a:srgbClr val="66D9EF"/>
+                          </a:solidFill>
+                          <a:latin typeface="Cambria Math" panose="02040503050406030204" pitchFamily="18" charset="0"/>
+                        </a:rPr>
+                        <m:t>+</m:t>
+                      </m:r>
+                      <m:sSub>
+                        <m:sSubPr>
+                          <m:ctrlPr>
+                            <a:rPr lang="fr-FR" i="1">
+                              <a:solidFill>
+                                <a:srgbClr val="66D9EF"/>
+                              </a:solidFill>
+                              <a:latin typeface="Cambria Math" panose="02040503050406030204" pitchFamily="18" charset="0"/>
+                            </a:rPr>
+                          </m:ctrlPr>
+                        </m:sSubPr>
+                        <m:e>
+                          <m:r>
+                            <a:rPr lang="fr-FR" i="1">
+                              <a:solidFill>
+                                <a:srgbClr val="66D9EF"/>
+                              </a:solidFill>
+                              <a:latin typeface="Cambria Math" panose="02040503050406030204" pitchFamily="18" charset="0"/>
+                            </a:rPr>
+                            <m:t>𝜖</m:t>
+                          </m:r>
+                        </m:e>
+                        <m:sub>
+                          <m:r>
+                            <a:rPr lang="fr-FR" i="0">
+                              <a:solidFill>
+                                <a:srgbClr val="66D9EF"/>
+                              </a:solidFill>
+                              <a:latin typeface="Cambria Math" panose="02040503050406030204" pitchFamily="18" charset="0"/>
+                            </a:rPr>
+                            <m:t>4</m:t>
+                          </m:r>
+                        </m:sub>
+                      </m:sSub>
+                    </m:oMath>
+                  </m:oMathPara>
+                </a14:m>
+                <a:endParaRPr lang="fr-FR" dirty="0">
+                  <a:solidFill>
+                    <a:srgbClr val="66D9EF"/>
+                  </a:solidFill>
+                </a:endParaRPr>
+              </a:p>
+            </p:txBody>
+          </p:sp>
+        </mc:Choice>
+        <mc:Fallback>
+          <p:sp>
+            <p:nvSpPr>
+              <p:cNvPr id="10" name="Rectangle 9">
+                <a:extLst>
+                  <a:ext uri="{FF2B5EF4-FFF2-40B4-BE49-F238E27FC236}">
+                    <a16:creationId xmlns:a16="http://schemas.microsoft.com/office/drawing/2014/main" id="{ACC01F6F-AA81-4B0C-8B8B-91B03C9851A3}"/>
+                  </a:ext>
+                </a:extLst>
+              </p:cNvPr>
+              <p:cNvSpPr>
+                <a:spLocks noRot="1" noChangeAspect="1" noMove="1" noResize="1" noEditPoints="1" noAdjustHandles="1" noChangeArrowheads="1" noChangeShapeType="1" noTextEdit="1"/>
+              </p:cNvSpPr>
+              <p:nvPr/>
+            </p:nvSpPr>
+            <p:spPr>
+              <a:xfrm>
+                <a:off x="7020000" y="4911112"/>
+                <a:ext cx="3197477" cy="369332"/>
+              </a:xfrm>
+              <a:prstGeom prst="rect">
+                <a:avLst/>
+              </a:prstGeom>
+              <a:blipFill>
+                <a:blip r:embed="rId4"/>
+                <a:stretch>
+                  <a:fillRect/>
+                </a:stretch>
+              </a:blipFill>
+            </p:spPr>
+            <p:txBody>
+              <a:bodyPr/>
+              <a:lstStyle/>
+              <a:p>
+                <a:r>
+                  <a:rPr lang="fr-FR">
+                    <a:noFill/>
+                  </a:rPr>
+                  <a:t> </a:t>
+                </a:r>
+              </a:p>
+            </p:txBody>
+          </p:sp>
+        </mc:Fallback>
+      </mc:AlternateContent>
+      <mc:AlternateContent xmlns:mc="http://schemas.openxmlformats.org/markup-compatibility/2006">
+        <mc:Choice xmlns:a14="http://schemas.microsoft.com/office/drawing/2010/main" Requires="a14">
+          <p:sp>
+            <p:nvSpPr>
+              <p:cNvPr id="12" name="ZoneTexte 11">
+                <a:extLst>
+                  <a:ext uri="{FF2B5EF4-FFF2-40B4-BE49-F238E27FC236}">
+                    <a16:creationId xmlns:a16="http://schemas.microsoft.com/office/drawing/2014/main" id="{E0489D23-597E-47E4-9C25-42A0E152A55F}"/>
+                  </a:ext>
+                </a:extLst>
+              </p:cNvPr>
+              <p:cNvSpPr txBox="1"/>
+              <p:nvPr/>
+            </p:nvSpPr>
+            <p:spPr>
+              <a:xfrm>
+                <a:off x="8280000" y="180000"/>
+                <a:ext cx="3823354" cy="1200329"/>
+              </a:xfrm>
+              <a:prstGeom prst="rect">
+                <a:avLst/>
+              </a:prstGeom>
+              <a:noFill/>
+              <a:ln>
+                <a:solidFill>
+                  <a:schemeClr val="tx1"/>
+                </a:solidFill>
+              </a:ln>
+            </p:spPr>
+            <p:txBody>
+              <a:bodyPr wrap="none" rtlCol="0">
+                <a:spAutoFit/>
+              </a:bodyPr>
+              <a:lstStyle/>
+              <a:p>
+                <a:r>
+                  <a:rPr lang="fr-FR" dirty="0">
+                    <a:solidFill>
+                      <a:srgbClr val="64B164"/>
+                    </a:solidFill>
+                  </a:rPr>
+                  <a:t>n = nombre d’actions du fichier</a:t>
+                </a:r>
+              </a:p>
+              <a:p>
+                <a:r>
+                  <a:rPr lang="fr-FR" dirty="0">
+                    <a:solidFill>
+                      <a:srgbClr val="64B164"/>
+                    </a:solidFill>
+                  </a:rPr>
+                  <a:t>C</a:t>
+                </a:r>
+                <a:r>
+                  <a:rPr lang="fr-FR" baseline="-25000" dirty="0">
+                    <a:solidFill>
+                      <a:srgbClr val="64B164"/>
+                    </a:solidFill>
+                  </a:rPr>
+                  <a:t>i</a:t>
+                </a:r>
+                <a:r>
+                  <a:rPr lang="fr-FR" dirty="0">
+                    <a:solidFill>
+                      <a:srgbClr val="64B164"/>
+                    </a:solidFill>
+                  </a:rPr>
+                  <a:t> = Constante de la fonction i</a:t>
+                </a:r>
+              </a:p>
+              <a:p>
+                <a:r>
+                  <a:rPr lang="fr-FR" dirty="0">
+                    <a:solidFill>
+                      <a:srgbClr val="64B164"/>
+                    </a:solidFill>
+                  </a:rPr>
+                  <a:t>n</a:t>
+                </a:r>
+                <a:r>
+                  <a:rPr lang="fr-FR" baseline="-25000" dirty="0">
+                    <a:solidFill>
+                      <a:srgbClr val="64B164"/>
+                    </a:solidFill>
+                  </a:rPr>
+                  <a:t>a</a:t>
+                </a:r>
+                <a:r>
+                  <a:rPr lang="fr-FR" dirty="0">
+                    <a:solidFill>
+                      <a:srgbClr val="64B164"/>
+                    </a:solidFill>
+                  </a:rPr>
+                  <a:t> = nombre actions de la combinaison</a:t>
+                </a:r>
+              </a:p>
+              <a:p>
+                <a14:m>
+                  <m:oMath xmlns:m="http://schemas.openxmlformats.org/officeDocument/2006/math">
+                    <m:r>
+                      <a:rPr lang="fr-FR" i="1">
+                        <a:solidFill>
+                          <a:srgbClr val="64B164"/>
+                        </a:solidFill>
+                        <a:latin typeface="Cambria Math" panose="02040503050406030204" pitchFamily="18" charset="0"/>
+                      </a:rPr>
+                      <m:t>𝜖</m:t>
+                    </m:r>
+                    <m:r>
+                      <m:rPr>
+                        <m:sty m:val="p"/>
+                      </m:rPr>
+                      <a:rPr lang="fr-FR" b="0" i="0" baseline="-25000" smtClean="0">
+                        <a:solidFill>
+                          <a:srgbClr val="64B164"/>
+                        </a:solidFill>
+                        <a:latin typeface="Cambria Math" panose="02040503050406030204" pitchFamily="18" charset="0"/>
+                      </a:rPr>
+                      <m:t>i</m:t>
+                    </m:r>
+                  </m:oMath>
+                </a14:m>
+                <a:r>
+                  <a:rPr lang="fr-FR" dirty="0">
+                    <a:solidFill>
+                      <a:srgbClr val="64B164"/>
+                    </a:solidFill>
+                  </a:rPr>
+                  <a:t> = négligeables</a:t>
+                </a:r>
+              </a:p>
+            </p:txBody>
+          </p:sp>
+        </mc:Choice>
+        <mc:Fallback>
+          <p:sp>
+            <p:nvSpPr>
+              <p:cNvPr id="12" name="ZoneTexte 11">
+                <a:extLst>
+                  <a:ext uri="{FF2B5EF4-FFF2-40B4-BE49-F238E27FC236}">
+                    <a16:creationId xmlns:a16="http://schemas.microsoft.com/office/drawing/2014/main" id="{E0489D23-597E-47E4-9C25-42A0E152A55F}"/>
+                  </a:ext>
+                </a:extLst>
+              </p:cNvPr>
+              <p:cNvSpPr txBox="1">
+                <a:spLocks noRot="1" noChangeAspect="1" noMove="1" noResize="1" noEditPoints="1" noAdjustHandles="1" noChangeArrowheads="1" noChangeShapeType="1" noTextEdit="1"/>
+              </p:cNvSpPr>
+              <p:nvPr/>
+            </p:nvSpPr>
+            <p:spPr>
+              <a:xfrm>
+                <a:off x="8280000" y="180000"/>
+                <a:ext cx="3823354" cy="1200329"/>
+              </a:xfrm>
+              <a:prstGeom prst="rect">
+                <a:avLst/>
+              </a:prstGeom>
+              <a:blipFill>
+                <a:blip r:embed="rId5"/>
+                <a:stretch>
+                  <a:fillRect l="-1113" t="-2525" r="-795" b="-7071"/>
+                </a:stretch>
+              </a:blipFill>
+              <a:ln>
+                <a:solidFill>
+                  <a:schemeClr val="tx1"/>
+                </a:solidFill>
+              </a:ln>
+            </p:spPr>
+            <p:txBody>
+              <a:bodyPr/>
+              <a:lstStyle/>
+              <a:p>
+                <a:r>
+                  <a:rPr lang="fr-FR">
+                    <a:noFill/>
+                  </a:rPr>
+                  <a:t> </a:t>
+                </a:r>
+              </a:p>
+            </p:txBody>
+          </p:sp>
+        </mc:Fallback>
+      </mc:AlternateContent>
     </p:spTree>
     <p:extLst>
       <p:ext uri="{BB962C8B-B14F-4D97-AF65-F5344CB8AC3E}">
-        <p14:creationId xmlns:p14="http://schemas.microsoft.com/office/powerpoint/2010/main" val="3814144576"/>
+        <p14:creationId xmlns:p14="http://schemas.microsoft.com/office/powerpoint/2010/main" val="2250738715"/>
       </p:ext>
     </p:extLst>
   </p:cSld>
@@ -10132,12 +12722,47 @@
           <a:chExt cx="0" cy="0"/>
         </a:xfrm>
       </p:grpSpPr>
+      <p:pic>
+        <p:nvPicPr>
+          <p:cNvPr id="5" name="Image 4">
+            <a:extLst>
+              <a:ext uri="{FF2B5EF4-FFF2-40B4-BE49-F238E27FC236}">
+                <a16:creationId xmlns:a16="http://schemas.microsoft.com/office/drawing/2014/main" id="{91BEA5F4-E97B-47A0-AC0A-D3E3449B9E72}"/>
+              </a:ext>
+            </a:extLst>
+          </p:cNvPr>
+          <p:cNvPicPr>
+            <a:picLocks noChangeAspect="1"/>
+          </p:cNvPicPr>
+          <p:nvPr/>
+        </p:nvPicPr>
+        <p:blipFill>
+          <a:blip r:embed="rId2">
+            <a:extLst>
+              <a:ext uri="{28A0092B-C50C-407E-A947-70E740481C1C}">
+                <a14:useLocalDpi xmlns:a14="http://schemas.microsoft.com/office/drawing/2010/main" val="0"/>
+              </a:ext>
+            </a:extLst>
+          </a:blip>
+          <a:srcRect/>
+          <a:stretch/>
+        </p:blipFill>
+        <p:spPr>
+          <a:xfrm>
+            <a:off x="360000" y="1440000"/>
+            <a:ext cx="8484000" cy="5040000"/>
+          </a:xfrm>
+          <a:prstGeom prst="rect">
+            <a:avLst/>
+          </a:prstGeom>
+        </p:spPr>
+      </p:pic>
       <p:sp>
         <p:nvSpPr>
           <p:cNvPr id="2" name="Titre 1">
             <a:extLst>
               <a:ext uri="{FF2B5EF4-FFF2-40B4-BE49-F238E27FC236}">
-                <a16:creationId xmlns:a16="http://schemas.microsoft.com/office/drawing/2014/main" id="{D0902EAC-08A5-4F86-BA0C-296DC5B4C3F0}"/>
+                <a16:creationId xmlns:a16="http://schemas.microsoft.com/office/drawing/2014/main" id="{6E12BD60-FFB7-4FFC-8A8F-58ABA2B92C65}"/>
               </a:ext>
             </a:extLst>
           </p:cNvPr>
@@ -10155,13 +12780,8 @@
           <a:p>
             <a:r>
               <a:rPr lang="fr-FR" dirty="0"/>
-              <a:t>Comparaison performances brute/</a:t>
+              <a:t>optimized.py =&gt; Pseudocode</a:t>
             </a:r>
-            <a:r>
-              <a:rPr lang="fr-FR" dirty="0" err="1"/>
-              <a:t>opti</a:t>
-            </a:r>
-            <a:endParaRPr lang="fr-FR" dirty="0"/>
           </a:p>
         </p:txBody>
       </p:sp>
@@ -10170,7 +12790,7 @@
           <p:cNvPr id="3" name="Espace réservé du numéro de diapositive 2">
             <a:extLst>
               <a:ext uri="{FF2B5EF4-FFF2-40B4-BE49-F238E27FC236}">
-                <a16:creationId xmlns:a16="http://schemas.microsoft.com/office/drawing/2014/main" id="{C16F43A3-9526-46B7-AFCD-BAB05B23A532}"/>
+                <a16:creationId xmlns:a16="http://schemas.microsoft.com/office/drawing/2014/main" id="{5F9381FE-7645-4B0D-93DB-6C2975E58491}"/>
               </a:ext>
             </a:extLst>
           </p:cNvPr>
@@ -10195,10 +12815,1246 @@
           </a:p>
         </p:txBody>
       </p:sp>
+      <p:sp>
+        <p:nvSpPr>
+          <p:cNvPr id="7" name="Accolade fermante 6">
+            <a:extLst>
+              <a:ext uri="{FF2B5EF4-FFF2-40B4-BE49-F238E27FC236}">
+                <a16:creationId xmlns:a16="http://schemas.microsoft.com/office/drawing/2014/main" id="{430ABDDF-F06D-455D-89DB-593C57B40396}"/>
+              </a:ext>
+            </a:extLst>
+          </p:cNvPr>
+          <p:cNvSpPr/>
+          <p:nvPr/>
+        </p:nvSpPr>
+        <p:spPr>
+          <a:xfrm>
+            <a:off x="6480000" y="1690690"/>
+            <a:ext cx="362583" cy="937007"/>
+          </a:xfrm>
+          <a:prstGeom prst="rightBrace">
+            <a:avLst>
+              <a:gd name="adj1" fmla="val 6862"/>
+              <a:gd name="adj2" fmla="val 51471"/>
+            </a:avLst>
+          </a:prstGeom>
+          <a:ln w="15875">
+            <a:solidFill>
+              <a:srgbClr val="64B164"/>
+            </a:solidFill>
+          </a:ln>
+        </p:spPr>
+        <p:style>
+          <a:lnRef idx="1">
+            <a:schemeClr val="accent1"/>
+          </a:lnRef>
+          <a:fillRef idx="0">
+            <a:schemeClr val="accent1"/>
+          </a:fillRef>
+          <a:effectRef idx="0">
+            <a:schemeClr val="accent1"/>
+          </a:effectRef>
+          <a:fontRef idx="minor">
+            <a:schemeClr val="tx1"/>
+          </a:fontRef>
+        </p:style>
+        <p:txBody>
+          <a:bodyPr rtlCol="0" anchor="ctr"/>
+          <a:lstStyle/>
+          <a:p>
+            <a:pPr algn="ctr"/>
+            <a:endParaRPr lang="fr-FR"/>
+          </a:p>
+        </p:txBody>
+      </p:sp>
+      <mc:AlternateContent xmlns:mc="http://schemas.openxmlformats.org/markup-compatibility/2006">
+        <mc:Choice xmlns:a14="http://schemas.microsoft.com/office/drawing/2010/main" Requires="a14">
+          <p:sp>
+            <p:nvSpPr>
+              <p:cNvPr id="8" name="Rectangle 7">
+                <a:extLst>
+                  <a:ext uri="{FF2B5EF4-FFF2-40B4-BE49-F238E27FC236}">
+                    <a16:creationId xmlns:a16="http://schemas.microsoft.com/office/drawing/2014/main" id="{6617E168-27F5-4281-AAA0-DF03158F7AF7}"/>
+                  </a:ext>
+                </a:extLst>
+              </p:cNvPr>
+              <p:cNvSpPr/>
+              <p:nvPr/>
+            </p:nvSpPr>
+            <p:spPr>
+              <a:xfrm>
+                <a:off x="7115963" y="1974527"/>
+                <a:ext cx="2060436" cy="369332"/>
+              </a:xfrm>
+              <a:prstGeom prst="rect">
+                <a:avLst/>
+              </a:prstGeom>
+            </p:spPr>
+            <p:txBody>
+              <a:bodyPr wrap="none">
+                <a:spAutoFit/>
+              </a:bodyPr>
+              <a:lstStyle/>
+              <a:p>
+                <a:pPr/>
+                <a14:m>
+                  <m:oMathPara xmlns:m="http://schemas.openxmlformats.org/officeDocument/2006/math">
+                    <m:oMathParaPr>
+                      <m:jc m:val="left"/>
+                    </m:oMathParaPr>
+                    <m:oMath xmlns:m="http://schemas.openxmlformats.org/officeDocument/2006/math">
+                      <m:d>
+                        <m:dPr>
+                          <m:begChr m:val=""/>
+                          <m:ctrlPr>
+                            <a:rPr lang="fr-FR" smtClean="0">
+                              <a:solidFill>
+                                <a:srgbClr val="66D9EF"/>
+                              </a:solidFill>
+                              <a:latin typeface="Cambria Math" panose="02040503050406030204" pitchFamily="18" charset="0"/>
+                            </a:rPr>
+                          </m:ctrlPr>
+                        </m:dPr>
+                        <m:e>
+                          <m:sSub>
+                            <m:sSubPr>
+                              <m:ctrlPr>
+                                <a:rPr lang="fr-FR">
+                                  <a:solidFill>
+                                    <a:srgbClr val="66D9EF"/>
+                                  </a:solidFill>
+                                  <a:latin typeface="Cambria Math" panose="02040503050406030204" pitchFamily="18" charset="0"/>
+                                </a:rPr>
+                              </m:ctrlPr>
+                            </m:sSubPr>
+                            <m:e>
+                              <m:r>
+                                <m:rPr>
+                                  <m:sty m:val="p"/>
+                                </m:rPr>
+                                <a:rPr lang="fr-FR">
+                                  <a:solidFill>
+                                    <a:srgbClr val="66D9EF"/>
+                                  </a:solidFill>
+                                  <a:latin typeface="Cambria Math" panose="02040503050406030204" pitchFamily="18" charset="0"/>
+                                </a:rPr>
+                                <m:t>Ο</m:t>
+                              </m:r>
+                            </m:e>
+                            <m:sub>
+                              <m:r>
+                                <a:rPr lang="fr-FR" i="0">
+                                  <a:solidFill>
+                                    <a:srgbClr val="66D9EF"/>
+                                  </a:solidFill>
+                                  <a:latin typeface="Cambria Math" panose="02040503050406030204" pitchFamily="18" charset="0"/>
+                                </a:rPr>
+                                <m:t>5</m:t>
+                              </m:r>
+                            </m:sub>
+                          </m:sSub>
+                          <m:d>
+                            <m:dPr>
+                              <m:ctrlPr>
+                                <a:rPr lang="fr-FR" i="1">
+                                  <a:solidFill>
+                                    <a:srgbClr val="66D9EF"/>
+                                  </a:solidFill>
+                                  <a:latin typeface="Cambria Math" panose="02040503050406030204" pitchFamily="18" charset="0"/>
+                                </a:rPr>
+                              </m:ctrlPr>
+                            </m:dPr>
+                            <m:e>
+                              <m:sSub>
+                                <m:sSubPr>
+                                  <m:ctrlPr>
+                                    <a:rPr lang="fr-FR" i="1">
+                                      <a:solidFill>
+                                        <a:srgbClr val="66D9EF"/>
+                                      </a:solidFill>
+                                      <a:latin typeface="Cambria Math" panose="02040503050406030204" pitchFamily="18" charset="0"/>
+                                    </a:rPr>
+                                  </m:ctrlPr>
+                                </m:sSubPr>
+                                <m:e>
+                                  <m:r>
+                                    <m:rPr>
+                                      <m:sty m:val="p"/>
+                                    </m:rPr>
+                                    <a:rPr lang="fr-FR" i="0">
+                                      <a:solidFill>
+                                        <a:srgbClr val="66D9EF"/>
+                                      </a:solidFill>
+                                      <a:latin typeface="Cambria Math" panose="02040503050406030204" pitchFamily="18" charset="0"/>
+                                    </a:rPr>
+                                    <m:t>C</m:t>
+                                  </m:r>
+                                </m:e>
+                                <m:sub>
+                                  <m:r>
+                                    <a:rPr lang="fr-FR" i="0">
+                                      <a:solidFill>
+                                        <a:srgbClr val="66D9EF"/>
+                                      </a:solidFill>
+                                      <a:latin typeface="Cambria Math" panose="02040503050406030204" pitchFamily="18" charset="0"/>
+                                    </a:rPr>
+                                    <m:t>5</m:t>
+                                  </m:r>
+                                </m:sub>
+                              </m:sSub>
+                            </m:e>
+                          </m:d>
+                          <m:r>
+                            <a:rPr lang="fr-FR" i="0">
+                              <a:solidFill>
+                                <a:srgbClr val="66D9EF"/>
+                              </a:solidFill>
+                              <a:latin typeface="Cambria Math" panose="02040503050406030204" pitchFamily="18" charset="0"/>
+                            </a:rPr>
+                            <m:t>  =   </m:t>
+                          </m:r>
+                          <m:sSub>
+                            <m:sSubPr>
+                              <m:ctrlPr>
+                                <a:rPr lang="fr-FR" i="1">
+                                  <a:solidFill>
+                                    <a:srgbClr val="66D9EF"/>
+                                  </a:solidFill>
+                                  <a:latin typeface="Cambria Math" panose="02040503050406030204" pitchFamily="18" charset="0"/>
+                                </a:rPr>
+                              </m:ctrlPr>
+                            </m:sSubPr>
+                            <m:e>
+                              <m:r>
+                                <m:rPr>
+                                  <m:sty m:val="p"/>
+                                </m:rPr>
+                                <a:rPr lang="fr-FR" i="0">
+                                  <a:solidFill>
+                                    <a:srgbClr val="66D9EF"/>
+                                  </a:solidFill>
+                                  <a:latin typeface="Cambria Math" panose="02040503050406030204" pitchFamily="18" charset="0"/>
+                                </a:rPr>
+                                <m:t>Ο</m:t>
+                              </m:r>
+                            </m:e>
+                            <m:sub>
+                              <m:r>
+                                <a:rPr lang="fr-FR" i="0">
+                                  <a:solidFill>
+                                    <a:srgbClr val="66D9EF"/>
+                                  </a:solidFill>
+                                  <a:latin typeface="Cambria Math" panose="02040503050406030204" pitchFamily="18" charset="0"/>
+                                </a:rPr>
+                                <m:t>5</m:t>
+                              </m:r>
+                            </m:sub>
+                          </m:sSub>
+                          <m:r>
+                            <a:rPr lang="fr-FR" i="0">
+                              <a:solidFill>
+                                <a:srgbClr val="66D9EF"/>
+                              </a:solidFill>
+                              <a:latin typeface="Cambria Math" panose="02040503050406030204" pitchFamily="18" charset="0"/>
+                            </a:rPr>
+                            <m:t>(1</m:t>
+                          </m:r>
+                        </m:e>
+                      </m:d>
+                    </m:oMath>
+                  </m:oMathPara>
+                </a14:m>
+                <a:endParaRPr lang="fr-FR" dirty="0">
+                  <a:solidFill>
+                    <a:srgbClr val="66D9EF"/>
+                  </a:solidFill>
+                </a:endParaRPr>
+              </a:p>
+            </p:txBody>
+          </p:sp>
+        </mc:Choice>
+        <mc:Fallback>
+          <p:sp>
+            <p:nvSpPr>
+              <p:cNvPr id="8" name="Rectangle 7">
+                <a:extLst>
+                  <a:ext uri="{FF2B5EF4-FFF2-40B4-BE49-F238E27FC236}">
+                    <a16:creationId xmlns:a16="http://schemas.microsoft.com/office/drawing/2014/main" id="{6617E168-27F5-4281-AAA0-DF03158F7AF7}"/>
+                  </a:ext>
+                </a:extLst>
+              </p:cNvPr>
+              <p:cNvSpPr>
+                <a:spLocks noRot="1" noChangeAspect="1" noMove="1" noResize="1" noEditPoints="1" noAdjustHandles="1" noChangeArrowheads="1" noChangeShapeType="1" noTextEdit="1"/>
+              </p:cNvSpPr>
+              <p:nvPr/>
+            </p:nvSpPr>
+            <p:spPr>
+              <a:xfrm>
+                <a:off x="7115963" y="1974527"/>
+                <a:ext cx="2060436" cy="369332"/>
+              </a:xfrm>
+              <a:prstGeom prst="rect">
+                <a:avLst/>
+              </a:prstGeom>
+              <a:blipFill>
+                <a:blip r:embed="rId3"/>
+                <a:stretch>
+                  <a:fillRect t="-121667" r="-23077" b="-188333"/>
+                </a:stretch>
+              </a:blipFill>
+            </p:spPr>
+            <p:txBody>
+              <a:bodyPr/>
+              <a:lstStyle/>
+              <a:p>
+                <a:r>
+                  <a:rPr lang="fr-FR">
+                    <a:noFill/>
+                  </a:rPr>
+                  <a:t> </a:t>
+                </a:r>
+              </a:p>
+            </p:txBody>
+          </p:sp>
+        </mc:Fallback>
+      </mc:AlternateContent>
+      <p:sp>
+        <p:nvSpPr>
+          <p:cNvPr id="10" name="ZoneTexte 9">
+            <a:extLst>
+              <a:ext uri="{FF2B5EF4-FFF2-40B4-BE49-F238E27FC236}">
+                <a16:creationId xmlns:a16="http://schemas.microsoft.com/office/drawing/2014/main" id="{69989E2D-68EA-4A74-9B7F-5A16F2F572AA}"/>
+              </a:ext>
+            </a:extLst>
+          </p:cNvPr>
+          <p:cNvSpPr txBox="1"/>
+          <p:nvPr/>
+        </p:nvSpPr>
+        <p:spPr>
+          <a:xfrm>
+            <a:off x="2160000" y="3420000"/>
+            <a:ext cx="3836628" cy="369332"/>
+          </a:xfrm>
+          <a:prstGeom prst="rect">
+            <a:avLst/>
+          </a:prstGeom>
+          <a:noFill/>
+        </p:spPr>
+        <p:txBody>
+          <a:bodyPr wrap="none" rtlCol="0">
+            <a:spAutoFit/>
+          </a:bodyPr>
+          <a:lstStyle/>
+          <a:p>
+            <a:r>
+              <a:rPr lang="fr-FR" dirty="0">
+                <a:solidFill>
+                  <a:srgbClr val="64B164"/>
+                </a:solidFill>
+              </a:rPr>
+              <a:t>Soit, pour l’ensemble de optimized.py :</a:t>
+            </a:r>
+          </a:p>
+        </p:txBody>
+      </p:sp>
+      <mc:AlternateContent xmlns:mc="http://schemas.openxmlformats.org/markup-compatibility/2006">
+        <mc:Choice xmlns:a14="http://schemas.microsoft.com/office/drawing/2010/main" Requires="a14">
+          <p:sp>
+            <p:nvSpPr>
+              <p:cNvPr id="11" name="Rectangle 10">
+                <a:extLst>
+                  <a:ext uri="{FF2B5EF4-FFF2-40B4-BE49-F238E27FC236}">
+                    <a16:creationId xmlns:a16="http://schemas.microsoft.com/office/drawing/2014/main" id="{406DF2A9-74C4-464E-999E-12A22D7B3BCF}"/>
+                  </a:ext>
+                </a:extLst>
+              </p:cNvPr>
+              <p:cNvSpPr/>
+              <p:nvPr/>
+            </p:nvSpPr>
+            <p:spPr>
+              <a:xfrm>
+                <a:off x="2541069" y="3960000"/>
+                <a:ext cx="7109861" cy="369332"/>
+              </a:xfrm>
+              <a:prstGeom prst="rect">
+                <a:avLst/>
+              </a:prstGeom>
+            </p:spPr>
+            <p:txBody>
+              <a:bodyPr wrap="square">
+                <a:spAutoFit/>
+              </a:bodyPr>
+              <a:lstStyle/>
+              <a:p>
+                <a:pPr/>
+                <a14:m>
+                  <m:oMathPara xmlns:m="http://schemas.openxmlformats.org/officeDocument/2006/math">
+                    <m:oMathParaPr>
+                      <m:jc m:val="center"/>
+                    </m:oMathParaPr>
+                    <m:oMath xmlns:m="http://schemas.openxmlformats.org/officeDocument/2006/math">
+                      <m:r>
+                        <m:rPr>
+                          <m:sty m:val="p"/>
+                        </m:rPr>
+                        <a:rPr lang="fr-FR" smtClean="0">
+                          <a:solidFill>
+                            <a:srgbClr val="66D9EF"/>
+                          </a:solidFill>
+                          <a:latin typeface="Cambria Math" panose="02040503050406030204" pitchFamily="18" charset="0"/>
+                        </a:rPr>
+                        <m:t>Ο</m:t>
+                      </m:r>
+                      <m:d>
+                        <m:dPr>
+                          <m:ctrlPr>
+                            <a:rPr lang="fr-FR" i="1">
+                              <a:solidFill>
+                                <a:srgbClr val="66D9EF"/>
+                              </a:solidFill>
+                              <a:latin typeface="Cambria Math" panose="02040503050406030204" pitchFamily="18" charset="0"/>
+                            </a:rPr>
+                          </m:ctrlPr>
+                        </m:dPr>
+                        <m:e>
+                          <m:sSub>
+                            <m:sSubPr>
+                              <m:ctrlPr>
+                                <a:rPr lang="fr-FR" i="1">
+                                  <a:solidFill>
+                                    <a:srgbClr val="66D9EF"/>
+                                  </a:solidFill>
+                                  <a:latin typeface="Cambria Math" panose="02040503050406030204" pitchFamily="18" charset="0"/>
+                                </a:rPr>
+                              </m:ctrlPr>
+                            </m:sSubPr>
+                            <m:e>
+                              <m:r>
+                                <m:rPr>
+                                  <m:sty m:val="p"/>
+                                </m:rPr>
+                                <a:rPr lang="fr-FR" i="0">
+                                  <a:solidFill>
+                                    <a:srgbClr val="66D9EF"/>
+                                  </a:solidFill>
+                                  <a:latin typeface="Cambria Math" panose="02040503050406030204" pitchFamily="18" charset="0"/>
+                                </a:rPr>
+                                <m:t>Ο</m:t>
+                              </m:r>
+                            </m:e>
+                            <m:sub>
+                              <m:r>
+                                <a:rPr lang="fr-FR" i="0">
+                                  <a:solidFill>
+                                    <a:srgbClr val="66D9EF"/>
+                                  </a:solidFill>
+                                  <a:latin typeface="Cambria Math" panose="02040503050406030204" pitchFamily="18" charset="0"/>
+                                </a:rPr>
+                                <m:t>1</m:t>
+                              </m:r>
+                            </m:sub>
+                          </m:sSub>
+                          <m:r>
+                            <a:rPr lang="fr-FR" i="0">
+                              <a:solidFill>
+                                <a:srgbClr val="66D9EF"/>
+                              </a:solidFill>
+                              <a:latin typeface="Cambria Math" panose="02040503050406030204" pitchFamily="18" charset="0"/>
+                            </a:rPr>
+                            <m:t>+</m:t>
+                          </m:r>
+                          <m:sSub>
+                            <m:sSubPr>
+                              <m:ctrlPr>
+                                <a:rPr lang="fr-FR" i="1">
+                                  <a:solidFill>
+                                    <a:srgbClr val="66D9EF"/>
+                                  </a:solidFill>
+                                  <a:latin typeface="Cambria Math" panose="02040503050406030204" pitchFamily="18" charset="0"/>
+                                </a:rPr>
+                              </m:ctrlPr>
+                            </m:sSubPr>
+                            <m:e>
+                              <m:r>
+                                <m:rPr>
+                                  <m:sty m:val="p"/>
+                                </m:rPr>
+                                <a:rPr lang="fr-FR" i="0">
+                                  <a:solidFill>
+                                    <a:srgbClr val="66D9EF"/>
+                                  </a:solidFill>
+                                  <a:latin typeface="Cambria Math" panose="02040503050406030204" pitchFamily="18" charset="0"/>
+                                </a:rPr>
+                                <m:t>Ο</m:t>
+                              </m:r>
+                            </m:e>
+                            <m:sub>
+                              <m:r>
+                                <a:rPr lang="fr-FR" i="0">
+                                  <a:solidFill>
+                                    <a:srgbClr val="66D9EF"/>
+                                  </a:solidFill>
+                                  <a:latin typeface="Cambria Math" panose="02040503050406030204" pitchFamily="18" charset="0"/>
+                                </a:rPr>
+                                <m:t>2</m:t>
+                              </m:r>
+                            </m:sub>
+                          </m:sSub>
+                          <m:r>
+                            <a:rPr lang="fr-FR" i="0">
+                              <a:solidFill>
+                                <a:srgbClr val="66D9EF"/>
+                              </a:solidFill>
+                              <a:latin typeface="Cambria Math" panose="02040503050406030204" pitchFamily="18" charset="0"/>
+                            </a:rPr>
+                            <m:t>+</m:t>
+                          </m:r>
+                          <m:sSub>
+                            <m:sSubPr>
+                              <m:ctrlPr>
+                                <a:rPr lang="fr-FR" i="1">
+                                  <a:solidFill>
+                                    <a:srgbClr val="66D9EF"/>
+                                  </a:solidFill>
+                                  <a:latin typeface="Cambria Math" panose="02040503050406030204" pitchFamily="18" charset="0"/>
+                                </a:rPr>
+                              </m:ctrlPr>
+                            </m:sSubPr>
+                            <m:e>
+                              <m:r>
+                                <m:rPr>
+                                  <m:sty m:val="p"/>
+                                </m:rPr>
+                                <a:rPr lang="fr-FR" i="0">
+                                  <a:solidFill>
+                                    <a:srgbClr val="66D9EF"/>
+                                  </a:solidFill>
+                                  <a:latin typeface="Cambria Math" panose="02040503050406030204" pitchFamily="18" charset="0"/>
+                                </a:rPr>
+                                <m:t>Ο</m:t>
+                              </m:r>
+                            </m:e>
+                            <m:sub>
+                              <m:r>
+                                <a:rPr lang="fr-FR" i="0">
+                                  <a:solidFill>
+                                    <a:srgbClr val="66D9EF"/>
+                                  </a:solidFill>
+                                  <a:latin typeface="Cambria Math" panose="02040503050406030204" pitchFamily="18" charset="0"/>
+                                </a:rPr>
+                                <m:t>3</m:t>
+                              </m:r>
+                            </m:sub>
+                          </m:sSub>
+                          <m:r>
+                            <a:rPr lang="fr-FR" i="0">
+                              <a:solidFill>
+                                <a:srgbClr val="66D9EF"/>
+                              </a:solidFill>
+                              <a:latin typeface="Cambria Math" panose="02040503050406030204" pitchFamily="18" charset="0"/>
+                            </a:rPr>
+                            <m:t>+</m:t>
+                          </m:r>
+                          <m:sSub>
+                            <m:sSubPr>
+                              <m:ctrlPr>
+                                <a:rPr lang="fr-FR" i="1">
+                                  <a:solidFill>
+                                    <a:srgbClr val="66D9EF"/>
+                                  </a:solidFill>
+                                  <a:latin typeface="Cambria Math" panose="02040503050406030204" pitchFamily="18" charset="0"/>
+                                </a:rPr>
+                              </m:ctrlPr>
+                            </m:sSubPr>
+                            <m:e>
+                              <m:r>
+                                <m:rPr>
+                                  <m:sty m:val="p"/>
+                                </m:rPr>
+                                <a:rPr lang="fr-FR" i="0">
+                                  <a:solidFill>
+                                    <a:srgbClr val="66D9EF"/>
+                                  </a:solidFill>
+                                  <a:latin typeface="Cambria Math" panose="02040503050406030204" pitchFamily="18" charset="0"/>
+                                </a:rPr>
+                                <m:t>Ο</m:t>
+                              </m:r>
+                            </m:e>
+                            <m:sub>
+                              <m:r>
+                                <a:rPr lang="fr-FR" i="0">
+                                  <a:solidFill>
+                                    <a:srgbClr val="66D9EF"/>
+                                  </a:solidFill>
+                                  <a:latin typeface="Cambria Math" panose="02040503050406030204" pitchFamily="18" charset="0"/>
+                                </a:rPr>
+                                <m:t>4</m:t>
+                              </m:r>
+                            </m:sub>
+                          </m:sSub>
+                          <m:r>
+                            <a:rPr lang="fr-FR" i="0">
+                              <a:solidFill>
+                                <a:srgbClr val="66D9EF"/>
+                              </a:solidFill>
+                              <a:latin typeface="Cambria Math" panose="02040503050406030204" pitchFamily="18" charset="0"/>
+                            </a:rPr>
+                            <m:t>+</m:t>
+                          </m:r>
+                          <m:sSub>
+                            <m:sSubPr>
+                              <m:ctrlPr>
+                                <a:rPr lang="fr-FR" i="1">
+                                  <a:solidFill>
+                                    <a:srgbClr val="66D9EF"/>
+                                  </a:solidFill>
+                                  <a:latin typeface="Cambria Math" panose="02040503050406030204" pitchFamily="18" charset="0"/>
+                                </a:rPr>
+                              </m:ctrlPr>
+                            </m:sSubPr>
+                            <m:e>
+                              <m:r>
+                                <m:rPr>
+                                  <m:sty m:val="p"/>
+                                </m:rPr>
+                                <a:rPr lang="fr-FR" i="0">
+                                  <a:solidFill>
+                                    <a:srgbClr val="66D9EF"/>
+                                  </a:solidFill>
+                                  <a:latin typeface="Cambria Math" panose="02040503050406030204" pitchFamily="18" charset="0"/>
+                                </a:rPr>
+                                <m:t>Ο</m:t>
+                              </m:r>
+                            </m:e>
+                            <m:sub>
+                              <m:r>
+                                <a:rPr lang="fr-FR" i="0">
+                                  <a:solidFill>
+                                    <a:srgbClr val="66D9EF"/>
+                                  </a:solidFill>
+                                  <a:latin typeface="Cambria Math" panose="02040503050406030204" pitchFamily="18" charset="0"/>
+                                </a:rPr>
+                                <m:t>5</m:t>
+                              </m:r>
+                            </m:sub>
+                          </m:sSub>
+                        </m:e>
+                      </m:d>
+                      <m:r>
+                        <a:rPr lang="fr-FR" i="0">
+                          <a:solidFill>
+                            <a:srgbClr val="66D9EF"/>
+                          </a:solidFill>
+                          <a:latin typeface="Cambria Math" panose="02040503050406030204" pitchFamily="18" charset="0"/>
+                        </a:rPr>
+                        <m:t>+</m:t>
+                      </m:r>
+                      <m:r>
+                        <a:rPr lang="fr-FR" i="1">
+                          <a:solidFill>
+                            <a:srgbClr val="66D9EF"/>
+                          </a:solidFill>
+                          <a:latin typeface="Cambria Math" panose="02040503050406030204" pitchFamily="18" charset="0"/>
+                        </a:rPr>
+                        <m:t>𝜖</m:t>
+                      </m:r>
+                      <m:r>
+                        <a:rPr lang="fr-FR" i="0">
+                          <a:solidFill>
+                            <a:srgbClr val="66D9EF"/>
+                          </a:solidFill>
+                          <a:latin typeface="Cambria Math" panose="02040503050406030204" pitchFamily="18" charset="0"/>
+                        </a:rPr>
+                        <m:t>  =   </m:t>
+                      </m:r>
+                      <m:r>
+                        <m:rPr>
+                          <m:sty m:val="p"/>
+                        </m:rPr>
+                        <a:rPr lang="fr-FR" i="0">
+                          <a:solidFill>
+                            <a:srgbClr val="66D9EF"/>
+                          </a:solidFill>
+                          <a:latin typeface="Cambria Math" panose="02040503050406030204" pitchFamily="18" charset="0"/>
+                        </a:rPr>
+                        <m:t>Ο</m:t>
+                      </m:r>
+                      <m:d>
+                        <m:dPr>
+                          <m:ctrlPr>
+                            <a:rPr lang="fr-FR" i="1">
+                              <a:solidFill>
+                                <a:srgbClr val="66D9EF"/>
+                              </a:solidFill>
+                              <a:latin typeface="Cambria Math" panose="02040503050406030204" pitchFamily="18" charset="0"/>
+                            </a:rPr>
+                          </m:ctrlPr>
+                        </m:dPr>
+                        <m:e>
+                          <m:r>
+                            <a:rPr lang="fr-FR" i="1">
+                              <a:solidFill>
+                                <a:srgbClr val="66D9EF"/>
+                              </a:solidFill>
+                              <a:latin typeface="Cambria Math" panose="02040503050406030204" pitchFamily="18" charset="0"/>
+                            </a:rPr>
+                            <m:t>𝑛</m:t>
+                          </m:r>
+                          <m:r>
+                            <a:rPr lang="fr-FR" i="0">
+                              <a:solidFill>
+                                <a:srgbClr val="66D9EF"/>
+                              </a:solidFill>
+                              <a:latin typeface="Cambria Math" panose="02040503050406030204" pitchFamily="18" charset="0"/>
+                            </a:rPr>
+                            <m:t>+</m:t>
+                          </m:r>
+                          <m:r>
+                            <a:rPr lang="fr-FR" i="1">
+                              <a:solidFill>
+                                <a:srgbClr val="66D9EF"/>
+                              </a:solidFill>
+                              <a:latin typeface="Cambria Math" panose="02040503050406030204" pitchFamily="18" charset="0"/>
+                            </a:rPr>
+                            <m:t>𝑛𝑙𝑜𝑔</m:t>
+                          </m:r>
+                          <m:d>
+                            <m:dPr>
+                              <m:ctrlPr>
+                                <a:rPr lang="fr-FR" i="1">
+                                  <a:solidFill>
+                                    <a:srgbClr val="66D9EF"/>
+                                  </a:solidFill>
+                                  <a:latin typeface="Cambria Math" panose="02040503050406030204" pitchFamily="18" charset="0"/>
+                                </a:rPr>
+                              </m:ctrlPr>
+                            </m:dPr>
+                            <m:e>
+                              <m:r>
+                                <a:rPr lang="fr-FR" i="1">
+                                  <a:solidFill>
+                                    <a:srgbClr val="66D9EF"/>
+                                  </a:solidFill>
+                                  <a:latin typeface="Cambria Math" panose="02040503050406030204" pitchFamily="18" charset="0"/>
+                                </a:rPr>
+                                <m:t>𝑛</m:t>
+                              </m:r>
+                            </m:e>
+                          </m:d>
+                          <m:r>
+                            <a:rPr lang="fr-FR" i="0">
+                              <a:solidFill>
+                                <a:srgbClr val="66D9EF"/>
+                              </a:solidFill>
+                              <a:latin typeface="Cambria Math" panose="02040503050406030204" pitchFamily="18" charset="0"/>
+                            </a:rPr>
+                            <m:t>+</m:t>
+                          </m:r>
+                          <m:r>
+                            <a:rPr lang="fr-FR" i="1">
+                              <a:solidFill>
+                                <a:srgbClr val="66D9EF"/>
+                              </a:solidFill>
+                              <a:latin typeface="Cambria Math" panose="02040503050406030204" pitchFamily="18" charset="0"/>
+                            </a:rPr>
+                            <m:t>𝑛</m:t>
+                          </m:r>
+                          <m:r>
+                            <a:rPr lang="fr-FR" i="0">
+                              <a:solidFill>
+                                <a:srgbClr val="66D9EF"/>
+                              </a:solidFill>
+                              <a:latin typeface="Cambria Math" panose="02040503050406030204" pitchFamily="18" charset="0"/>
+                            </a:rPr>
+                            <m:t>+</m:t>
+                          </m:r>
+                          <m:sSub>
+                            <m:sSubPr>
+                              <m:ctrlPr>
+                                <a:rPr lang="fr-FR" i="1">
+                                  <a:solidFill>
+                                    <a:srgbClr val="66D9EF"/>
+                                  </a:solidFill>
+                                  <a:latin typeface="Cambria Math" panose="02040503050406030204" pitchFamily="18" charset="0"/>
+                                </a:rPr>
+                              </m:ctrlPr>
+                            </m:sSubPr>
+                            <m:e>
+                              <m:r>
+                                <a:rPr lang="fr-FR" i="1">
+                                  <a:solidFill>
+                                    <a:srgbClr val="66D9EF"/>
+                                  </a:solidFill>
+                                  <a:latin typeface="Cambria Math" panose="02040503050406030204" pitchFamily="18" charset="0"/>
+                                </a:rPr>
+                                <m:t>𝑛</m:t>
+                              </m:r>
+                            </m:e>
+                            <m:sub>
+                              <m:r>
+                                <a:rPr lang="fr-FR" i="1">
+                                  <a:solidFill>
+                                    <a:srgbClr val="66D9EF"/>
+                                  </a:solidFill>
+                                  <a:latin typeface="Cambria Math" panose="02040503050406030204" pitchFamily="18" charset="0"/>
+                                </a:rPr>
+                                <m:t>𝑎</m:t>
+                              </m:r>
+                            </m:sub>
+                          </m:sSub>
+                          <m:r>
+                            <a:rPr lang="fr-FR" i="0">
+                              <a:solidFill>
+                                <a:srgbClr val="66D9EF"/>
+                              </a:solidFill>
+                              <a:latin typeface="Cambria Math" panose="02040503050406030204" pitchFamily="18" charset="0"/>
+                            </a:rPr>
+                            <m:t>+1</m:t>
+                          </m:r>
+                        </m:e>
+                      </m:d>
+                      <m:r>
+                        <a:rPr lang="fr-FR" i="0">
+                          <a:solidFill>
+                            <a:srgbClr val="66D9EF"/>
+                          </a:solidFill>
+                          <a:latin typeface="Cambria Math" panose="02040503050406030204" pitchFamily="18" charset="0"/>
+                        </a:rPr>
+                        <m:t>+</m:t>
+                      </m:r>
+                      <m:r>
+                        <a:rPr lang="fr-FR" i="1">
+                          <a:solidFill>
+                            <a:srgbClr val="66D9EF"/>
+                          </a:solidFill>
+                          <a:latin typeface="Cambria Math" panose="02040503050406030204" pitchFamily="18" charset="0"/>
+                        </a:rPr>
+                        <m:t>𝜖</m:t>
+                      </m:r>
+                    </m:oMath>
+                  </m:oMathPara>
+                </a14:m>
+                <a:endParaRPr lang="fr-FR" dirty="0">
+                  <a:solidFill>
+                    <a:srgbClr val="66D9EF"/>
+                  </a:solidFill>
+                </a:endParaRPr>
+              </a:p>
+            </p:txBody>
+          </p:sp>
+        </mc:Choice>
+        <mc:Fallback>
+          <p:sp>
+            <p:nvSpPr>
+              <p:cNvPr id="11" name="Rectangle 10">
+                <a:extLst>
+                  <a:ext uri="{FF2B5EF4-FFF2-40B4-BE49-F238E27FC236}">
+                    <a16:creationId xmlns:a16="http://schemas.microsoft.com/office/drawing/2014/main" id="{406DF2A9-74C4-464E-999E-12A22D7B3BCF}"/>
+                  </a:ext>
+                </a:extLst>
+              </p:cNvPr>
+              <p:cNvSpPr>
+                <a:spLocks noRot="1" noChangeAspect="1" noMove="1" noResize="1" noEditPoints="1" noAdjustHandles="1" noChangeArrowheads="1" noChangeShapeType="1" noTextEdit="1"/>
+              </p:cNvSpPr>
+              <p:nvPr/>
+            </p:nvSpPr>
+            <p:spPr>
+              <a:xfrm>
+                <a:off x="2541069" y="3960000"/>
+                <a:ext cx="7109861" cy="369332"/>
+              </a:xfrm>
+              <a:prstGeom prst="rect">
+                <a:avLst/>
+              </a:prstGeom>
+              <a:blipFill>
+                <a:blip r:embed="rId4"/>
+                <a:stretch>
+                  <a:fillRect b="-13333"/>
+                </a:stretch>
+              </a:blipFill>
+            </p:spPr>
+            <p:txBody>
+              <a:bodyPr/>
+              <a:lstStyle/>
+              <a:p>
+                <a:r>
+                  <a:rPr lang="fr-FR">
+                    <a:noFill/>
+                  </a:rPr>
+                  <a:t> </a:t>
+                </a:r>
+              </a:p>
+            </p:txBody>
+          </p:sp>
+        </mc:Fallback>
+      </mc:AlternateContent>
+      <mc:AlternateContent xmlns:mc="http://schemas.openxmlformats.org/markup-compatibility/2006">
+        <mc:Choice xmlns:a14="http://schemas.microsoft.com/office/drawing/2010/main" Requires="a14">
+          <p:sp>
+            <p:nvSpPr>
+              <p:cNvPr id="12" name="Rectangle 11">
+                <a:extLst>
+                  <a:ext uri="{FF2B5EF4-FFF2-40B4-BE49-F238E27FC236}">
+                    <a16:creationId xmlns:a16="http://schemas.microsoft.com/office/drawing/2014/main" id="{53712C63-660E-4F57-BB3E-F4A31B4E7B59}"/>
+                  </a:ext>
+                </a:extLst>
+              </p:cNvPr>
+              <p:cNvSpPr/>
+              <p:nvPr/>
+            </p:nvSpPr>
+            <p:spPr>
+              <a:xfrm>
+                <a:off x="5201844" y="4680000"/>
+                <a:ext cx="1788310" cy="404983"/>
+              </a:xfrm>
+              <a:prstGeom prst="rect">
+                <a:avLst/>
+              </a:prstGeom>
+              <a:ln>
+                <a:solidFill>
+                  <a:srgbClr val="66D9EF"/>
+                </a:solidFill>
+              </a:ln>
+            </p:spPr>
+            <p:txBody>
+              <a:bodyPr wrap="none">
+                <a:spAutoFit/>
+              </a:bodyPr>
+              <a:lstStyle/>
+              <a:p>
+                <a:pPr/>
+                <a14:m>
+                  <m:oMathPara xmlns:m="http://schemas.openxmlformats.org/officeDocument/2006/math">
+                    <m:oMathParaPr>
+                      <m:jc m:val="center"/>
+                    </m:oMathParaPr>
+                    <m:oMath xmlns:m="http://schemas.openxmlformats.org/officeDocument/2006/math">
+                      <m:r>
+                        <m:rPr>
+                          <m:sty m:val="p"/>
+                        </m:rPr>
+                        <a:rPr lang="fr-FR" smtClean="0">
+                          <a:solidFill>
+                            <a:srgbClr val="66D9EF"/>
+                          </a:solidFill>
+                          <a:latin typeface="Cambria Math" panose="02040503050406030204" pitchFamily="18" charset="0"/>
+                        </a:rPr>
+                        <m:t>Ο</m:t>
+                      </m:r>
+                      <m:d>
+                        <m:dPr>
+                          <m:ctrlPr>
+                            <a:rPr lang="fr-FR" i="1">
+                              <a:solidFill>
+                                <a:srgbClr val="66D9EF"/>
+                              </a:solidFill>
+                              <a:latin typeface="Cambria Math" panose="02040503050406030204" pitchFamily="18" charset="0"/>
+                            </a:rPr>
+                          </m:ctrlPr>
+                        </m:dPr>
+                        <m:e>
+                          <m:r>
+                            <a:rPr lang="fr-FR" i="1">
+                              <a:solidFill>
+                                <a:srgbClr val="66D9EF"/>
+                              </a:solidFill>
+                              <a:latin typeface="Cambria Math" panose="02040503050406030204" pitchFamily="18" charset="0"/>
+                            </a:rPr>
+                            <m:t>𝑛𝑙𝑜𝑔</m:t>
+                          </m:r>
+                          <m:d>
+                            <m:dPr>
+                              <m:ctrlPr>
+                                <a:rPr lang="fr-FR" i="1">
+                                  <a:solidFill>
+                                    <a:srgbClr val="66D9EF"/>
+                                  </a:solidFill>
+                                  <a:latin typeface="Cambria Math" panose="02040503050406030204" pitchFamily="18" charset="0"/>
+                                </a:rPr>
+                              </m:ctrlPr>
+                            </m:dPr>
+                            <m:e>
+                              <m:r>
+                                <a:rPr lang="fr-FR" i="1">
+                                  <a:solidFill>
+                                    <a:srgbClr val="66D9EF"/>
+                                  </a:solidFill>
+                                  <a:latin typeface="Cambria Math" panose="02040503050406030204" pitchFamily="18" charset="0"/>
+                                </a:rPr>
+                                <m:t>𝑛</m:t>
+                              </m:r>
+                            </m:e>
+                          </m:d>
+                        </m:e>
+                      </m:d>
+                      <m:r>
+                        <a:rPr lang="fr-FR" i="0">
+                          <a:solidFill>
+                            <a:srgbClr val="66D9EF"/>
+                          </a:solidFill>
+                          <a:latin typeface="Cambria Math" panose="02040503050406030204" pitchFamily="18" charset="0"/>
+                        </a:rPr>
+                        <m:t>+</m:t>
+                      </m:r>
+                      <m:r>
+                        <a:rPr lang="fr-FR" i="1">
+                          <a:solidFill>
+                            <a:srgbClr val="66D9EF"/>
+                          </a:solidFill>
+                          <a:latin typeface="Cambria Math" panose="02040503050406030204" pitchFamily="18" charset="0"/>
+                        </a:rPr>
+                        <m:t>𝜖</m:t>
+                      </m:r>
+                    </m:oMath>
+                  </m:oMathPara>
+                </a14:m>
+                <a:endParaRPr lang="fr-FR" dirty="0">
+                  <a:solidFill>
+                    <a:srgbClr val="66D9EF"/>
+                  </a:solidFill>
+                </a:endParaRPr>
+              </a:p>
+            </p:txBody>
+          </p:sp>
+        </mc:Choice>
+        <mc:Fallback>
+          <p:sp>
+            <p:nvSpPr>
+              <p:cNvPr id="12" name="Rectangle 11">
+                <a:extLst>
+                  <a:ext uri="{FF2B5EF4-FFF2-40B4-BE49-F238E27FC236}">
+                    <a16:creationId xmlns:a16="http://schemas.microsoft.com/office/drawing/2014/main" id="{53712C63-660E-4F57-BB3E-F4A31B4E7B59}"/>
+                  </a:ext>
+                </a:extLst>
+              </p:cNvPr>
+              <p:cNvSpPr>
+                <a:spLocks noRot="1" noChangeAspect="1" noMove="1" noResize="1" noEditPoints="1" noAdjustHandles="1" noChangeArrowheads="1" noChangeShapeType="1" noTextEdit="1"/>
+              </p:cNvSpPr>
+              <p:nvPr/>
+            </p:nvSpPr>
+            <p:spPr>
+              <a:xfrm>
+                <a:off x="5201844" y="4680000"/>
+                <a:ext cx="1788310" cy="404983"/>
+              </a:xfrm>
+              <a:prstGeom prst="rect">
+                <a:avLst/>
+              </a:prstGeom>
+              <a:blipFill>
+                <a:blip r:embed="rId5"/>
+                <a:stretch>
+                  <a:fillRect b="-7353"/>
+                </a:stretch>
+              </a:blipFill>
+              <a:ln>
+                <a:solidFill>
+                  <a:srgbClr val="66D9EF"/>
+                </a:solidFill>
+              </a:ln>
+            </p:spPr>
+            <p:txBody>
+              <a:bodyPr/>
+              <a:lstStyle/>
+              <a:p>
+                <a:r>
+                  <a:rPr lang="fr-FR">
+                    <a:noFill/>
+                  </a:rPr>
+                  <a:t> </a:t>
+                </a:r>
+              </a:p>
+            </p:txBody>
+          </p:sp>
+        </mc:Fallback>
+      </mc:AlternateContent>
+      <mc:AlternateContent xmlns:mc="http://schemas.openxmlformats.org/markup-compatibility/2006">
+        <mc:Choice xmlns:a14="http://schemas.microsoft.com/office/drawing/2010/main" Requires="a14">
+          <p:sp>
+            <p:nvSpPr>
+              <p:cNvPr id="14" name="ZoneTexte 13">
+                <a:extLst>
+                  <a:ext uri="{FF2B5EF4-FFF2-40B4-BE49-F238E27FC236}">
+                    <a16:creationId xmlns:a16="http://schemas.microsoft.com/office/drawing/2014/main" id="{9E18651B-F120-499E-AC80-1CDD87269890}"/>
+                  </a:ext>
+                </a:extLst>
+              </p:cNvPr>
+              <p:cNvSpPr txBox="1"/>
+              <p:nvPr/>
+            </p:nvSpPr>
+            <p:spPr>
+              <a:xfrm>
+                <a:off x="8280000" y="180000"/>
+                <a:ext cx="3823354" cy="1200329"/>
+              </a:xfrm>
+              <a:prstGeom prst="rect">
+                <a:avLst/>
+              </a:prstGeom>
+              <a:noFill/>
+              <a:ln>
+                <a:solidFill>
+                  <a:schemeClr val="tx1"/>
+                </a:solidFill>
+              </a:ln>
+            </p:spPr>
+            <p:txBody>
+              <a:bodyPr wrap="none" rtlCol="0">
+                <a:spAutoFit/>
+              </a:bodyPr>
+              <a:lstStyle/>
+              <a:p>
+                <a:r>
+                  <a:rPr lang="fr-FR" dirty="0">
+                    <a:solidFill>
+                      <a:srgbClr val="64B164"/>
+                    </a:solidFill>
+                  </a:rPr>
+                  <a:t>n = nombre d’actions du fichier</a:t>
+                </a:r>
+              </a:p>
+              <a:p>
+                <a:r>
+                  <a:rPr lang="fr-FR" dirty="0">
+                    <a:solidFill>
+                      <a:srgbClr val="64B164"/>
+                    </a:solidFill>
+                  </a:rPr>
+                  <a:t>C</a:t>
+                </a:r>
+                <a:r>
+                  <a:rPr lang="fr-FR" baseline="-25000" dirty="0">
+                    <a:solidFill>
+                      <a:srgbClr val="64B164"/>
+                    </a:solidFill>
+                  </a:rPr>
+                  <a:t>i</a:t>
+                </a:r>
+                <a:r>
+                  <a:rPr lang="fr-FR" dirty="0">
+                    <a:solidFill>
+                      <a:srgbClr val="64B164"/>
+                    </a:solidFill>
+                  </a:rPr>
+                  <a:t> = Constante de la fonction i</a:t>
+                </a:r>
+              </a:p>
+              <a:p>
+                <a:r>
+                  <a:rPr lang="fr-FR" dirty="0">
+                    <a:solidFill>
+                      <a:srgbClr val="64B164"/>
+                    </a:solidFill>
+                  </a:rPr>
+                  <a:t>n</a:t>
+                </a:r>
+                <a:r>
+                  <a:rPr lang="fr-FR" baseline="-25000" dirty="0">
+                    <a:solidFill>
+                      <a:srgbClr val="64B164"/>
+                    </a:solidFill>
+                  </a:rPr>
+                  <a:t>a</a:t>
+                </a:r>
+                <a:r>
+                  <a:rPr lang="fr-FR" dirty="0">
+                    <a:solidFill>
+                      <a:srgbClr val="64B164"/>
+                    </a:solidFill>
+                  </a:rPr>
+                  <a:t> = nombre actions de la combinaison</a:t>
+                </a:r>
+              </a:p>
+              <a:p>
+                <a14:m>
+                  <m:oMath xmlns:m="http://schemas.openxmlformats.org/officeDocument/2006/math">
+                    <m:r>
+                      <a:rPr lang="fr-FR" i="1">
+                        <a:solidFill>
+                          <a:srgbClr val="64B164"/>
+                        </a:solidFill>
+                        <a:latin typeface="Cambria Math" panose="02040503050406030204" pitchFamily="18" charset="0"/>
+                      </a:rPr>
+                      <m:t>𝜖</m:t>
+                    </m:r>
+                    <m:r>
+                      <m:rPr>
+                        <m:sty m:val="p"/>
+                      </m:rPr>
+                      <a:rPr lang="fr-FR" b="0" i="0" baseline="-25000" smtClean="0">
+                        <a:solidFill>
+                          <a:srgbClr val="64B164"/>
+                        </a:solidFill>
+                        <a:latin typeface="Cambria Math" panose="02040503050406030204" pitchFamily="18" charset="0"/>
+                      </a:rPr>
+                      <m:t>i</m:t>
+                    </m:r>
+                  </m:oMath>
+                </a14:m>
+                <a:r>
+                  <a:rPr lang="fr-FR" dirty="0">
+                    <a:solidFill>
+                      <a:srgbClr val="64B164"/>
+                    </a:solidFill>
+                  </a:rPr>
+                  <a:t> = négligeables</a:t>
+                </a:r>
+              </a:p>
+            </p:txBody>
+          </p:sp>
+        </mc:Choice>
+        <mc:Fallback>
+          <p:sp>
+            <p:nvSpPr>
+              <p:cNvPr id="14" name="ZoneTexte 13">
+                <a:extLst>
+                  <a:ext uri="{FF2B5EF4-FFF2-40B4-BE49-F238E27FC236}">
+                    <a16:creationId xmlns:a16="http://schemas.microsoft.com/office/drawing/2014/main" id="{9E18651B-F120-499E-AC80-1CDD87269890}"/>
+                  </a:ext>
+                </a:extLst>
+              </p:cNvPr>
+              <p:cNvSpPr txBox="1">
+                <a:spLocks noRot="1" noChangeAspect="1" noMove="1" noResize="1" noEditPoints="1" noAdjustHandles="1" noChangeArrowheads="1" noChangeShapeType="1" noTextEdit="1"/>
+              </p:cNvSpPr>
+              <p:nvPr/>
+            </p:nvSpPr>
+            <p:spPr>
+              <a:xfrm>
+                <a:off x="8280000" y="180000"/>
+                <a:ext cx="3823354" cy="1200329"/>
+              </a:xfrm>
+              <a:prstGeom prst="rect">
+                <a:avLst/>
+              </a:prstGeom>
+              <a:blipFill>
+                <a:blip r:embed="rId6"/>
+                <a:stretch>
+                  <a:fillRect l="-1113" t="-2525" r="-795" b="-7071"/>
+                </a:stretch>
+              </a:blipFill>
+              <a:ln>
+                <a:solidFill>
+                  <a:schemeClr val="tx1"/>
+                </a:solidFill>
+              </a:ln>
+            </p:spPr>
+            <p:txBody>
+              <a:bodyPr/>
+              <a:lstStyle/>
+              <a:p>
+                <a:r>
+                  <a:rPr lang="fr-FR">
+                    <a:noFill/>
+                  </a:rPr>
+                  <a:t> </a:t>
+                </a:r>
+              </a:p>
+            </p:txBody>
+          </p:sp>
+        </mc:Fallback>
+      </mc:AlternateContent>
     </p:spTree>
     <p:extLst>
       <p:ext uri="{BB962C8B-B14F-4D97-AF65-F5344CB8AC3E}">
-        <p14:creationId xmlns:p14="http://schemas.microsoft.com/office/powerpoint/2010/main" val="1963989922"/>
+        <p14:creationId xmlns:p14="http://schemas.microsoft.com/office/powerpoint/2010/main" val="3960351224"/>
       </p:ext>
     </p:extLst>
   </p:cSld>

</xml_diff>

<commit_message>
in_common.py :     - Suppression des symbole % des profits lors de l'écriture des résultats.
Slide :
    - Suite au correctif du commit (2c3be93), Màj des résultats de gourdmand.py avec dataset1.
</commit_message>
<xml_diff>
--- a/p07_slide.pptx
+++ b/p07_slide.pptx
@@ -12895,7 +12895,7 @@
           <a:p>
             <a:fld id="{006FEFC0-2236-48A2-B120-C759EDA2264F}" type="datetimeFigureOut">
               <a:rPr lang="fr-FR" smtClean="0"/>
-              <a:t>31/01/2022</a:t>
+              <a:t>01/02/2022</a:t>
             </a:fld>
             <a:endParaRPr lang="fr-FR"/>
           </a:p>
@@ -13072,7 +13072,7 @@
           <a:p>
             <a:fld id="{39A2C6B1-E7AA-4745-9EA3-948DDA335211}" type="datetimeFigureOut">
               <a:rPr lang="fr-FR" smtClean="0"/>
-              <a:t>31/01/2022</a:t>
+              <a:t>01/02/2022</a:t>
             </a:fld>
             <a:endParaRPr lang="fr-FR"/>
           </a:p>
@@ -13736,7 +13736,7 @@
             <a:fld id="{EEB52BBF-3D2E-4DB7-B1B2-3EEDAF05D916}" type="datetime1">
               <a:rPr lang="fr-FR" smtClean="0"/>
               <a:pPr/>
-              <a:t>31/01/2022</a:t>
+              <a:t>01/02/2022</a:t>
             </a:fld>
             <a:endParaRPr lang="fr-FR" dirty="0"/>
           </a:p>
@@ -13904,7 +13904,7 @@
           <a:p>
             <a:fld id="{D1B56501-E7FC-4AA4-829C-7EB06C5B501B}" type="datetime1">
               <a:rPr lang="fr-FR" smtClean="0"/>
-              <a:t>31/01/2022</a:t>
+              <a:t>01/02/2022</a:t>
             </a:fld>
             <a:endParaRPr lang="fr-FR"/>
           </a:p>
@@ -14142,7 +14142,7 @@
           <a:p>
             <a:fld id="{E1EA16D8-943B-480F-B7AB-8A20EEC88A30}" type="datetime1">
               <a:rPr lang="fr-FR" smtClean="0"/>
-              <a:t>31/01/2022</a:t>
+              <a:t>01/02/2022</a:t>
             </a:fld>
             <a:endParaRPr lang="fr-FR"/>
           </a:p>
@@ -14356,7 +14356,7 @@
           <a:p>
             <a:fld id="{B9F3C5A3-9381-4B97-82E4-385F6F49F69F}" type="datetime1">
               <a:rPr lang="fr-FR" smtClean="0"/>
-              <a:t>31/01/2022</a:t>
+              <a:t>01/02/2022</a:t>
             </a:fld>
             <a:endParaRPr lang="fr-FR"/>
           </a:p>
@@ -14485,7 +14485,7 @@
           <a:p>
             <a:fld id="{4716E524-F7FE-4CF1-BC8B-47DD9AC23070}" type="datetime1">
               <a:rPr lang="fr-FR" smtClean="0"/>
-              <a:t>31/01/2022</a:t>
+              <a:t>01/02/2022</a:t>
             </a:fld>
             <a:endParaRPr lang="fr-FR"/>
           </a:p>
@@ -15019,7 +15019,7 @@
           <a:p>
             <a:fld id="{336D8786-97C7-4BAF-A4C9-C839CD61D49F}" type="datetime1">
               <a:rPr lang="fr-FR" smtClean="0"/>
-              <a:t>31/01/2022</a:t>
+              <a:t>01/02/2022</a:t>
             </a:fld>
             <a:endParaRPr lang="fr-FR"/>
           </a:p>
@@ -15322,7 +15322,7 @@
           <a:p>
             <a:fld id="{074B9914-FBA4-40D6-94C7-D139128B50C8}" type="datetime1">
               <a:rPr lang="fr-FR" smtClean="0"/>
-              <a:t>31/01/2022</a:t>
+              <a:t>01/02/2022</a:t>
             </a:fld>
             <a:endParaRPr lang="fr-FR"/>
           </a:p>
@@ -15773,7 +15773,7 @@
           <a:p>
             <a:fld id="{51704AF8-D9A6-4385-8AB7-F174826852B4}" type="datetime1">
               <a:rPr lang="fr-FR" smtClean="0"/>
-              <a:t>31/01/2022</a:t>
+              <a:t>01/02/2022</a:t>
             </a:fld>
             <a:endParaRPr lang="fr-FR"/>
           </a:p>
@@ -16030,7 +16030,7 @@
           <a:p>
             <a:fld id="{2DB68652-01BB-4E56-9340-87662979ACA3}" type="datetime1">
               <a:rPr lang="fr-FR" smtClean="0"/>
-              <a:t>31/01/2022</a:t>
+              <a:t>01/02/2022</a:t>
             </a:fld>
             <a:endParaRPr lang="fr-FR"/>
           </a:p>
@@ -16374,7 +16374,7 @@
           <a:p>
             <a:fld id="{EC149F96-B5CE-4558-BCAE-5D6484994026}" type="datetime1">
               <a:rPr lang="fr-FR" smtClean="0"/>
-              <a:t>31/01/2022</a:t>
+              <a:t>01/02/2022</a:t>
             </a:fld>
             <a:endParaRPr lang="fr-FR"/>
           </a:p>
@@ -16695,7 +16695,7 @@
           <a:p>
             <a:fld id="{5B90BA0F-8B4E-4DE9-A747-69F5CB516130}" type="datetime1">
               <a:rPr lang="fr-FR" smtClean="0"/>
-              <a:t>31/01/2022</a:t>
+              <a:t>01/02/2022</a:t>
             </a:fld>
             <a:endParaRPr lang="fr-FR"/>
           </a:p>
@@ -16902,7 +16902,7 @@
             <a:fld id="{C1D57578-8FE2-4469-A516-156BBECEE892}" type="datetime1">
               <a:rPr lang="fr-FR" smtClean="0"/>
               <a:pPr/>
-              <a:t>31/01/2022</a:t>
+              <a:t>01/02/2022</a:t>
             </a:fld>
             <a:endParaRPr lang="fr-FR"/>
           </a:p>
@@ -22882,10 +22882,10 @@
       </p:graphicFrame>
       <p:pic>
         <p:nvPicPr>
-          <p:cNvPr id="5" name="Image 4">
+          <p:cNvPr id="6" name="Image 5">
             <a:extLst>
               <a:ext uri="{FF2B5EF4-FFF2-40B4-BE49-F238E27FC236}">
-                <a16:creationId xmlns:a16="http://schemas.microsoft.com/office/drawing/2014/main" id="{0BDCE12E-2AFD-4136-9E41-45B6B2B9D9F2}"/>
+                <a16:creationId xmlns:a16="http://schemas.microsoft.com/office/drawing/2014/main" id="{F9F06FF2-0E74-41FA-A147-260F9C8DAF36}"/>
               </a:ext>
             </a:extLst>
           </p:cNvPr>
@@ -23082,7 +23082,7 @@
           </p:cNvPicPr>
           <p:nvPr/>
         </p:nvPicPr>
-        <p:blipFill rotWithShape="1">
+        <p:blipFill>
           <a:blip r:embed="rId4">
             <a:extLst>
               <a:ext uri="{28A0092B-C50C-407E-A947-70E740481C1C}">
@@ -23090,13 +23090,13 @@
               </a:ext>
             </a:extLst>
           </a:blip>
-          <a:srcRect b="2494"/>
+          <a:srcRect/>
           <a:stretch/>
         </p:blipFill>
         <p:spPr>
           <a:xfrm>
             <a:off x="1296100" y="1717747"/>
-            <a:ext cx="2619540" cy="4644000"/>
+            <a:ext cx="2619539" cy="4762800"/>
           </a:xfrm>
           <a:prstGeom prst="rect">
             <a:avLst/>
@@ -24774,6 +24774,574 @@
           <a:chExt cx="0" cy="0"/>
         </a:xfrm>
       </p:grpSpPr>
+      <p:grpSp>
+        <p:nvGrpSpPr>
+          <p:cNvPr id="41" name="Groupe 40">
+            <a:extLst>
+              <a:ext uri="{FF2B5EF4-FFF2-40B4-BE49-F238E27FC236}">
+                <a16:creationId xmlns:a16="http://schemas.microsoft.com/office/drawing/2014/main" id="{08F7B4DF-5DE5-487C-8918-231DB6168BFD}"/>
+              </a:ext>
+            </a:extLst>
+          </p:cNvPr>
+          <p:cNvGrpSpPr/>
+          <p:nvPr/>
+        </p:nvGrpSpPr>
+        <p:grpSpPr>
+          <a:xfrm>
+            <a:off x="838200" y="1522896"/>
+            <a:ext cx="6657975" cy="1994796"/>
+            <a:chOff x="838200" y="1522896"/>
+            <a:chExt cx="6657975" cy="1994796"/>
+          </a:xfrm>
+          <a:noFill/>
+        </p:grpSpPr>
+        <p:sp>
+          <p:nvSpPr>
+            <p:cNvPr id="39" name="Rectangle 38">
+              <a:extLst>
+                <a:ext uri="{FF2B5EF4-FFF2-40B4-BE49-F238E27FC236}">
+                  <a16:creationId xmlns:a16="http://schemas.microsoft.com/office/drawing/2014/main" id="{2566097C-6331-4A5A-B2A8-2444C727E076}"/>
+                </a:ext>
+              </a:extLst>
+            </p:cNvPr>
+            <p:cNvSpPr/>
+            <p:nvPr/>
+          </p:nvSpPr>
+          <p:spPr>
+            <a:xfrm>
+              <a:off x="894987" y="1522896"/>
+              <a:ext cx="6601188" cy="1994796"/>
+            </a:xfrm>
+            <a:prstGeom prst="rect">
+              <a:avLst/>
+            </a:prstGeom>
+            <a:solidFill>
+              <a:srgbClr val="272822"/>
+            </a:solidFill>
+            <a:ln w="38100">
+              <a:solidFill>
+                <a:schemeClr val="tx1"/>
+              </a:solidFill>
+            </a:ln>
+          </p:spPr>
+          <p:style>
+            <a:lnRef idx="2">
+              <a:schemeClr val="accent1">
+                <a:shade val="50000"/>
+              </a:schemeClr>
+            </a:lnRef>
+            <a:fillRef idx="1">
+              <a:schemeClr val="accent1"/>
+            </a:fillRef>
+            <a:effectRef idx="0">
+              <a:schemeClr val="accent1"/>
+            </a:effectRef>
+            <a:fontRef idx="minor">
+              <a:schemeClr val="lt1"/>
+            </a:fontRef>
+          </p:style>
+          <p:txBody>
+            <a:bodyPr rtlCol="0" anchor="ctr"/>
+            <a:lstStyle/>
+            <a:p>
+              <a:pPr algn="ctr"/>
+              <a:endParaRPr lang="fr-FR"/>
+            </a:p>
+          </p:txBody>
+        </p:sp>
+        <p:grpSp>
+          <p:nvGrpSpPr>
+            <p:cNvPr id="30" name="Groupe 29">
+              <a:extLst>
+                <a:ext uri="{FF2B5EF4-FFF2-40B4-BE49-F238E27FC236}">
+                  <a16:creationId xmlns:a16="http://schemas.microsoft.com/office/drawing/2014/main" id="{EAD51A72-DB75-4915-8F71-74D3CB252BC1}"/>
+                </a:ext>
+              </a:extLst>
+            </p:cNvPr>
+            <p:cNvGrpSpPr/>
+            <p:nvPr/>
+          </p:nvGrpSpPr>
+          <p:grpSpPr>
+            <a:xfrm>
+              <a:off x="838200" y="1581792"/>
+              <a:ext cx="6504188" cy="1706243"/>
+              <a:chOff x="838200" y="1581792"/>
+              <a:chExt cx="6504188" cy="1706243"/>
+            </a:xfrm>
+            <a:grpFill/>
+          </p:grpSpPr>
+          <p:sp>
+            <p:nvSpPr>
+              <p:cNvPr id="9" name="ZoneTexte 8">
+                <a:extLst>
+                  <a:ext uri="{FF2B5EF4-FFF2-40B4-BE49-F238E27FC236}">
+                    <a16:creationId xmlns:a16="http://schemas.microsoft.com/office/drawing/2014/main" id="{53BE3B5B-4EB1-4470-A36C-4825721C77D8}"/>
+                  </a:ext>
+                </a:extLst>
+              </p:cNvPr>
+              <p:cNvSpPr txBox="1"/>
+              <p:nvPr/>
+            </p:nvSpPr>
+            <p:spPr>
+              <a:xfrm>
+                <a:off x="838200" y="1581792"/>
+                <a:ext cx="2543710" cy="369332"/>
+              </a:xfrm>
+              <a:prstGeom prst="rect">
+                <a:avLst/>
+              </a:prstGeom>
+              <a:grpFill/>
+            </p:spPr>
+            <p:txBody>
+              <a:bodyPr wrap="none" rtlCol="0">
+                <a:spAutoFit/>
+              </a:bodyPr>
+              <a:lstStyle/>
+              <a:p>
+                <a:r>
+                  <a:rPr lang="fr-FR" dirty="0">
+                    <a:solidFill>
+                      <a:srgbClr val="64B164"/>
+                    </a:solidFill>
+                  </a:rPr>
+                  <a:t>Format attendu des .csv :</a:t>
+                </a:r>
+              </a:p>
+            </p:txBody>
+          </p:sp>
+          <p:sp>
+            <p:nvSpPr>
+              <p:cNvPr id="10" name="Rectangle 1">
+                <a:extLst>
+                  <a:ext uri="{FF2B5EF4-FFF2-40B4-BE49-F238E27FC236}">
+                    <a16:creationId xmlns:a16="http://schemas.microsoft.com/office/drawing/2014/main" id="{001B5D9F-D136-4E1A-A632-25AC3C5DA9A8}"/>
+                  </a:ext>
+                </a:extLst>
+              </p:cNvPr>
+              <p:cNvSpPr>
+                <a:spLocks noChangeArrowheads="1"/>
+              </p:cNvSpPr>
+              <p:nvPr/>
+            </p:nvSpPr>
+            <p:spPr bwMode="auto">
+              <a:xfrm>
+                <a:off x="1847766" y="2335866"/>
+                <a:ext cx="2156059" cy="707886"/>
+              </a:xfrm>
+              <a:prstGeom prst="rect">
+                <a:avLst/>
+              </a:prstGeom>
+              <a:grpFill/>
+              <a:ln>
+                <a:noFill/>
+              </a:ln>
+              <a:effectLst/>
+              <a:extLst>
+                <a:ext uri="{91240B29-F687-4F45-9708-019B960494DF}">
+                  <a14:hiddenLine xmlns:a14="http://schemas.microsoft.com/office/drawing/2010/main" w="9525">
+                    <a:solidFill>
+                      <a:schemeClr val="tx1"/>
+                    </a:solidFill>
+                    <a:miter lim="800000"/>
+                    <a:headEnd/>
+                    <a:tailEnd/>
+                  </a14:hiddenLine>
+                </a:ext>
+                <a:ext uri="{AF507438-7753-43E0-B8FC-AC1667EBCBE1}">
+                  <a14:hiddenEffects xmlns:a14="http://schemas.microsoft.com/office/drawing/2010/main">
+                    <a:effectLst>
+                      <a:outerShdw dist="35921" dir="2700000" algn="ctr" rotWithShape="0">
+                        <a:schemeClr val="bg2"/>
+                      </a:outerShdw>
+                    </a:effectLst>
+                  </a14:hiddenEffects>
+                </a:ext>
+              </a:extLst>
+            </p:spPr>
+            <p:txBody>
+              <a:bodyPr vert="horz" wrap="square" lIns="91440" tIns="45720" rIns="91440" bIns="45720" numCol="1" anchor="ctr" anchorCtr="0" compatLnSpc="1">
+                <a:prstTxWarp prst="textNoShape">
+                  <a:avLst/>
+                </a:prstTxWarp>
+                <a:spAutoFit/>
+              </a:bodyPr>
+              <a:lstStyle/>
+              <a:p>
+                <a:pPr marL="0" marR="0" lvl="0" indent="0" algn="l" defTabSz="914400" rtl="0" eaLnBrk="0" fontAlgn="base" latinLnBrk="0" hangingPunct="0">
+                  <a:lnSpc>
+                    <a:spcPct val="100000"/>
+                  </a:lnSpc>
+                  <a:spcBef>
+                    <a:spcPct val="0"/>
+                  </a:spcBef>
+                  <a:spcAft>
+                    <a:spcPct val="0"/>
+                  </a:spcAft>
+                  <a:buClrTx/>
+                  <a:buSzTx/>
+                  <a:buFontTx/>
+                  <a:buNone/>
+                  <a:tabLst/>
+                </a:pPr>
+                <a:r>
+                  <a:rPr kumimoji="0" lang="fr-FR" altLang="fr-FR" sz="1000" b="0" i="0" u="none" strike="noStrike" cap="none" normalizeH="0" baseline="0" dirty="0" err="1">
+                    <a:ln>
+                      <a:noFill/>
+                    </a:ln>
+                    <a:solidFill>
+                      <a:srgbClr val="F8F8F2"/>
+                    </a:solidFill>
+                    <a:effectLst/>
+                    <a:latin typeface="Courier New" panose="02070309020205020404" pitchFamily="49" charset="0"/>
+                    <a:cs typeface="Courier New" panose="02070309020205020404" pitchFamily="49" charset="0"/>
+                  </a:rPr>
+                  <a:t>name,price,profit</a:t>
+                </a:r>
+                <a:br>
+                  <a:rPr kumimoji="0" lang="fr-FR" altLang="fr-FR" sz="1000" b="0" i="0" u="none" strike="noStrike" cap="none" normalizeH="0" baseline="0" dirty="0">
+                    <a:ln>
+                      <a:noFill/>
+                    </a:ln>
+                    <a:solidFill>
+                      <a:srgbClr val="F8F8F2"/>
+                    </a:solidFill>
+                    <a:effectLst/>
+                    <a:latin typeface="Courier New" panose="02070309020205020404" pitchFamily="49" charset="0"/>
+                    <a:cs typeface="Courier New" panose="02070309020205020404" pitchFamily="49" charset="0"/>
+                  </a:rPr>
+                </a:br>
+                <a:r>
+                  <a:rPr kumimoji="0" lang="fr-FR" altLang="fr-FR" sz="1000" b="0" i="0" u="none" strike="noStrike" cap="none" normalizeH="0" baseline="0" dirty="0">
+                    <a:ln>
+                      <a:noFill/>
+                    </a:ln>
+                    <a:solidFill>
+                      <a:srgbClr val="F8F8F2"/>
+                    </a:solidFill>
+                    <a:effectLst/>
+                    <a:latin typeface="Courier New" panose="02070309020205020404" pitchFamily="49" charset="0"/>
+                    <a:cs typeface="Courier New" panose="02070309020205020404" pitchFamily="49" charset="0"/>
+                  </a:rPr>
+                  <a:t>name1,20,5</a:t>
+                </a:r>
+                <a:br>
+                  <a:rPr kumimoji="0" lang="fr-FR" altLang="fr-FR" sz="1000" b="0" i="0" u="none" strike="noStrike" cap="none" normalizeH="0" baseline="0" dirty="0">
+                    <a:ln>
+                      <a:noFill/>
+                    </a:ln>
+                    <a:solidFill>
+                      <a:srgbClr val="F8F8F2"/>
+                    </a:solidFill>
+                    <a:effectLst/>
+                    <a:latin typeface="Courier New" panose="02070309020205020404" pitchFamily="49" charset="0"/>
+                    <a:cs typeface="Courier New" panose="02070309020205020404" pitchFamily="49" charset="0"/>
+                  </a:rPr>
+                </a:br>
+                <a:r>
+                  <a:rPr kumimoji="0" lang="fr-FR" altLang="fr-FR" sz="1000" b="0" i="0" u="none" strike="noStrike" cap="none" normalizeH="0" baseline="0" dirty="0">
+                    <a:ln>
+                      <a:noFill/>
+                    </a:ln>
+                    <a:solidFill>
+                      <a:srgbClr val="F8F8F2"/>
+                    </a:solidFill>
+                    <a:effectLst/>
+                    <a:latin typeface="Courier New" panose="02070309020205020404" pitchFamily="49" charset="0"/>
+                    <a:cs typeface="Courier New" panose="02070309020205020404" pitchFamily="49" charset="0"/>
+                  </a:rPr>
+                  <a:t>NAME-2,37.59,10.221</a:t>
+                </a:r>
+              </a:p>
+              <a:p>
+                <a:pPr marL="0" marR="0" lvl="0" indent="0" algn="l" defTabSz="914400" rtl="0" eaLnBrk="0" fontAlgn="base" latinLnBrk="0" hangingPunct="0">
+                  <a:lnSpc>
+                    <a:spcPct val="100000"/>
+                  </a:lnSpc>
+                  <a:spcBef>
+                    <a:spcPct val="0"/>
+                  </a:spcBef>
+                  <a:spcAft>
+                    <a:spcPct val="0"/>
+                  </a:spcAft>
+                  <a:buClrTx/>
+                  <a:buSzTx/>
+                  <a:buFontTx/>
+                  <a:buNone/>
+                  <a:tabLst/>
+                </a:pPr>
+                <a:r>
+                  <a:rPr lang="fr-FR" altLang="fr-FR" sz="1000" dirty="0">
+                    <a:solidFill>
+                      <a:srgbClr val="F8F8F2"/>
+                    </a:solidFill>
+                    <a:latin typeface="Courier New" panose="02070309020205020404" pitchFamily="49" charset="0"/>
+                    <a:cs typeface="Courier New" panose="02070309020205020404" pitchFamily="49" charset="0"/>
+                  </a:rPr>
+                  <a:t>33name,02.1,09.3</a:t>
+                </a:r>
+                <a:endParaRPr kumimoji="0" lang="fr-FR" altLang="fr-FR" sz="1800" b="0" i="0" u="none" strike="noStrike" cap="none" normalizeH="0" baseline="0" dirty="0">
+                  <a:ln>
+                    <a:noFill/>
+                  </a:ln>
+                  <a:solidFill>
+                    <a:schemeClr val="tx1"/>
+                  </a:solidFill>
+                  <a:effectLst/>
+                  <a:latin typeface="Arial" panose="020B0604020202020204" pitchFamily="34" charset="0"/>
+                </a:endParaRPr>
+              </a:p>
+            </p:txBody>
+          </p:sp>
+          <p:cxnSp>
+            <p:nvCxnSpPr>
+              <p:cNvPr id="12" name="Connecteur droit avec flèche 11">
+                <a:extLst>
+                  <a:ext uri="{FF2B5EF4-FFF2-40B4-BE49-F238E27FC236}">
+                    <a16:creationId xmlns:a16="http://schemas.microsoft.com/office/drawing/2014/main" id="{7D313FF8-08AB-4A47-BDDC-3449ECDFE7EA}"/>
+                  </a:ext>
+                </a:extLst>
+              </p:cNvPr>
+              <p:cNvCxnSpPr/>
+              <p:nvPr/>
+            </p:nvCxnSpPr>
+            <p:spPr>
+              <a:xfrm>
+                <a:off x="3463490" y="2436709"/>
+                <a:ext cx="1507958" cy="0"/>
+              </a:xfrm>
+              <a:prstGeom prst="straightConnector1">
+                <a:avLst/>
+              </a:prstGeom>
+              <a:grpFill/>
+              <a:ln w="38100">
+                <a:solidFill>
+                  <a:srgbClr val="4E95A1"/>
+                </a:solidFill>
+                <a:tailEnd type="triangle"/>
+              </a:ln>
+            </p:spPr>
+            <p:style>
+              <a:lnRef idx="1">
+                <a:schemeClr val="accent1"/>
+              </a:lnRef>
+              <a:fillRef idx="0">
+                <a:schemeClr val="accent1"/>
+              </a:fillRef>
+              <a:effectRef idx="0">
+                <a:schemeClr val="accent1"/>
+              </a:effectRef>
+              <a:fontRef idx="minor">
+                <a:schemeClr val="tx1"/>
+              </a:fontRef>
+            </p:style>
+          </p:cxnSp>
+          <p:sp>
+            <p:nvSpPr>
+              <p:cNvPr id="13" name="ZoneTexte 12">
+                <a:extLst>
+                  <a:ext uri="{FF2B5EF4-FFF2-40B4-BE49-F238E27FC236}">
+                    <a16:creationId xmlns:a16="http://schemas.microsoft.com/office/drawing/2014/main" id="{7E069659-F03C-4C4F-8377-7F62CB40F9B5}"/>
+                  </a:ext>
+                </a:extLst>
+              </p:cNvPr>
+              <p:cNvSpPr txBox="1"/>
+              <p:nvPr/>
+            </p:nvSpPr>
+            <p:spPr>
+              <a:xfrm>
+                <a:off x="5231330" y="2260098"/>
+                <a:ext cx="1988621" cy="369332"/>
+              </a:xfrm>
+              <a:prstGeom prst="rect">
+                <a:avLst/>
+              </a:prstGeom>
+              <a:grpFill/>
+            </p:spPr>
+            <p:txBody>
+              <a:bodyPr wrap="none" rtlCol="0">
+                <a:spAutoFit/>
+              </a:bodyPr>
+              <a:lstStyle/>
+              <a:p>
+                <a:pPr algn="l"/>
+                <a:r>
+                  <a:rPr lang="fr-FR" dirty="0">
+                    <a:solidFill>
+                      <a:srgbClr val="64B164"/>
+                    </a:solidFill>
+                  </a:rPr>
+                  <a:t>Entêtes à respecter</a:t>
+                </a:r>
+              </a:p>
+            </p:txBody>
+          </p:sp>
+          <p:sp>
+            <p:nvSpPr>
+              <p:cNvPr id="15" name="ZoneTexte 14">
+                <a:extLst>
+                  <a:ext uri="{FF2B5EF4-FFF2-40B4-BE49-F238E27FC236}">
+                    <a16:creationId xmlns:a16="http://schemas.microsoft.com/office/drawing/2014/main" id="{747DAE54-0893-4709-BBA3-A59A6DED99C6}"/>
+                  </a:ext>
+                </a:extLst>
+              </p:cNvPr>
+              <p:cNvSpPr txBox="1"/>
+              <p:nvPr/>
+            </p:nvSpPr>
+            <p:spPr>
+              <a:xfrm>
+                <a:off x="3974158" y="2629430"/>
+                <a:ext cx="3368230" cy="369332"/>
+              </a:xfrm>
+              <a:prstGeom prst="rect">
+                <a:avLst/>
+              </a:prstGeom>
+              <a:grpFill/>
+            </p:spPr>
+            <p:txBody>
+              <a:bodyPr wrap="none" rtlCol="0">
+                <a:spAutoFit/>
+              </a:bodyPr>
+              <a:lstStyle/>
+              <a:p>
+                <a:pPr algn="l"/>
+                <a:r>
+                  <a:rPr lang="fr-FR" dirty="0">
+                    <a:solidFill>
+                      <a:srgbClr val="64B164"/>
+                    </a:solidFill>
+                  </a:rPr>
+                  <a:t>Séparateur de colonnes =&gt; virgule</a:t>
+                </a:r>
+              </a:p>
+            </p:txBody>
+          </p:sp>
+          <p:cxnSp>
+            <p:nvCxnSpPr>
+              <p:cNvPr id="21" name="Connecteur droit avec flèche 20">
+                <a:extLst>
+                  <a:ext uri="{FF2B5EF4-FFF2-40B4-BE49-F238E27FC236}">
+                    <a16:creationId xmlns:a16="http://schemas.microsoft.com/office/drawing/2014/main" id="{AA0BD167-F24B-430F-92CC-27C4DEA10979}"/>
+                  </a:ext>
+                </a:extLst>
+              </p:cNvPr>
+              <p:cNvCxnSpPr>
+                <a:cxnSpLocks/>
+              </p:cNvCxnSpPr>
+              <p:nvPr/>
+            </p:nvCxnSpPr>
+            <p:spPr>
+              <a:xfrm flipV="1">
+                <a:off x="3144344" y="2036175"/>
+                <a:ext cx="1291674" cy="300441"/>
+              </a:xfrm>
+              <a:prstGeom prst="straightConnector1">
+                <a:avLst/>
+              </a:prstGeom>
+              <a:grpFill/>
+              <a:ln w="38100">
+                <a:solidFill>
+                  <a:srgbClr val="4E95A1"/>
+                </a:solidFill>
+                <a:tailEnd type="triangle"/>
+              </a:ln>
+            </p:spPr>
+            <p:style>
+              <a:lnRef idx="1">
+                <a:schemeClr val="accent1"/>
+              </a:lnRef>
+              <a:fillRef idx="0">
+                <a:schemeClr val="accent1"/>
+              </a:fillRef>
+              <a:effectRef idx="0">
+                <a:schemeClr val="accent1"/>
+              </a:effectRef>
+              <a:fontRef idx="minor">
+                <a:schemeClr val="tx1"/>
+              </a:fontRef>
+            </p:style>
+          </p:cxnSp>
+          <p:sp>
+            <p:nvSpPr>
+              <p:cNvPr id="23" name="ZoneTexte 22">
+                <a:extLst>
+                  <a:ext uri="{FF2B5EF4-FFF2-40B4-BE49-F238E27FC236}">
+                    <a16:creationId xmlns:a16="http://schemas.microsoft.com/office/drawing/2014/main" id="{7D2DC8DB-B7A0-44E3-8D99-35DCC7E56A81}"/>
+                  </a:ext>
+                </a:extLst>
+              </p:cNvPr>
+              <p:cNvSpPr txBox="1"/>
+              <p:nvPr/>
+            </p:nvSpPr>
+            <p:spPr>
+              <a:xfrm>
+                <a:off x="4451057" y="1817063"/>
+                <a:ext cx="1657185" cy="369332"/>
+              </a:xfrm>
+              <a:prstGeom prst="rect">
+                <a:avLst/>
+              </a:prstGeom>
+              <a:grpFill/>
+            </p:spPr>
+            <p:txBody>
+              <a:bodyPr wrap="none" rtlCol="0">
+                <a:spAutoFit/>
+              </a:bodyPr>
+              <a:lstStyle/>
+              <a:p>
+                <a:pPr algn="l"/>
+                <a:r>
+                  <a:rPr lang="fr-FR" dirty="0">
+                    <a:solidFill>
+                      <a:srgbClr val="64B164"/>
+                    </a:solidFill>
+                  </a:rPr>
+                  <a:t>en pourcentage</a:t>
+                </a:r>
+              </a:p>
+            </p:txBody>
+          </p:sp>
+          <p:sp>
+            <p:nvSpPr>
+              <p:cNvPr id="25" name="ZoneTexte 24">
+                <a:extLst>
+                  <a:ext uri="{FF2B5EF4-FFF2-40B4-BE49-F238E27FC236}">
+                    <a16:creationId xmlns:a16="http://schemas.microsoft.com/office/drawing/2014/main" id="{B9110DB7-6C6B-4B6A-8E81-57A67C90DEB9}"/>
+                  </a:ext>
+                </a:extLst>
+              </p:cNvPr>
+              <p:cNvSpPr txBox="1"/>
+              <p:nvPr/>
+            </p:nvSpPr>
+            <p:spPr>
+              <a:xfrm>
+                <a:off x="3974158" y="2918703"/>
+                <a:ext cx="2947987" cy="369332"/>
+              </a:xfrm>
+              <a:prstGeom prst="rect">
+                <a:avLst/>
+              </a:prstGeom>
+              <a:grpFill/>
+            </p:spPr>
+            <p:txBody>
+              <a:bodyPr wrap="none" rtlCol="0">
+                <a:spAutoFit/>
+              </a:bodyPr>
+              <a:lstStyle/>
+              <a:p>
+                <a:pPr algn="l"/>
+                <a:r>
+                  <a:rPr lang="fr-FR" dirty="0">
+                    <a:solidFill>
+                      <a:srgbClr val="64B164"/>
+                    </a:solidFill>
+                  </a:rPr>
+                  <a:t>Séparateur décimale =&gt; point</a:t>
+                </a:r>
+              </a:p>
+            </p:txBody>
+          </p:sp>
+        </p:grpSp>
+      </p:grpSp>
       <p:sp>
         <p:nvSpPr>
           <p:cNvPr id="8" name="Titre 7">
@@ -25029,11 +25597,68 @@
         <p:grpSpPr>
           <a:xfrm>
             <a:off x="6108242" y="3742968"/>
-            <a:ext cx="5344191" cy="2333827"/>
+            <a:ext cx="5021561" cy="2333827"/>
             <a:chOff x="6046489" y="3568170"/>
-            <a:chExt cx="5344191" cy="2333827"/>
+            <a:chExt cx="5021561" cy="2333827"/>
           </a:xfrm>
+          <a:noFill/>
         </p:grpSpPr>
+        <p:sp>
+          <p:nvSpPr>
+            <p:cNvPr id="38" name="Rectangle 37">
+              <a:extLst>
+                <a:ext uri="{FF2B5EF4-FFF2-40B4-BE49-F238E27FC236}">
+                  <a16:creationId xmlns:a16="http://schemas.microsoft.com/office/drawing/2014/main" id="{AE83AB09-1130-4AA8-8A9C-DFC9256AE836}"/>
+                </a:ext>
+              </a:extLst>
+            </p:cNvPr>
+            <p:cNvSpPr/>
+            <p:nvPr/>
+          </p:nvSpPr>
+          <p:spPr>
+            <a:xfrm>
+              <a:off x="6046489" y="3568170"/>
+              <a:ext cx="5021561" cy="2333827"/>
+            </a:xfrm>
+            <a:prstGeom prst="rect">
+              <a:avLst/>
+            </a:prstGeom>
+            <a:solidFill>
+              <a:srgbClr val="272822"/>
+            </a:solidFill>
+            <a:ln w="38100">
+              <a:solidFill>
+                <a:schemeClr val="tx1"/>
+              </a:solidFill>
+            </a:ln>
+          </p:spPr>
+          <p:style>
+            <a:lnRef idx="2">
+              <a:schemeClr val="accent1">
+                <a:shade val="50000"/>
+              </a:schemeClr>
+            </a:lnRef>
+            <a:fillRef idx="1">
+              <a:schemeClr val="accent1"/>
+            </a:fillRef>
+            <a:effectRef idx="0">
+              <a:schemeClr val="accent1"/>
+            </a:effectRef>
+            <a:fontRef idx="minor">
+              <a:schemeClr val="lt1"/>
+            </a:fontRef>
+          </p:style>
+          <p:txBody>
+            <a:bodyPr rtlCol="0" anchor="ctr"/>
+            <a:lstStyle/>
+            <a:p>
+              <a:pPr algn="ctr"/>
+              <a:endParaRPr lang="fr-FR">
+                <a:noFill/>
+              </a:endParaRPr>
+            </a:p>
+          </p:txBody>
+        </p:sp>
         <p:grpSp>
           <p:nvGrpSpPr>
             <p:cNvPr id="37" name="Groupe 36">
@@ -25049,13 +25674,11 @@
           <p:grpSpPr>
             <a:xfrm>
               <a:off x="6046489" y="3577308"/>
-              <a:ext cx="5344191" cy="2324689"/>
+              <a:ext cx="4928449" cy="2211634"/>
               <a:chOff x="586060" y="4031663"/>
-              <a:chExt cx="5344191" cy="2324689"/>
+              <a:chExt cx="4928449" cy="2211634"/>
             </a:xfrm>
-            <a:solidFill>
-              <a:srgbClr val="272822"/>
-            </a:solidFill>
+            <a:grpFill/>
           </p:grpSpPr>
           <p:pic>
             <p:nvPicPr>
@@ -25071,7 +25694,7 @@
               </p:cNvPicPr>
               <p:nvPr/>
             </p:nvPicPr>
-            <p:blipFill>
+            <p:blipFill rotWithShape="1">
               <a:blip r:embed="rId2">
                 <a:extLst>
                   <a:ext uri="{28A0092B-C50C-407E-A947-70E740481C1C}">
@@ -25079,13 +25702,12 @@
                   </a:ext>
                 </a:extLst>
               </a:blip>
-              <a:stretch>
-                <a:fillRect/>
-              </a:stretch>
+              <a:srcRect l="-8708" t="-5964" r="8708" b="5964"/>
+              <a:stretch/>
             </p:blipFill>
             <p:spPr>
               <a:xfrm>
-                <a:off x="1157560" y="4460612"/>
+                <a:off x="741818" y="4347557"/>
                 <a:ext cx="4772691" cy="1895740"/>
               </a:xfrm>
               <a:prstGeom prst="rect">
@@ -25177,622 +25799,6 @@
             </p:style>
           </p:cxnSp>
         </p:grpSp>
-        <p:sp>
-          <p:nvSpPr>
-            <p:cNvPr id="38" name="Rectangle 37">
-              <a:extLst>
-                <a:ext uri="{FF2B5EF4-FFF2-40B4-BE49-F238E27FC236}">
-                  <a16:creationId xmlns:a16="http://schemas.microsoft.com/office/drawing/2014/main" id="{AE83AB09-1130-4AA8-8A9C-DFC9256AE836}"/>
-                </a:ext>
-              </a:extLst>
-            </p:cNvPr>
-            <p:cNvSpPr/>
-            <p:nvPr/>
-          </p:nvSpPr>
-          <p:spPr>
-            <a:xfrm>
-              <a:off x="6046489" y="3568170"/>
-              <a:ext cx="5021561" cy="2333827"/>
-            </a:xfrm>
-            <a:prstGeom prst="rect">
-              <a:avLst/>
-            </a:prstGeom>
-            <a:noFill/>
-            <a:ln w="38100">
-              <a:solidFill>
-                <a:schemeClr val="tx1"/>
-              </a:solidFill>
-            </a:ln>
-          </p:spPr>
-          <p:style>
-            <a:lnRef idx="2">
-              <a:schemeClr val="accent1">
-                <a:shade val="50000"/>
-              </a:schemeClr>
-            </a:lnRef>
-            <a:fillRef idx="1">
-              <a:schemeClr val="accent1"/>
-            </a:fillRef>
-            <a:effectRef idx="0">
-              <a:schemeClr val="accent1"/>
-            </a:effectRef>
-            <a:fontRef idx="minor">
-              <a:schemeClr val="lt1"/>
-            </a:fontRef>
-          </p:style>
-          <p:txBody>
-            <a:bodyPr rtlCol="0" anchor="ctr"/>
-            <a:lstStyle/>
-            <a:p>
-              <a:pPr algn="ctr"/>
-              <a:endParaRPr lang="fr-FR"/>
-            </a:p>
-          </p:txBody>
-        </p:sp>
-      </p:grpSp>
-      <p:grpSp>
-        <p:nvGrpSpPr>
-          <p:cNvPr id="41" name="Groupe 40">
-            <a:extLst>
-              <a:ext uri="{FF2B5EF4-FFF2-40B4-BE49-F238E27FC236}">
-                <a16:creationId xmlns:a16="http://schemas.microsoft.com/office/drawing/2014/main" id="{08F7B4DF-5DE5-487C-8918-231DB6168BFD}"/>
-              </a:ext>
-            </a:extLst>
-          </p:cNvPr>
-          <p:cNvGrpSpPr/>
-          <p:nvPr/>
-        </p:nvGrpSpPr>
-        <p:grpSpPr>
-          <a:xfrm>
-            <a:off x="838200" y="1522896"/>
-            <a:ext cx="6657975" cy="1994796"/>
-            <a:chOff x="838200" y="1522896"/>
-            <a:chExt cx="6657975" cy="1994796"/>
-          </a:xfrm>
-        </p:grpSpPr>
-        <p:grpSp>
-          <p:nvGrpSpPr>
-            <p:cNvPr id="30" name="Groupe 29">
-              <a:extLst>
-                <a:ext uri="{FF2B5EF4-FFF2-40B4-BE49-F238E27FC236}">
-                  <a16:creationId xmlns:a16="http://schemas.microsoft.com/office/drawing/2014/main" id="{EAD51A72-DB75-4915-8F71-74D3CB252BC1}"/>
-                </a:ext>
-              </a:extLst>
-            </p:cNvPr>
-            <p:cNvGrpSpPr/>
-            <p:nvPr/>
-          </p:nvGrpSpPr>
-          <p:grpSpPr>
-            <a:xfrm>
-              <a:off x="838200" y="1581792"/>
-              <a:ext cx="6504188" cy="1706243"/>
-              <a:chOff x="838200" y="1581792"/>
-              <a:chExt cx="6504188" cy="1706243"/>
-            </a:xfrm>
-          </p:grpSpPr>
-          <p:sp>
-            <p:nvSpPr>
-              <p:cNvPr id="9" name="ZoneTexte 8">
-                <a:extLst>
-                  <a:ext uri="{FF2B5EF4-FFF2-40B4-BE49-F238E27FC236}">
-                    <a16:creationId xmlns:a16="http://schemas.microsoft.com/office/drawing/2014/main" id="{53BE3B5B-4EB1-4470-A36C-4825721C77D8}"/>
-                  </a:ext>
-                </a:extLst>
-              </p:cNvPr>
-              <p:cNvSpPr txBox="1"/>
-              <p:nvPr/>
-            </p:nvSpPr>
-            <p:spPr>
-              <a:xfrm>
-                <a:off x="838200" y="1581792"/>
-                <a:ext cx="2543710" cy="369332"/>
-              </a:xfrm>
-              <a:prstGeom prst="rect">
-                <a:avLst/>
-              </a:prstGeom>
-              <a:noFill/>
-            </p:spPr>
-            <p:txBody>
-              <a:bodyPr wrap="none" rtlCol="0">
-                <a:spAutoFit/>
-              </a:bodyPr>
-              <a:lstStyle/>
-              <a:p>
-                <a:r>
-                  <a:rPr lang="fr-FR" dirty="0">
-                    <a:solidFill>
-                      <a:srgbClr val="64B164"/>
-                    </a:solidFill>
-                  </a:rPr>
-                  <a:t>Format attendu des .csv :</a:t>
-                </a:r>
-              </a:p>
-            </p:txBody>
-          </p:sp>
-          <p:sp>
-            <p:nvSpPr>
-              <p:cNvPr id="10" name="Rectangle 1">
-                <a:extLst>
-                  <a:ext uri="{FF2B5EF4-FFF2-40B4-BE49-F238E27FC236}">
-                    <a16:creationId xmlns:a16="http://schemas.microsoft.com/office/drawing/2014/main" id="{001B5D9F-D136-4E1A-A632-25AC3C5DA9A8}"/>
-                  </a:ext>
-                </a:extLst>
-              </p:cNvPr>
-              <p:cNvSpPr>
-                <a:spLocks noChangeArrowheads="1"/>
-              </p:cNvSpPr>
-              <p:nvPr/>
-            </p:nvSpPr>
-            <p:spPr bwMode="auto">
-              <a:xfrm>
-                <a:off x="1847766" y="2335866"/>
-                <a:ext cx="2156059" cy="707886"/>
-              </a:xfrm>
-              <a:prstGeom prst="rect">
-                <a:avLst/>
-              </a:prstGeom>
-              <a:solidFill>
-                <a:srgbClr val="272822"/>
-              </a:solidFill>
-              <a:ln>
-                <a:noFill/>
-              </a:ln>
-              <a:effectLst/>
-              <a:extLst>
-                <a:ext uri="{91240B29-F687-4F45-9708-019B960494DF}">
-                  <a14:hiddenLine xmlns:a14="http://schemas.microsoft.com/office/drawing/2010/main" w="9525">
-                    <a:solidFill>
-                      <a:schemeClr val="tx1"/>
-                    </a:solidFill>
-                    <a:miter lim="800000"/>
-                    <a:headEnd/>
-                    <a:tailEnd/>
-                  </a14:hiddenLine>
-                </a:ext>
-                <a:ext uri="{AF507438-7753-43E0-B8FC-AC1667EBCBE1}">
-                  <a14:hiddenEffects xmlns:a14="http://schemas.microsoft.com/office/drawing/2010/main">
-                    <a:effectLst>
-                      <a:outerShdw dist="35921" dir="2700000" algn="ctr" rotWithShape="0">
-                        <a:schemeClr val="bg2"/>
-                      </a:outerShdw>
-                    </a:effectLst>
-                  </a14:hiddenEffects>
-                </a:ext>
-              </a:extLst>
-            </p:spPr>
-            <p:txBody>
-              <a:bodyPr vert="horz" wrap="square" lIns="91440" tIns="45720" rIns="91440" bIns="45720" numCol="1" anchor="ctr" anchorCtr="0" compatLnSpc="1">
-                <a:prstTxWarp prst="textNoShape">
-                  <a:avLst/>
-                </a:prstTxWarp>
-                <a:spAutoFit/>
-              </a:bodyPr>
-              <a:lstStyle/>
-              <a:p>
-                <a:pPr marL="0" marR="0" lvl="0" indent="0" algn="l" defTabSz="914400" rtl="0" eaLnBrk="0" fontAlgn="base" latinLnBrk="0" hangingPunct="0">
-                  <a:lnSpc>
-                    <a:spcPct val="100000"/>
-                  </a:lnSpc>
-                  <a:spcBef>
-                    <a:spcPct val="0"/>
-                  </a:spcBef>
-                  <a:spcAft>
-                    <a:spcPct val="0"/>
-                  </a:spcAft>
-                  <a:buClrTx/>
-                  <a:buSzTx/>
-                  <a:buFontTx/>
-                  <a:buNone/>
-                  <a:tabLst/>
-                </a:pPr>
-                <a:r>
-                  <a:rPr kumimoji="0" lang="fr-FR" altLang="fr-FR" sz="1000" b="0" i="0" u="none" strike="noStrike" cap="none" normalizeH="0" baseline="0" dirty="0" err="1">
-                    <a:ln>
-                      <a:noFill/>
-                    </a:ln>
-                    <a:solidFill>
-                      <a:srgbClr val="F8F8F2"/>
-                    </a:solidFill>
-                    <a:effectLst/>
-                    <a:latin typeface="Courier New" panose="02070309020205020404" pitchFamily="49" charset="0"/>
-                    <a:cs typeface="Courier New" panose="02070309020205020404" pitchFamily="49" charset="0"/>
-                  </a:rPr>
-                  <a:t>name,price,profit</a:t>
-                </a:r>
-                <a:br>
-                  <a:rPr kumimoji="0" lang="fr-FR" altLang="fr-FR" sz="1000" b="0" i="0" u="none" strike="noStrike" cap="none" normalizeH="0" baseline="0" dirty="0">
-                    <a:ln>
-                      <a:noFill/>
-                    </a:ln>
-                    <a:solidFill>
-                      <a:srgbClr val="F8F8F2"/>
-                    </a:solidFill>
-                    <a:effectLst/>
-                    <a:latin typeface="Courier New" panose="02070309020205020404" pitchFamily="49" charset="0"/>
-                    <a:cs typeface="Courier New" panose="02070309020205020404" pitchFamily="49" charset="0"/>
-                  </a:rPr>
-                </a:br>
-                <a:r>
-                  <a:rPr kumimoji="0" lang="fr-FR" altLang="fr-FR" sz="1000" b="0" i="0" u="none" strike="noStrike" cap="none" normalizeH="0" baseline="0" dirty="0">
-                    <a:ln>
-                      <a:noFill/>
-                    </a:ln>
-                    <a:solidFill>
-                      <a:srgbClr val="F8F8F2"/>
-                    </a:solidFill>
-                    <a:effectLst/>
-                    <a:latin typeface="Courier New" panose="02070309020205020404" pitchFamily="49" charset="0"/>
-                    <a:cs typeface="Courier New" panose="02070309020205020404" pitchFamily="49" charset="0"/>
-                  </a:rPr>
-                  <a:t>name1,20,5</a:t>
-                </a:r>
-                <a:br>
-                  <a:rPr kumimoji="0" lang="fr-FR" altLang="fr-FR" sz="1000" b="0" i="0" u="none" strike="noStrike" cap="none" normalizeH="0" baseline="0" dirty="0">
-                    <a:ln>
-                      <a:noFill/>
-                    </a:ln>
-                    <a:solidFill>
-                      <a:srgbClr val="F8F8F2"/>
-                    </a:solidFill>
-                    <a:effectLst/>
-                    <a:latin typeface="Courier New" panose="02070309020205020404" pitchFamily="49" charset="0"/>
-                    <a:cs typeface="Courier New" panose="02070309020205020404" pitchFamily="49" charset="0"/>
-                  </a:rPr>
-                </a:br>
-                <a:r>
-                  <a:rPr kumimoji="0" lang="fr-FR" altLang="fr-FR" sz="1000" b="0" i="0" u="none" strike="noStrike" cap="none" normalizeH="0" baseline="0" dirty="0">
-                    <a:ln>
-                      <a:noFill/>
-                    </a:ln>
-                    <a:solidFill>
-                      <a:srgbClr val="F8F8F2"/>
-                    </a:solidFill>
-                    <a:effectLst/>
-                    <a:latin typeface="Courier New" panose="02070309020205020404" pitchFamily="49" charset="0"/>
-                    <a:cs typeface="Courier New" panose="02070309020205020404" pitchFamily="49" charset="0"/>
-                  </a:rPr>
-                  <a:t>NAME-2,37.59,10.221</a:t>
-                </a:r>
-              </a:p>
-              <a:p>
-                <a:pPr marL="0" marR="0" lvl="0" indent="0" algn="l" defTabSz="914400" rtl="0" eaLnBrk="0" fontAlgn="base" latinLnBrk="0" hangingPunct="0">
-                  <a:lnSpc>
-                    <a:spcPct val="100000"/>
-                  </a:lnSpc>
-                  <a:spcBef>
-                    <a:spcPct val="0"/>
-                  </a:spcBef>
-                  <a:spcAft>
-                    <a:spcPct val="0"/>
-                  </a:spcAft>
-                  <a:buClrTx/>
-                  <a:buSzTx/>
-                  <a:buFontTx/>
-                  <a:buNone/>
-                  <a:tabLst/>
-                </a:pPr>
-                <a:r>
-                  <a:rPr lang="fr-FR" altLang="fr-FR" sz="1000" dirty="0">
-                    <a:solidFill>
-                      <a:srgbClr val="F8F8F2"/>
-                    </a:solidFill>
-                    <a:latin typeface="Courier New" panose="02070309020205020404" pitchFamily="49" charset="0"/>
-                    <a:cs typeface="Courier New" panose="02070309020205020404" pitchFamily="49" charset="0"/>
-                  </a:rPr>
-                  <a:t>33name,02.1,09.3</a:t>
-                </a:r>
-                <a:endParaRPr kumimoji="0" lang="fr-FR" altLang="fr-FR" sz="1800" b="0" i="0" u="none" strike="noStrike" cap="none" normalizeH="0" baseline="0" dirty="0">
-                  <a:ln>
-                    <a:noFill/>
-                  </a:ln>
-                  <a:solidFill>
-                    <a:schemeClr val="tx1"/>
-                  </a:solidFill>
-                  <a:effectLst/>
-                  <a:latin typeface="Arial" panose="020B0604020202020204" pitchFamily="34" charset="0"/>
-                </a:endParaRPr>
-              </a:p>
-            </p:txBody>
-          </p:sp>
-          <p:cxnSp>
-            <p:nvCxnSpPr>
-              <p:cNvPr id="12" name="Connecteur droit avec flèche 11">
-                <a:extLst>
-                  <a:ext uri="{FF2B5EF4-FFF2-40B4-BE49-F238E27FC236}">
-                    <a16:creationId xmlns:a16="http://schemas.microsoft.com/office/drawing/2014/main" id="{7D313FF8-08AB-4A47-BDDC-3449ECDFE7EA}"/>
-                  </a:ext>
-                </a:extLst>
-              </p:cNvPr>
-              <p:cNvCxnSpPr/>
-              <p:nvPr/>
-            </p:nvCxnSpPr>
-            <p:spPr>
-              <a:xfrm>
-                <a:off x="3463490" y="2436709"/>
-                <a:ext cx="1507958" cy="0"/>
-              </a:xfrm>
-              <a:prstGeom prst="straightConnector1">
-                <a:avLst/>
-              </a:prstGeom>
-              <a:ln w="38100">
-                <a:solidFill>
-                  <a:srgbClr val="4E95A1"/>
-                </a:solidFill>
-                <a:tailEnd type="triangle"/>
-              </a:ln>
-            </p:spPr>
-            <p:style>
-              <a:lnRef idx="1">
-                <a:schemeClr val="accent1"/>
-              </a:lnRef>
-              <a:fillRef idx="0">
-                <a:schemeClr val="accent1"/>
-              </a:fillRef>
-              <a:effectRef idx="0">
-                <a:schemeClr val="accent1"/>
-              </a:effectRef>
-              <a:fontRef idx="minor">
-                <a:schemeClr val="tx1"/>
-              </a:fontRef>
-            </p:style>
-          </p:cxnSp>
-          <p:sp>
-            <p:nvSpPr>
-              <p:cNvPr id="13" name="ZoneTexte 12">
-                <a:extLst>
-                  <a:ext uri="{FF2B5EF4-FFF2-40B4-BE49-F238E27FC236}">
-                    <a16:creationId xmlns:a16="http://schemas.microsoft.com/office/drawing/2014/main" id="{7E069659-F03C-4C4F-8377-7F62CB40F9B5}"/>
-                  </a:ext>
-                </a:extLst>
-              </p:cNvPr>
-              <p:cNvSpPr txBox="1"/>
-              <p:nvPr/>
-            </p:nvSpPr>
-            <p:spPr>
-              <a:xfrm>
-                <a:off x="5231330" y="2260098"/>
-                <a:ext cx="1988621" cy="369332"/>
-              </a:xfrm>
-              <a:prstGeom prst="rect">
-                <a:avLst/>
-              </a:prstGeom>
-              <a:noFill/>
-            </p:spPr>
-            <p:txBody>
-              <a:bodyPr wrap="none" rtlCol="0">
-                <a:spAutoFit/>
-              </a:bodyPr>
-              <a:lstStyle/>
-              <a:p>
-                <a:pPr algn="l"/>
-                <a:r>
-                  <a:rPr lang="fr-FR" dirty="0">
-                    <a:solidFill>
-                      <a:srgbClr val="64B164"/>
-                    </a:solidFill>
-                  </a:rPr>
-                  <a:t>Entêtes à respecter</a:t>
-                </a:r>
-              </a:p>
-            </p:txBody>
-          </p:sp>
-          <p:sp>
-            <p:nvSpPr>
-              <p:cNvPr id="15" name="ZoneTexte 14">
-                <a:extLst>
-                  <a:ext uri="{FF2B5EF4-FFF2-40B4-BE49-F238E27FC236}">
-                    <a16:creationId xmlns:a16="http://schemas.microsoft.com/office/drawing/2014/main" id="{747DAE54-0893-4709-BBA3-A59A6DED99C6}"/>
-                  </a:ext>
-                </a:extLst>
-              </p:cNvPr>
-              <p:cNvSpPr txBox="1"/>
-              <p:nvPr/>
-            </p:nvSpPr>
-            <p:spPr>
-              <a:xfrm>
-                <a:off x="3974158" y="2629430"/>
-                <a:ext cx="3368230" cy="369332"/>
-              </a:xfrm>
-              <a:prstGeom prst="rect">
-                <a:avLst/>
-              </a:prstGeom>
-              <a:noFill/>
-            </p:spPr>
-            <p:txBody>
-              <a:bodyPr wrap="none" rtlCol="0">
-                <a:spAutoFit/>
-              </a:bodyPr>
-              <a:lstStyle/>
-              <a:p>
-                <a:pPr algn="l"/>
-                <a:r>
-                  <a:rPr lang="fr-FR" dirty="0">
-                    <a:solidFill>
-                      <a:srgbClr val="64B164"/>
-                    </a:solidFill>
-                  </a:rPr>
-                  <a:t>Séparateur de colonnes =&gt; virgule</a:t>
-                </a:r>
-              </a:p>
-            </p:txBody>
-          </p:sp>
-          <p:cxnSp>
-            <p:nvCxnSpPr>
-              <p:cNvPr id="21" name="Connecteur droit avec flèche 20">
-                <a:extLst>
-                  <a:ext uri="{FF2B5EF4-FFF2-40B4-BE49-F238E27FC236}">
-                    <a16:creationId xmlns:a16="http://schemas.microsoft.com/office/drawing/2014/main" id="{AA0BD167-F24B-430F-92CC-27C4DEA10979}"/>
-                  </a:ext>
-                </a:extLst>
-              </p:cNvPr>
-              <p:cNvCxnSpPr>
-                <a:cxnSpLocks/>
-              </p:cNvCxnSpPr>
-              <p:nvPr/>
-            </p:nvCxnSpPr>
-            <p:spPr>
-              <a:xfrm flipV="1">
-                <a:off x="3144344" y="2036175"/>
-                <a:ext cx="1291674" cy="300441"/>
-              </a:xfrm>
-              <a:prstGeom prst="straightConnector1">
-                <a:avLst/>
-              </a:prstGeom>
-              <a:ln w="38100">
-                <a:solidFill>
-                  <a:srgbClr val="4E95A1"/>
-                </a:solidFill>
-                <a:tailEnd type="triangle"/>
-              </a:ln>
-            </p:spPr>
-            <p:style>
-              <a:lnRef idx="1">
-                <a:schemeClr val="accent1"/>
-              </a:lnRef>
-              <a:fillRef idx="0">
-                <a:schemeClr val="accent1"/>
-              </a:fillRef>
-              <a:effectRef idx="0">
-                <a:schemeClr val="accent1"/>
-              </a:effectRef>
-              <a:fontRef idx="minor">
-                <a:schemeClr val="tx1"/>
-              </a:fontRef>
-            </p:style>
-          </p:cxnSp>
-          <p:sp>
-            <p:nvSpPr>
-              <p:cNvPr id="23" name="ZoneTexte 22">
-                <a:extLst>
-                  <a:ext uri="{FF2B5EF4-FFF2-40B4-BE49-F238E27FC236}">
-                    <a16:creationId xmlns:a16="http://schemas.microsoft.com/office/drawing/2014/main" id="{7D2DC8DB-B7A0-44E3-8D99-35DCC7E56A81}"/>
-                  </a:ext>
-                </a:extLst>
-              </p:cNvPr>
-              <p:cNvSpPr txBox="1"/>
-              <p:nvPr/>
-            </p:nvSpPr>
-            <p:spPr>
-              <a:xfrm>
-                <a:off x="4451057" y="1817063"/>
-                <a:ext cx="1657185" cy="369332"/>
-              </a:xfrm>
-              <a:prstGeom prst="rect">
-                <a:avLst/>
-              </a:prstGeom>
-              <a:noFill/>
-            </p:spPr>
-            <p:txBody>
-              <a:bodyPr wrap="none" rtlCol="0">
-                <a:spAutoFit/>
-              </a:bodyPr>
-              <a:lstStyle/>
-              <a:p>
-                <a:pPr algn="l"/>
-                <a:r>
-                  <a:rPr lang="fr-FR" dirty="0">
-                    <a:solidFill>
-                      <a:srgbClr val="64B164"/>
-                    </a:solidFill>
-                  </a:rPr>
-                  <a:t>en pourcentage</a:t>
-                </a:r>
-              </a:p>
-            </p:txBody>
-          </p:sp>
-          <p:sp>
-            <p:nvSpPr>
-              <p:cNvPr id="25" name="ZoneTexte 24">
-                <a:extLst>
-                  <a:ext uri="{FF2B5EF4-FFF2-40B4-BE49-F238E27FC236}">
-                    <a16:creationId xmlns:a16="http://schemas.microsoft.com/office/drawing/2014/main" id="{B9110DB7-6C6B-4B6A-8E81-57A67C90DEB9}"/>
-                  </a:ext>
-                </a:extLst>
-              </p:cNvPr>
-              <p:cNvSpPr txBox="1"/>
-              <p:nvPr/>
-            </p:nvSpPr>
-            <p:spPr>
-              <a:xfrm>
-                <a:off x="3974158" y="2918703"/>
-                <a:ext cx="2947987" cy="369332"/>
-              </a:xfrm>
-              <a:prstGeom prst="rect">
-                <a:avLst/>
-              </a:prstGeom>
-              <a:noFill/>
-            </p:spPr>
-            <p:txBody>
-              <a:bodyPr wrap="none" rtlCol="0">
-                <a:spAutoFit/>
-              </a:bodyPr>
-              <a:lstStyle/>
-              <a:p>
-                <a:pPr algn="l"/>
-                <a:r>
-                  <a:rPr lang="fr-FR" dirty="0">
-                    <a:solidFill>
-                      <a:srgbClr val="64B164"/>
-                    </a:solidFill>
-                  </a:rPr>
-                  <a:t>Séparateur décimale =&gt; point</a:t>
-                </a:r>
-              </a:p>
-            </p:txBody>
-          </p:sp>
-        </p:grpSp>
-        <p:sp>
-          <p:nvSpPr>
-            <p:cNvPr id="39" name="Rectangle 38">
-              <a:extLst>
-                <a:ext uri="{FF2B5EF4-FFF2-40B4-BE49-F238E27FC236}">
-                  <a16:creationId xmlns:a16="http://schemas.microsoft.com/office/drawing/2014/main" id="{2566097C-6331-4A5A-B2A8-2444C727E076}"/>
-                </a:ext>
-              </a:extLst>
-            </p:cNvPr>
-            <p:cNvSpPr/>
-            <p:nvPr/>
-          </p:nvSpPr>
-          <p:spPr>
-            <a:xfrm>
-              <a:off x="894987" y="1522896"/>
-              <a:ext cx="6601188" cy="1994796"/>
-            </a:xfrm>
-            <a:prstGeom prst="rect">
-              <a:avLst/>
-            </a:prstGeom>
-            <a:noFill/>
-            <a:ln w="38100">
-              <a:solidFill>
-                <a:schemeClr val="tx1"/>
-              </a:solidFill>
-            </a:ln>
-          </p:spPr>
-          <p:style>
-            <a:lnRef idx="2">
-              <a:schemeClr val="accent1">
-                <a:shade val="50000"/>
-              </a:schemeClr>
-            </a:lnRef>
-            <a:fillRef idx="1">
-              <a:schemeClr val="accent1"/>
-            </a:fillRef>
-            <a:effectRef idx="0">
-              <a:schemeClr val="accent1"/>
-            </a:effectRef>
-            <a:fontRef idx="minor">
-              <a:schemeClr val="lt1"/>
-            </a:fontRef>
-          </p:style>
-          <p:txBody>
-            <a:bodyPr rtlCol="0" anchor="ctr"/>
-            <a:lstStyle/>
-            <a:p>
-              <a:pPr algn="ctr"/>
-              <a:endParaRPr lang="fr-FR"/>
-            </a:p>
-          </p:txBody>
-        </p:sp>
       </p:grpSp>
     </p:spTree>
     <p:extLst>
@@ -33239,7 +33245,7 @@
         <p:spPr>
           <a:xfrm>
             <a:off x="8100000" y="1872001"/>
-            <a:ext cx="2619740" cy="4763163"/>
+            <a:ext cx="2619739" cy="4763163"/>
           </a:xfrm>
           <a:prstGeom prst="rect">
             <a:avLst/>

</xml_diff>